<commit_message>
stable version for pollyxt_tropos
</commit_message>
<xml_diff>
--- a/doc/Pollynet_Processing_Chain.pptx
+++ b/doc/Pollynet_Processing_Chain.pptx
@@ -107,6 +107,11 @@
       </a:defRPr>
     </a:lvl9pPr>
   </p:defaultTextStyle>
+  <p:extLst>
+    <p:ext uri="{EFAFB233-063F-42B5-8137-9DF3F51BA10A}">
+      <p15:sldGuideLst xmlns:p15="http://schemas.microsoft.com/office/powerpoint/2012/main"/>
+    </p:ext>
+  </p:extLst>
 </p:presentation>
 </file>
 
@@ -336,7 +341,7 @@
           <a:p>
             <a:fld id="{AB21D1C1-A974-4CDD-890D-2FCDFA70CDD6}" type="datetimeFigureOut">
               <a:rPr lang="en-US" smtClean="0"/>
-              <a:t>12/16/2018</a:t>
+              <a:t>1/1/2019</a:t>
             </a:fld>
             <a:endParaRPr lang="en-US"/>
           </a:p>
@@ -544,7 +549,7 @@
           <a:p>
             <a:fld id="{AB21D1C1-A974-4CDD-890D-2FCDFA70CDD6}" type="datetimeFigureOut">
               <a:rPr lang="en-US" smtClean="0"/>
-              <a:t>12/16/2018</a:t>
+              <a:t>1/1/2019</a:t>
             </a:fld>
             <a:endParaRPr lang="en-US"/>
           </a:p>
@@ -800,7 +805,7 @@
           <a:p>
             <a:fld id="{AB21D1C1-A974-4CDD-890D-2FCDFA70CDD6}" type="datetimeFigureOut">
               <a:rPr lang="en-US" smtClean="0"/>
-              <a:t>12/16/2018</a:t>
+              <a:t>1/1/2019</a:t>
             </a:fld>
             <a:endParaRPr lang="en-US"/>
           </a:p>
@@ -979,7 +984,7 @@
           <a:p>
             <a:fld id="{AB21D1C1-A974-4CDD-890D-2FCDFA70CDD6}" type="datetimeFigureOut">
               <a:rPr lang="en-US" smtClean="0"/>
-              <a:t>12/16/2018</a:t>
+              <a:t>1/1/2019</a:t>
             </a:fld>
             <a:endParaRPr lang="en-US"/>
           </a:p>
@@ -1322,7 +1327,7 @@
           <a:p>
             <a:fld id="{AB21D1C1-A974-4CDD-890D-2FCDFA70CDD6}" type="datetimeFigureOut">
               <a:rPr lang="en-US" smtClean="0"/>
-              <a:t>12/16/2018</a:t>
+              <a:t>1/1/2019</a:t>
             </a:fld>
             <a:endParaRPr lang="en-US"/>
           </a:p>
@@ -1597,7 +1602,7 @@
           <a:p>
             <a:fld id="{AB21D1C1-A974-4CDD-890D-2FCDFA70CDD6}" type="datetimeFigureOut">
               <a:rPr lang="en-US" smtClean="0"/>
-              <a:t>12/16/2018</a:t>
+              <a:t>1/1/2019</a:t>
             </a:fld>
             <a:endParaRPr lang="en-US"/>
           </a:p>
@@ -1976,7 +1981,7 @@
           <a:p>
             <a:fld id="{AB21D1C1-A974-4CDD-890D-2FCDFA70CDD6}" type="datetimeFigureOut">
               <a:rPr lang="en-US" smtClean="0"/>
-              <a:t>12/16/2018</a:t>
+              <a:t>1/1/2019</a:t>
             </a:fld>
             <a:endParaRPr lang="en-US"/>
           </a:p>
@@ -2094,7 +2099,7 @@
           <a:p>
             <a:fld id="{AB21D1C1-A974-4CDD-890D-2FCDFA70CDD6}" type="datetimeFigureOut">
               <a:rPr lang="en-US" smtClean="0"/>
-              <a:t>12/16/2018</a:t>
+              <a:t>1/1/2019</a:t>
             </a:fld>
             <a:endParaRPr lang="en-US"/>
           </a:p>
@@ -2265,7 +2270,7 @@
           <a:p>
             <a:fld id="{AB21D1C1-A974-4CDD-890D-2FCDFA70CDD6}" type="datetimeFigureOut">
               <a:rPr lang="en-US" smtClean="0"/>
-              <a:t>12/16/2018</a:t>
+              <a:t>1/1/2019</a:t>
             </a:fld>
             <a:endParaRPr lang="en-US"/>
           </a:p>
@@ -2619,7 +2624,7 @@
           <a:p>
             <a:fld id="{AB21D1C1-A974-4CDD-890D-2FCDFA70CDD6}" type="datetimeFigureOut">
               <a:rPr lang="en-US" smtClean="0"/>
-              <a:t>12/16/2018</a:t>
+              <a:t>1/1/2019</a:t>
             </a:fld>
             <a:endParaRPr lang="en-US"/>
           </a:p>
@@ -3001,7 +3006,7 @@
           <a:p>
             <a:fld id="{AB21D1C1-A974-4CDD-890D-2FCDFA70CDD6}" type="datetimeFigureOut">
               <a:rPr lang="en-US" smtClean="0"/>
-              <a:t>12/16/2018</a:t>
+              <a:t>1/1/2019</a:t>
             </a:fld>
             <a:endParaRPr lang="en-US"/>
           </a:p>
@@ -3288,7 +3293,7 @@
           <a:p>
             <a:fld id="{AB21D1C1-A974-4CDD-890D-2FCDFA70CDD6}" type="datetimeFigureOut">
               <a:rPr lang="en-US" smtClean="0"/>
-              <a:t>12/16/2018</a:t>
+              <a:t>1/1/2019</a:t>
             </a:fld>
             <a:endParaRPr lang="en-US"/>
           </a:p>
@@ -3829,11 +3834,15 @@
           <a:p>
             <a:r>
               <a:rPr lang="en-US" dirty="0" err="1" smtClean="0"/>
-              <a:t>Pollynet</a:t>
+              <a:t>PollyNET</a:t>
             </a:r>
             <a:r>
               <a:rPr lang="en-US" dirty="0" smtClean="0"/>
-              <a:t> Automatic Processing Chain</a:t>
+              <a:t> </a:t>
+            </a:r>
+            <a:r>
+              <a:rPr lang="en-US" dirty="0" smtClean="0"/>
+              <a:t>Automatic Processing Chain</a:t>
             </a:r>
             <a:endParaRPr lang="en-US" dirty="0"/>
           </a:p>

</xml_diff>

<commit_message>
fix the bug of depolcali.m
</commit_message>
<xml_diff>
--- a/doc/Pollynet_Processing_Chain.pptx
+++ b/doc/Pollynet_Processing_Chain.pptx
@@ -18,6 +18,7 @@
     <p:sldId id="267" r:id="rId12"/>
     <p:sldId id="268" r:id="rId13"/>
     <p:sldId id="277" r:id="rId14"/>
+    <p:sldId id="278" r:id="rId15"/>
   </p:sldIdLst>
   <p:sldSz cx="12192000" cy="6858000"/>
   <p:notesSz cx="6858000" cy="9144000"/>
@@ -1761,7 +1762,7 @@
           <a:p>
             <a:fld id="{AB21D1C1-A974-4CDD-890D-2FCDFA70CDD6}" type="datetimeFigureOut">
               <a:rPr lang="en-US" smtClean="0"/>
-              <a:t>7/21/2019</a:t>
+              <a:t>7/25/2019</a:t>
             </a:fld>
             <a:endParaRPr lang="en-US"/>
           </a:p>
@@ -4802,6 +4803,137 @@
           </a:p>
         </p:txBody>
       </p:sp>
+    </p:spTree>
+    <p:extLst>
+      <p:ext uri="{BB962C8B-B14F-4D97-AF65-F5344CB8AC3E}">
+        <p14:creationId xmlns:p14="http://schemas.microsoft.com/office/powerpoint/2010/main" val="313342365"/>
+      </p:ext>
+    </p:extLst>
+  </p:cSld>
+  <p:clrMapOvr>
+    <a:masterClrMapping/>
+  </p:clrMapOvr>
+  <p:timing>
+    <p:tnLst>
+      <p:par>
+        <p:cTn id="1" dur="indefinite" restart="never" nodeType="tmRoot"/>
+      </p:par>
+    </p:tnLst>
+  </p:timing>
+</p:sld>
+</file>
+
+<file path=ppt/slides/slide14.xml><?xml version="1.0" encoding="utf-8"?>
+<p:sld xmlns:a="http://schemas.openxmlformats.org/drawingml/2006/main" xmlns:r="http://schemas.openxmlformats.org/officeDocument/2006/relationships" xmlns:p="http://schemas.openxmlformats.org/presentationml/2006/main">
+  <p:cSld>
+    <p:spTree>
+      <p:nvGrpSpPr>
+        <p:cNvPr id="1" name=""/>
+        <p:cNvGrpSpPr/>
+        <p:nvPr/>
+      </p:nvGrpSpPr>
+      <p:grpSpPr>
+        <a:xfrm>
+          <a:off x="0" y="0"/>
+          <a:ext cx="0" cy="0"/>
+          <a:chOff x="0" y="0"/>
+          <a:chExt cx="0" cy="0"/>
+        </a:xfrm>
+      </p:grpSpPr>
+      <p:sp>
+        <p:nvSpPr>
+          <p:cNvPr id="2" name="Title 1"/>
+          <p:cNvSpPr>
+            <a:spLocks noGrp="1"/>
+          </p:cNvSpPr>
+          <p:nvPr>
+            <p:ph type="title"/>
+          </p:nvPr>
+        </p:nvSpPr>
+        <p:spPr/>
+        <p:txBody>
+          <a:bodyPr/>
+          <a:lstStyle/>
+          <a:p>
+            <a:r>
+              <a:rPr lang="en-US" dirty="0" smtClean="0"/>
+              <a:t>Workflow</a:t>
+            </a:r>
+            <a:endParaRPr lang="en-US" dirty="0"/>
+          </a:p>
+        </p:txBody>
+      </p:sp>
+      <p:sp>
+        <p:nvSpPr>
+          <p:cNvPr id="3" name="Text Placeholder 2"/>
+          <p:cNvSpPr>
+            <a:spLocks noGrp="1"/>
+          </p:cNvSpPr>
+          <p:nvPr>
+            <p:ph type="body" sz="quarter" idx="18"/>
+          </p:nvPr>
+        </p:nvSpPr>
+        <p:spPr/>
+        <p:txBody>
+          <a:bodyPr/>
+          <a:lstStyle/>
+          <a:p>
+            <a:r>
+              <a:rPr lang="en-US" dirty="0" smtClean="0"/>
+              <a:t>The procedure is valid for (</a:t>
+            </a:r>
+            <a:r>
+              <a:rPr lang="en-US" dirty="0" err="1" smtClean="0"/>
+              <a:t>pollyxt_noa</a:t>
+            </a:r>
+            <a:r>
+              <a:rPr lang="en-US" dirty="0" smtClean="0"/>
+              <a:t>, </a:t>
+            </a:r>
+            <a:r>
+              <a:rPr lang="en-US" dirty="0" err="1" smtClean="0"/>
+              <a:t>pollyxt_fmi</a:t>
+            </a:r>
+            <a:r>
+              <a:rPr lang="en-US" dirty="0" smtClean="0"/>
+              <a:t>, </a:t>
+            </a:r>
+            <a:r>
+              <a:rPr lang="en-US" dirty="0" err="1" smtClean="0"/>
+              <a:t>pollyxt_uw</a:t>
+            </a:r>
+            <a:r>
+              <a:rPr lang="en-US" dirty="0" smtClean="0"/>
+              <a:t>, </a:t>
+            </a:r>
+            <a:r>
+              <a:rPr lang="en-US" dirty="0" err="1" smtClean="0"/>
+              <a:t>pollyxt_tjk</a:t>
+            </a:r>
+            <a:r>
+              <a:rPr lang="en-US" dirty="0" smtClean="0"/>
+              <a:t>, </a:t>
+            </a:r>
+            <a:r>
+              <a:rPr lang="en-US" dirty="0" err="1" smtClean="0"/>
+              <a:t>pollyxt_lacros</a:t>
+            </a:r>
+            <a:r>
+              <a:rPr lang="en-US" dirty="0" smtClean="0"/>
+              <a:t>, </a:t>
+            </a:r>
+            <a:r>
+              <a:rPr lang="en-US" dirty="0" err="1" smtClean="0"/>
+              <a:t>pollyxt_tropos</a:t>
+            </a:r>
+            <a:r>
+              <a:rPr lang="en-US" dirty="0" smtClean="0"/>
+              <a:t>, Arielle, polly_1v2)</a:t>
+            </a:r>
+            <a:endParaRPr lang="en-US" dirty="0"/>
+          </a:p>
+        </p:txBody>
+      </p:sp>
       <p:sp>
         <p:nvSpPr>
           <p:cNvPr id="4" name="TextBox 3"/>
@@ -4810,8 +4942,182 @@
         </p:nvSpPr>
         <p:spPr>
           <a:xfrm>
-            <a:off x="567891" y="1251284"/>
-            <a:ext cx="10693667" cy="4312118"/>
+            <a:off x="668594" y="1057762"/>
+            <a:ext cx="10196051" cy="1477328"/>
+          </a:xfrm>
+          <a:prstGeom prst="rect">
+            <a:avLst/>
+          </a:prstGeom>
+        </p:spPr>
+        <p:style>
+          <a:lnRef idx="2">
+            <a:schemeClr val="dk1"/>
+          </a:lnRef>
+          <a:fillRef idx="1">
+            <a:schemeClr val="lt1"/>
+          </a:fillRef>
+          <a:effectRef idx="0">
+            <a:schemeClr val="dk1"/>
+          </a:effectRef>
+          <a:fontRef idx="minor">
+            <a:schemeClr val="dk1"/>
+          </a:fontRef>
+        </p:style>
+        <p:txBody>
+          <a:bodyPr wrap="square" rtlCol="0">
+            <a:spAutoFit/>
+          </a:bodyPr>
+          <a:lstStyle/>
+          <a:p>
+            <a:pPr marL="342900" indent="-342900">
+              <a:buAutoNum type="arabicPeriod"/>
+            </a:pPr>
+            <a:r>
+              <a:rPr lang="en-US" dirty="0" smtClean="0"/>
+              <a:t>Check the ‘pollynet_places_history.txt’ file to ensure the existence of your campaign info</a:t>
+            </a:r>
+          </a:p>
+          <a:p>
+            <a:pPr marL="342900" indent="-342900">
+              <a:buAutoNum type="arabicPeriod"/>
+            </a:pPr>
+            <a:r>
+              <a:rPr lang="en-US" dirty="0" smtClean="0"/>
+              <a:t>Setup a </a:t>
+            </a:r>
+            <a:r>
+              <a:rPr lang="en-US" dirty="0" err="1" smtClean="0"/>
+              <a:t>polly</a:t>
+            </a:r>
+            <a:r>
+              <a:rPr lang="en-US" dirty="0" smtClean="0"/>
+              <a:t> </a:t>
+            </a:r>
+            <a:r>
+              <a:rPr lang="en-US" dirty="0" err="1" smtClean="0"/>
+              <a:t>config</a:t>
+            </a:r>
+            <a:r>
+              <a:rPr lang="en-US" dirty="0" smtClean="0"/>
+              <a:t> file under ‘../</a:t>
+            </a:r>
+            <a:r>
+              <a:rPr lang="en-US" dirty="0" err="1" smtClean="0"/>
+              <a:t>config</a:t>
+            </a:r>
+            <a:r>
+              <a:rPr lang="en-US" dirty="0" smtClean="0"/>
+              <a:t>’. </a:t>
+            </a:r>
+          </a:p>
+          <a:p>
+            <a:pPr marL="800025" lvl="1" indent="-342900">
+              <a:buFont typeface="Arial" panose="020B0604020202020204" pitchFamily="34" charset="0"/>
+              <a:buChar char="•"/>
+            </a:pPr>
+            <a:r>
+              <a:rPr lang="en-US" dirty="0" smtClean="0"/>
+              <a:t>Example</a:t>
+            </a:r>
+          </a:p>
+          <a:p>
+            <a:pPr marL="342900" indent="-342900">
+              <a:buFont typeface="+mj-lt"/>
+              <a:buAutoNum type="arabicPeriod"/>
+            </a:pPr>
+            <a:r>
+              <a:rPr lang="en-US" dirty="0" smtClean="0"/>
+              <a:t>Add a new entry for this campaign to link the processing modules with the corresponding </a:t>
+            </a:r>
+            <a:r>
+              <a:rPr lang="en-US" dirty="0" err="1" smtClean="0"/>
+              <a:t>config</a:t>
+            </a:r>
+            <a:r>
+              <a:rPr lang="en-US" dirty="0" smtClean="0"/>
+              <a:t> file</a:t>
+            </a:r>
+          </a:p>
+          <a:p>
+            <a:pPr marL="342900" indent="-342900">
+              <a:buFont typeface="+mj-lt"/>
+              <a:buAutoNum type="arabicPeriod"/>
+            </a:pPr>
+            <a:r>
+              <a:rPr lang="en-US" dirty="0" smtClean="0"/>
+              <a:t>Run the ‘</a:t>
+            </a:r>
+            <a:r>
+              <a:rPr lang="en-US" dirty="0" err="1" smtClean="0"/>
+              <a:t>pollynet_process_day</a:t>
+            </a:r>
+            <a:r>
+              <a:rPr lang="en-US" dirty="0" smtClean="0"/>
+              <a:t>’</a:t>
+            </a:r>
+          </a:p>
+        </p:txBody>
+      </p:sp>
+      <p:sp>
+        <p:nvSpPr>
+          <p:cNvPr id="5" name="Rectangle 4"/>
+          <p:cNvSpPr/>
+          <p:nvPr/>
+        </p:nvSpPr>
+        <p:spPr>
+          <a:xfrm>
+            <a:off x="412955" y="3451791"/>
+            <a:ext cx="2202426" cy="521110"/>
+          </a:xfrm>
+          <a:prstGeom prst="rect">
+            <a:avLst/>
+          </a:prstGeom>
+        </p:spPr>
+        <p:style>
+          <a:lnRef idx="1">
+            <a:schemeClr val="accent1"/>
+          </a:lnRef>
+          <a:fillRef idx="3">
+            <a:schemeClr val="accent1"/>
+          </a:fillRef>
+          <a:effectRef idx="2">
+            <a:schemeClr val="accent1"/>
+          </a:effectRef>
+          <a:fontRef idx="minor">
+            <a:schemeClr val="lt1"/>
+          </a:fontRef>
+        </p:style>
+        <p:txBody>
+          <a:bodyPr rtlCol="0" anchor="ctr"/>
+          <a:lstStyle/>
+          <a:p>
+            <a:pPr algn="ctr"/>
+            <a:r>
+              <a:rPr lang="en-US" dirty="0" smtClean="0"/>
+              <a:t>Task from </a:t>
+            </a:r>
+            <a:r>
+              <a:rPr lang="en-US" dirty="0" err="1" smtClean="0"/>
+              <a:t>todolist</a:t>
+            </a:r>
+            <a:r>
+              <a:rPr lang="en-US" dirty="0" smtClean="0"/>
+              <a:t> file</a:t>
+            </a:r>
+            <a:endParaRPr lang="en-US" dirty="0"/>
+          </a:p>
+        </p:txBody>
+      </p:sp>
+      <p:sp>
+        <p:nvSpPr>
+          <p:cNvPr id="6" name="TextBox 5"/>
+          <p:cNvSpPr txBox="1"/>
+          <p:nvPr/>
+        </p:nvSpPr>
+        <p:spPr>
+          <a:xfrm>
+            <a:off x="172065" y="4010441"/>
+            <a:ext cx="2684206" cy="369332"/>
           </a:xfrm>
           <a:prstGeom prst="rect">
             <a:avLst/>
@@ -4824,6 +5130,312 @@
           </a:bodyPr>
           <a:lstStyle/>
           <a:p>
+            <a:r>
+              <a:rPr lang="en-US" dirty="0" smtClean="0"/>
+              <a:t>Each line represents a task</a:t>
+            </a:r>
+            <a:endParaRPr lang="en-US" dirty="0"/>
+          </a:p>
+        </p:txBody>
+      </p:sp>
+      <p:sp>
+        <p:nvSpPr>
+          <p:cNvPr id="7" name="Rectangle 6"/>
+          <p:cNvSpPr/>
+          <p:nvPr/>
+        </p:nvSpPr>
+        <p:spPr>
+          <a:xfrm>
+            <a:off x="3067664" y="2754277"/>
+            <a:ext cx="3185652" cy="1061884"/>
+          </a:xfrm>
+          <a:prstGeom prst="rect">
+            <a:avLst/>
+          </a:prstGeom>
+        </p:spPr>
+        <p:style>
+          <a:lnRef idx="1">
+            <a:schemeClr val="accent1"/>
+          </a:lnRef>
+          <a:fillRef idx="3">
+            <a:schemeClr val="accent1"/>
+          </a:fillRef>
+          <a:effectRef idx="2">
+            <a:schemeClr val="accent1"/>
+          </a:effectRef>
+          <a:fontRef idx="minor">
+            <a:schemeClr val="lt1"/>
+          </a:fontRef>
+        </p:style>
+        <p:txBody>
+          <a:bodyPr rtlCol="0" anchor="ctr"/>
+          <a:lstStyle/>
+          <a:p>
+            <a:pPr algn="ctr"/>
+            <a:r>
+              <a:rPr lang="en-US" dirty="0" smtClean="0"/>
+              <a:t>Pollynet_places_history.txt</a:t>
+            </a:r>
+            <a:endParaRPr lang="en-US" dirty="0"/>
+          </a:p>
+        </p:txBody>
+      </p:sp>
+      <p:sp>
+        <p:nvSpPr>
+          <p:cNvPr id="8" name="TextBox 7"/>
+          <p:cNvSpPr txBox="1"/>
+          <p:nvPr/>
+        </p:nvSpPr>
+        <p:spPr>
+          <a:xfrm>
+            <a:off x="6253316" y="2936436"/>
+            <a:ext cx="2418735" cy="646331"/>
+          </a:xfrm>
+          <a:prstGeom prst="rect">
+            <a:avLst/>
+          </a:prstGeom>
+          <a:noFill/>
+        </p:spPr>
+        <p:txBody>
+          <a:bodyPr wrap="square" rtlCol="0">
+            <a:spAutoFit/>
+          </a:bodyPr>
+          <a:lstStyle/>
+          <a:p>
+            <a:r>
+              <a:rPr lang="en-US" dirty="0" smtClean="0"/>
+              <a:t>Search the campaign info: </a:t>
+            </a:r>
+            <a:r>
+              <a:rPr lang="en-US" dirty="0" err="1" smtClean="0"/>
+              <a:t>lat</a:t>
+            </a:r>
+            <a:r>
+              <a:rPr lang="en-US" dirty="0" smtClean="0"/>
+              <a:t>, </a:t>
+            </a:r>
+            <a:r>
+              <a:rPr lang="en-US" dirty="0" err="1" smtClean="0"/>
+              <a:t>lon</a:t>
+            </a:r>
+            <a:r>
+              <a:rPr lang="en-US" dirty="0" smtClean="0"/>
+              <a:t>, …</a:t>
+            </a:r>
+            <a:endParaRPr lang="en-US" dirty="0"/>
+          </a:p>
+        </p:txBody>
+      </p:sp>
+      <p:sp>
+        <p:nvSpPr>
+          <p:cNvPr id="9" name="Rectangle 8"/>
+          <p:cNvSpPr/>
+          <p:nvPr/>
+        </p:nvSpPr>
+        <p:spPr>
+          <a:xfrm>
+            <a:off x="3067664" y="3972901"/>
+            <a:ext cx="3106993" cy="801329"/>
+          </a:xfrm>
+          <a:prstGeom prst="rect">
+            <a:avLst/>
+          </a:prstGeom>
+        </p:spPr>
+        <p:style>
+          <a:lnRef idx="1">
+            <a:schemeClr val="accent1"/>
+          </a:lnRef>
+          <a:fillRef idx="3">
+            <a:schemeClr val="accent1"/>
+          </a:fillRef>
+          <a:effectRef idx="2">
+            <a:schemeClr val="accent1"/>
+          </a:effectRef>
+          <a:fontRef idx="minor">
+            <a:schemeClr val="lt1"/>
+          </a:fontRef>
+        </p:style>
+        <p:txBody>
+          <a:bodyPr rtlCol="0" anchor="ctr"/>
+          <a:lstStyle/>
+          <a:p>
+            <a:pPr algn="ctr"/>
+            <a:r>
+              <a:rPr lang="en-US" dirty="0" smtClean="0"/>
+              <a:t>Pollynet_processing_config_history.txt</a:t>
+            </a:r>
+            <a:endParaRPr lang="en-US" dirty="0"/>
+          </a:p>
+        </p:txBody>
+      </p:sp>
+      <p:sp>
+        <p:nvSpPr>
+          <p:cNvPr id="10" name="TextBox 9"/>
+          <p:cNvSpPr txBox="1"/>
+          <p:nvPr/>
+        </p:nvSpPr>
+        <p:spPr>
+          <a:xfrm>
+            <a:off x="6253316" y="3911900"/>
+            <a:ext cx="3991897" cy="923330"/>
+          </a:xfrm>
+          <a:prstGeom prst="rect">
+            <a:avLst/>
+          </a:prstGeom>
+          <a:noFill/>
+        </p:spPr>
+        <p:txBody>
+          <a:bodyPr wrap="square" rtlCol="0">
+            <a:spAutoFit/>
+          </a:bodyPr>
+          <a:lstStyle/>
+          <a:p>
+            <a:r>
+              <a:rPr lang="en-US" dirty="0" smtClean="0"/>
+              <a:t>Search the processing module and </a:t>
+            </a:r>
+            <a:r>
+              <a:rPr lang="en-US" dirty="0" err="1" smtClean="0"/>
+              <a:t>config</a:t>
+            </a:r>
+            <a:r>
+              <a:rPr lang="en-US" dirty="0" smtClean="0"/>
+              <a:t> file. (Each </a:t>
+            </a:r>
+            <a:r>
+              <a:rPr lang="en-US" dirty="0" err="1" smtClean="0"/>
+              <a:t>polly</a:t>
+            </a:r>
+            <a:r>
+              <a:rPr lang="en-US" dirty="0" smtClean="0"/>
+              <a:t> has its own processing module)</a:t>
+            </a:r>
+            <a:endParaRPr lang="en-US" dirty="0"/>
+          </a:p>
+        </p:txBody>
+      </p:sp>
+      <p:sp>
+        <p:nvSpPr>
+          <p:cNvPr id="11" name="Left Brace 10"/>
+          <p:cNvSpPr/>
+          <p:nvPr/>
+        </p:nvSpPr>
+        <p:spPr>
+          <a:xfrm>
+            <a:off x="2782529" y="3077497"/>
+            <a:ext cx="73742" cy="1480735"/>
+          </a:xfrm>
+          <a:prstGeom prst="leftBrace">
+            <a:avLst/>
+          </a:prstGeom>
+        </p:spPr>
+        <p:style>
+          <a:lnRef idx="2">
+            <a:schemeClr val="accent1"/>
+          </a:lnRef>
+          <a:fillRef idx="0">
+            <a:schemeClr val="accent1"/>
+          </a:fillRef>
+          <a:effectRef idx="1">
+            <a:schemeClr val="accent1"/>
+          </a:effectRef>
+          <a:fontRef idx="minor">
+            <a:schemeClr val="tx1"/>
+          </a:fontRef>
+        </p:style>
+        <p:txBody>
+          <a:bodyPr rtlCol="0" anchor="ctr"/>
+          <a:lstStyle/>
+          <a:p>
+            <a:pPr algn="ctr"/>
+            <a:endParaRPr lang="en-US"/>
+          </a:p>
+        </p:txBody>
+      </p:sp>
+      <p:sp>
+        <p:nvSpPr>
+          <p:cNvPr id="12" name="Rectangle 11"/>
+          <p:cNvSpPr/>
+          <p:nvPr/>
+        </p:nvSpPr>
+        <p:spPr>
+          <a:xfrm>
+            <a:off x="2428567" y="5328338"/>
+            <a:ext cx="4965291" cy="934064"/>
+          </a:xfrm>
+          <a:prstGeom prst="rect">
+            <a:avLst/>
+          </a:prstGeom>
+        </p:spPr>
+        <p:style>
+          <a:lnRef idx="1">
+            <a:schemeClr val="accent1"/>
+          </a:lnRef>
+          <a:fillRef idx="3">
+            <a:schemeClr val="accent1"/>
+          </a:fillRef>
+          <a:effectRef idx="2">
+            <a:schemeClr val="accent1"/>
+          </a:effectRef>
+          <a:fontRef idx="minor">
+            <a:schemeClr val="lt1"/>
+          </a:fontRef>
+        </p:style>
+        <p:txBody>
+          <a:bodyPr rtlCol="0" anchor="ctr"/>
+          <a:lstStyle/>
+          <a:p>
+            <a:pPr algn="ctr"/>
+            <a:r>
+              <a:rPr lang="en-US" dirty="0" smtClean="0"/>
+              <a:t>Load the </a:t>
+            </a:r>
+            <a:r>
+              <a:rPr lang="en-US" dirty="0" err="1" smtClean="0"/>
+              <a:t>config</a:t>
+            </a:r>
+            <a:r>
+              <a:rPr lang="en-US" dirty="0" smtClean="0"/>
+              <a:t> and activate the processing module</a:t>
+            </a:r>
+            <a:endParaRPr lang="en-US" dirty="0"/>
+          </a:p>
+        </p:txBody>
+      </p:sp>
+      <p:sp>
+        <p:nvSpPr>
+          <p:cNvPr id="13" name="Down Arrow 12"/>
+          <p:cNvSpPr/>
+          <p:nvPr/>
+        </p:nvSpPr>
+        <p:spPr>
+          <a:xfrm>
+            <a:off x="4336026" y="4887365"/>
+            <a:ext cx="324464" cy="340455"/>
+          </a:xfrm>
+          <a:prstGeom prst="downArrow">
+            <a:avLst/>
+          </a:prstGeom>
+        </p:spPr>
+        <p:style>
+          <a:lnRef idx="1">
+            <a:schemeClr val="accent1"/>
+          </a:lnRef>
+          <a:fillRef idx="3">
+            <a:schemeClr val="accent1"/>
+          </a:fillRef>
+          <a:effectRef idx="2">
+            <a:schemeClr val="accent1"/>
+          </a:effectRef>
+          <a:fontRef idx="minor">
+            <a:schemeClr val="lt1"/>
+          </a:fontRef>
+        </p:style>
+        <p:txBody>
+          <a:bodyPr rtlCol="0" anchor="ctr"/>
+          <a:lstStyle/>
+          <a:p>
+            <a:pPr algn="ctr"/>
             <a:endParaRPr lang="en-US"/>
           </a:p>
         </p:txBody>
@@ -4831,7 +5443,7 @@
     </p:spTree>
     <p:extLst>
       <p:ext uri="{BB962C8B-B14F-4D97-AF65-F5344CB8AC3E}">
-        <p14:creationId xmlns:p14="http://schemas.microsoft.com/office/powerpoint/2010/main" val="313342365"/>
+        <p14:creationId xmlns:p14="http://schemas.microsoft.com/office/powerpoint/2010/main" val="2998283427"/>
       </p:ext>
     </p:extLst>
   </p:cSld>
@@ -4964,11 +5576,7 @@
             </a:pPr>
             <a:r>
               <a:rPr lang="en-US" sz="2800" dirty="0" smtClean="0"/>
-              <a:t>Products and </a:t>
-            </a:r>
-            <a:r>
-              <a:rPr lang="en-US" sz="2800" dirty="0" smtClean="0"/>
-              <a:t>Configurations</a:t>
+              <a:t>Products and Configurations</a:t>
             </a:r>
           </a:p>
           <a:p>
@@ -4983,7 +5591,6 @@
               <a:rPr lang="en-US" sz="2800" dirty="0" smtClean="0"/>
               <a:t>Installation and setup</a:t>
             </a:r>
-            <a:endParaRPr lang="en-US" sz="2800" dirty="0" smtClean="0"/>
           </a:p>
           <a:p>
             <a:pPr marL="514350" indent="-514350">
@@ -6966,8 +7573,8 @@
           </p:spPr>
         </p:pic>
       </p:grpSp>
-      <mc:AlternateContent xmlns:mc="http://schemas.openxmlformats.org/markup-compatibility/2006">
-        <mc:Choice xmlns:a14="http://schemas.microsoft.com/office/drawing/2010/main" Requires="a14">
+      <mc:AlternateContent xmlns:mc="http://schemas.openxmlformats.org/markup-compatibility/2006" xmlns:a14="http://schemas.microsoft.com/office/drawing/2010/main">
+        <mc:Choice Requires="a14">
           <p:sp>
             <p:nvSpPr>
               <p:cNvPr id="7" name="TextBox 6"/>
@@ -7761,7 +8368,7 @@
             </p:txBody>
           </p:sp>
         </mc:Choice>
-        <mc:Fallback>
+        <mc:Fallback xmlns="">
           <p:sp>
             <p:nvSpPr>
               <p:cNvPr id="7" name="TextBox 6"/>
@@ -7800,8 +8407,8 @@
           </p:sp>
         </mc:Fallback>
       </mc:AlternateContent>
-      <mc:AlternateContent xmlns:mc="http://schemas.openxmlformats.org/markup-compatibility/2006">
-        <mc:Choice xmlns:a14="http://schemas.microsoft.com/office/drawing/2010/main" Requires="a14">
+      <mc:AlternateContent xmlns:mc="http://schemas.openxmlformats.org/markup-compatibility/2006" xmlns:a14="http://schemas.microsoft.com/office/drawing/2010/main">
+        <mc:Choice Requires="a14">
           <p:sp>
             <p:nvSpPr>
               <p:cNvPr id="8" name="TextBox 7"/>
@@ -8658,7 +9265,7 @@
             </p:txBody>
           </p:sp>
         </mc:Choice>
-        <mc:Fallback>
+        <mc:Fallback xmlns="">
           <p:sp>
             <p:nvSpPr>
               <p:cNvPr id="8" name="TextBox 7"/>
@@ -8973,8 +9580,8 @@
           </a:p>
         </p:txBody>
       </p:sp>
-      <mc:AlternateContent xmlns:mc="http://schemas.openxmlformats.org/markup-compatibility/2006">
-        <mc:Choice xmlns:a14="http://schemas.microsoft.com/office/drawing/2010/main" Requires="a14">
+      <mc:AlternateContent xmlns:mc="http://schemas.openxmlformats.org/markup-compatibility/2006" xmlns:a14="http://schemas.microsoft.com/office/drawing/2010/main">
+        <mc:Choice Requires="a14">
           <p:sp>
             <p:nvSpPr>
               <p:cNvPr id="4" name="TextBox 3"/>
@@ -9454,7 +10061,7 @@
             </p:txBody>
           </p:sp>
         </mc:Choice>
-        <mc:Fallback>
+        <mc:Fallback xmlns="">
           <p:sp>
             <p:nvSpPr>
               <p:cNvPr id="4" name="TextBox 3"/>
@@ -11560,8 +12167,8 @@
           </a:p>
         </p:txBody>
       </p:sp>
-      <mc:AlternateContent xmlns:mc="http://schemas.openxmlformats.org/markup-compatibility/2006">
-        <mc:Choice xmlns:a14="http://schemas.microsoft.com/office/drawing/2010/main" Requires="a14">
+      <mc:AlternateContent xmlns:mc="http://schemas.openxmlformats.org/markup-compatibility/2006" xmlns:a14="http://schemas.microsoft.com/office/drawing/2010/main">
+        <mc:Choice Requires="a14">
           <p:sp>
             <p:nvSpPr>
               <p:cNvPr id="4" name="TextBox 3"/>
@@ -12041,7 +12648,7 @@
             </p:txBody>
           </p:sp>
         </mc:Choice>
-        <mc:Fallback>
+        <mc:Fallback xmlns="">
           <p:sp>
             <p:nvSpPr>
               <p:cNvPr id="4" name="TextBox 3"/>
@@ -12080,8 +12687,8 @@
           </p:sp>
         </mc:Fallback>
       </mc:AlternateContent>
-      <mc:AlternateContent xmlns:mc="http://schemas.openxmlformats.org/markup-compatibility/2006">
-        <mc:Choice xmlns:a14="http://schemas.microsoft.com/office/drawing/2010/main" Requires="a14">
+      <mc:AlternateContent xmlns:mc="http://schemas.openxmlformats.org/markup-compatibility/2006" xmlns:a14="http://schemas.microsoft.com/office/drawing/2010/main">
+        <mc:Choice Requires="a14">
           <p:sp>
             <p:nvSpPr>
               <p:cNvPr id="5" name="TextBox 4"/>
@@ -12374,7 +12981,7 @@
             </p:txBody>
           </p:sp>
         </mc:Choice>
-        <mc:Fallback>
+        <mc:Fallback xmlns="">
           <p:sp>
             <p:nvSpPr>
               <p:cNvPr id="5" name="TextBox 4"/>
@@ -12413,8 +13020,8 @@
           </p:sp>
         </mc:Fallback>
       </mc:AlternateContent>
-      <mc:AlternateContent xmlns:mc="http://schemas.openxmlformats.org/markup-compatibility/2006">
-        <mc:Choice xmlns:a14="http://schemas.microsoft.com/office/drawing/2010/main" Requires="a14">
+      <mc:AlternateContent xmlns:mc="http://schemas.openxmlformats.org/markup-compatibility/2006" xmlns:a14="http://schemas.microsoft.com/office/drawing/2010/main">
+        <mc:Choice Requires="a14">
           <p:sp>
             <p:nvSpPr>
               <p:cNvPr id="6" name="TextBox 5"/>
@@ -12890,7 +13497,7 @@
             </p:txBody>
           </p:sp>
         </mc:Choice>
-        <mc:Fallback>
+        <mc:Fallback xmlns="">
           <p:sp>
             <p:nvSpPr>
               <p:cNvPr id="6" name="TextBox 5"/>
@@ -12973,8 +13580,8 @@
           </a:p>
         </p:txBody>
       </p:sp>
-      <mc:AlternateContent xmlns:mc="http://schemas.openxmlformats.org/markup-compatibility/2006">
-        <mc:Choice xmlns:a14="http://schemas.microsoft.com/office/drawing/2010/main" Requires="a14">
+      <mc:AlternateContent xmlns:mc="http://schemas.openxmlformats.org/markup-compatibility/2006" xmlns:a14="http://schemas.microsoft.com/office/drawing/2010/main">
+        <mc:Choice Requires="a14">
           <p:sp>
             <p:nvSpPr>
               <p:cNvPr id="8" name="TextBox 7"/>
@@ -13290,7 +13897,7 @@
             </p:txBody>
           </p:sp>
         </mc:Choice>
-        <mc:Fallback>
+        <mc:Fallback xmlns="">
           <p:sp>
             <p:nvSpPr>
               <p:cNvPr id="8" name="TextBox 7"/>
@@ -13461,8 +14068,8 @@
           </a:p>
         </p:txBody>
       </p:sp>
-      <mc:AlternateContent xmlns:mc="http://schemas.openxmlformats.org/markup-compatibility/2006">
-        <mc:Choice xmlns:a14="http://schemas.microsoft.com/office/drawing/2010/main" Requires="a14">
+      <mc:AlternateContent xmlns:mc="http://schemas.openxmlformats.org/markup-compatibility/2006" xmlns:a14="http://schemas.microsoft.com/office/drawing/2010/main">
+        <mc:Choice Requires="a14">
           <p:sp>
             <p:nvSpPr>
               <p:cNvPr id="12" name="TextBox 11"/>
@@ -13718,7 +14325,7 @@
             </p:txBody>
           </p:sp>
         </mc:Choice>
-        <mc:Fallback>
+        <mc:Fallback xmlns="">
           <p:sp>
             <p:nvSpPr>
               <p:cNvPr id="12" name="TextBox 11"/>

</xml_diff>

<commit_message>
Enable to recongnize the telecover test data
</commit_message>
<xml_diff>
--- a/doc/Pollynet_Processing_Chain.pptx
+++ b/doc/Pollynet_Processing_Chain.pptx
@@ -10,15 +10,15 @@
     <p:sldId id="271" r:id="rId4"/>
     <p:sldId id="272" r:id="rId5"/>
     <p:sldId id="273" r:id="rId6"/>
-    <p:sldId id="274" r:id="rId7"/>
-    <p:sldId id="275" r:id="rId8"/>
-    <p:sldId id="276" r:id="rId9"/>
-    <p:sldId id="265" r:id="rId10"/>
-    <p:sldId id="266" r:id="rId11"/>
-    <p:sldId id="267" r:id="rId12"/>
-    <p:sldId id="268" r:id="rId13"/>
-    <p:sldId id="277" r:id="rId14"/>
-    <p:sldId id="278" r:id="rId15"/>
+    <p:sldId id="278" r:id="rId7"/>
+    <p:sldId id="274" r:id="rId8"/>
+    <p:sldId id="275" r:id="rId9"/>
+    <p:sldId id="276" r:id="rId10"/>
+    <p:sldId id="265" r:id="rId11"/>
+    <p:sldId id="266" r:id="rId12"/>
+    <p:sldId id="267" r:id="rId13"/>
+    <p:sldId id="268" r:id="rId14"/>
+    <p:sldId id="277" r:id="rId15"/>
   </p:sldIdLst>
   <p:sldSz cx="12192000" cy="6858000"/>
   <p:notesSz cx="6858000" cy="9144000"/>
@@ -1762,7 +1762,7 @@
           <a:p>
             <a:fld id="{AB21D1C1-A974-4CDD-890D-2FCDFA70CDD6}" type="datetimeFigureOut">
               <a:rPr lang="en-US" smtClean="0"/>
-              <a:t>7/25/2019</a:t>
+              <a:t>7/27/2019</a:t>
             </a:fld>
             <a:endParaRPr lang="en-US"/>
           </a:p>
@@ -2232,6 +2232,786 @@
           <a:lstStyle/>
           <a:p>
             <a:r>
+              <a:rPr lang="en-US" altLang="zh-CN" dirty="0" smtClean="0"/>
+              <a:t>Shortage of sliding fixed window </a:t>
+            </a:r>
+            <a:endParaRPr lang="en-US" dirty="0"/>
+          </a:p>
+        </p:txBody>
+      </p:sp>
+      <p:sp>
+        <p:nvSpPr>
+          <p:cNvPr id="10" name="Text Placeholder 9"/>
+          <p:cNvSpPr>
+            <a:spLocks noGrp="1"/>
+          </p:cNvSpPr>
+          <p:nvPr>
+            <p:ph type="body" sz="quarter" idx="18"/>
+          </p:nvPr>
+        </p:nvSpPr>
+        <p:spPr/>
+        <p:txBody>
+          <a:bodyPr/>
+          <a:lstStyle/>
+          <a:p>
+            <a:endParaRPr lang="en-US"/>
+          </a:p>
+        </p:txBody>
+      </p:sp>
+      <p:grpSp>
+        <p:nvGrpSpPr>
+          <p:cNvPr id="5" name="Group 4"/>
+          <p:cNvGrpSpPr/>
+          <p:nvPr/>
+        </p:nvGrpSpPr>
+        <p:grpSpPr>
+          <a:xfrm>
+            <a:off x="1998408" y="1690688"/>
+            <a:ext cx="3309781" cy="4543425"/>
+            <a:chOff x="838200" y="1690688"/>
+            <a:chExt cx="3309781" cy="4543425"/>
+          </a:xfrm>
+        </p:grpSpPr>
+        <p:pic>
+          <p:nvPicPr>
+            <p:cNvPr id="3" name="Picture 2"/>
+            <p:cNvPicPr>
+              <a:picLocks noChangeAspect="1"/>
+            </p:cNvPicPr>
+            <p:nvPr/>
+          </p:nvPicPr>
+          <p:blipFill>
+            <a:blip r:embed="rId2"/>
+            <a:stretch>
+              <a:fillRect/>
+            </a:stretch>
+          </p:blipFill>
+          <p:spPr>
+            <a:xfrm>
+              <a:off x="1023781" y="1690688"/>
+              <a:ext cx="3124200" cy="4543425"/>
+            </a:xfrm>
+            <a:prstGeom prst="rect">
+              <a:avLst/>
+            </a:prstGeom>
+          </p:spPr>
+        </p:pic>
+        <p:pic>
+          <p:nvPicPr>
+            <p:cNvPr id="4" name="Picture 3"/>
+            <p:cNvPicPr>
+              <a:picLocks noChangeAspect="1"/>
+            </p:cNvPicPr>
+            <p:nvPr/>
+          </p:nvPicPr>
+          <p:blipFill rotWithShape="1">
+            <a:blip r:embed="rId3"/>
+            <a:srcRect l="1" r="13306" b="1957"/>
+            <a:stretch/>
+          </p:blipFill>
+          <p:spPr>
+            <a:xfrm>
+              <a:off x="838200" y="1690688"/>
+              <a:ext cx="198181" cy="4510549"/>
+            </a:xfrm>
+            <a:prstGeom prst="rect">
+              <a:avLst/>
+            </a:prstGeom>
+          </p:spPr>
+        </p:pic>
+      </p:grpSp>
+      <p:sp>
+        <p:nvSpPr>
+          <p:cNvPr id="6" name="Rectangle 5"/>
+          <p:cNvSpPr/>
+          <p:nvPr/>
+        </p:nvSpPr>
+        <p:spPr>
+          <a:xfrm>
+            <a:off x="1656735" y="5112774"/>
+            <a:ext cx="4178708" cy="491613"/>
+          </a:xfrm>
+          <a:prstGeom prst="rect">
+            <a:avLst/>
+          </a:prstGeom>
+          <a:noFill/>
+          <a:ln w="38100">
+            <a:solidFill>
+              <a:schemeClr val="accent6"/>
+            </a:solidFill>
+          </a:ln>
+        </p:spPr>
+        <p:style>
+          <a:lnRef idx="2">
+            <a:schemeClr val="accent1">
+              <a:shade val="50000"/>
+            </a:schemeClr>
+          </a:lnRef>
+          <a:fillRef idx="1">
+            <a:schemeClr val="accent1"/>
+          </a:fillRef>
+          <a:effectRef idx="0">
+            <a:schemeClr val="accent1"/>
+          </a:effectRef>
+          <a:fontRef idx="minor">
+            <a:schemeClr val="lt1"/>
+          </a:fontRef>
+        </p:style>
+        <p:txBody>
+          <a:bodyPr rtlCol="0" anchor="ctr"/>
+          <a:lstStyle/>
+          <a:p>
+            <a:pPr algn="ctr"/>
+            <a:endParaRPr lang="en-US"/>
+          </a:p>
+        </p:txBody>
+      </p:sp>
+      <p:sp>
+        <p:nvSpPr>
+          <p:cNvPr id="7" name="TextBox 6"/>
+          <p:cNvSpPr txBox="1"/>
+          <p:nvPr/>
+        </p:nvSpPr>
+        <p:spPr>
+          <a:xfrm>
+            <a:off x="6049295" y="3648218"/>
+            <a:ext cx="4563398" cy="1200329"/>
+          </a:xfrm>
+          <a:prstGeom prst="rect">
+            <a:avLst/>
+          </a:prstGeom>
+          <a:noFill/>
+          <a:ln>
+            <a:solidFill>
+              <a:schemeClr val="accent6"/>
+            </a:solidFill>
+          </a:ln>
+        </p:spPr>
+        <p:txBody>
+          <a:bodyPr wrap="square" rtlCol="0">
+            <a:spAutoFit/>
+          </a:bodyPr>
+          <a:lstStyle/>
+          <a:p>
+            <a:r>
+              <a:rPr lang="en-US" dirty="0" smtClean="0"/>
+              <a:t>Omission: This possible interval will not be found if a large fixed window (like 1 km) was used, since the width of aerosol-free area is only 450m.</a:t>
+            </a:r>
+            <a:endParaRPr lang="en-US" dirty="0"/>
+          </a:p>
+        </p:txBody>
+      </p:sp>
+      <p:sp>
+        <p:nvSpPr>
+          <p:cNvPr id="9" name="TextBox 8"/>
+          <p:cNvSpPr txBox="1"/>
+          <p:nvPr/>
+        </p:nvSpPr>
+        <p:spPr>
+          <a:xfrm>
+            <a:off x="6049295" y="2583286"/>
+            <a:ext cx="4563398" cy="646331"/>
+          </a:xfrm>
+          <a:prstGeom prst="rect">
+            <a:avLst/>
+          </a:prstGeom>
+          <a:noFill/>
+          <a:ln>
+            <a:solidFill>
+              <a:schemeClr val="accent6"/>
+            </a:solidFill>
+          </a:ln>
+        </p:spPr>
+        <p:txBody>
+          <a:bodyPr wrap="square" rtlCol="0">
+            <a:spAutoFit/>
+          </a:bodyPr>
+          <a:lstStyle/>
+          <a:p>
+            <a:r>
+              <a:rPr lang="en-US" dirty="0" smtClean="0"/>
+              <a:t>More computation: all the sub-areas with a fixed width will be tested.</a:t>
+            </a:r>
+            <a:endParaRPr lang="en-US" dirty="0"/>
+          </a:p>
+        </p:txBody>
+      </p:sp>
+      <p:sp>
+        <p:nvSpPr>
+          <p:cNvPr id="16" name="Rectangle 15"/>
+          <p:cNvSpPr/>
+          <p:nvPr/>
+        </p:nvSpPr>
+        <p:spPr>
+          <a:xfrm>
+            <a:off x="1656735" y="4970206"/>
+            <a:ext cx="4178708" cy="491613"/>
+          </a:xfrm>
+          <a:prstGeom prst="rect">
+            <a:avLst/>
+          </a:prstGeom>
+          <a:noFill/>
+          <a:ln w="38100">
+            <a:solidFill>
+              <a:schemeClr val="accent6"/>
+            </a:solidFill>
+          </a:ln>
+        </p:spPr>
+        <p:style>
+          <a:lnRef idx="2">
+            <a:schemeClr val="accent1">
+              <a:shade val="50000"/>
+            </a:schemeClr>
+          </a:lnRef>
+          <a:fillRef idx="1">
+            <a:schemeClr val="accent1"/>
+          </a:fillRef>
+          <a:effectRef idx="0">
+            <a:schemeClr val="accent1"/>
+          </a:effectRef>
+          <a:fontRef idx="minor">
+            <a:schemeClr val="lt1"/>
+          </a:fontRef>
+        </p:style>
+        <p:txBody>
+          <a:bodyPr rtlCol="0" anchor="ctr"/>
+          <a:lstStyle/>
+          <a:p>
+            <a:pPr algn="ctr"/>
+            <a:endParaRPr lang="en-US"/>
+          </a:p>
+        </p:txBody>
+      </p:sp>
+      <p:sp>
+        <p:nvSpPr>
+          <p:cNvPr id="17" name="Rectangle 16"/>
+          <p:cNvSpPr/>
+          <p:nvPr/>
+        </p:nvSpPr>
+        <p:spPr>
+          <a:xfrm>
+            <a:off x="1656735" y="4787541"/>
+            <a:ext cx="4178708" cy="491613"/>
+          </a:xfrm>
+          <a:prstGeom prst="rect">
+            <a:avLst/>
+          </a:prstGeom>
+          <a:noFill/>
+          <a:ln w="38100">
+            <a:solidFill>
+              <a:schemeClr val="accent6"/>
+            </a:solidFill>
+          </a:ln>
+        </p:spPr>
+        <p:style>
+          <a:lnRef idx="2">
+            <a:schemeClr val="accent1">
+              <a:shade val="50000"/>
+            </a:schemeClr>
+          </a:lnRef>
+          <a:fillRef idx="1">
+            <a:schemeClr val="accent1"/>
+          </a:fillRef>
+          <a:effectRef idx="0">
+            <a:schemeClr val="accent1"/>
+          </a:effectRef>
+          <a:fontRef idx="minor">
+            <a:schemeClr val="lt1"/>
+          </a:fontRef>
+        </p:style>
+        <p:txBody>
+          <a:bodyPr rtlCol="0" anchor="ctr"/>
+          <a:lstStyle/>
+          <a:p>
+            <a:pPr algn="ctr"/>
+            <a:endParaRPr lang="en-US"/>
+          </a:p>
+        </p:txBody>
+      </p:sp>
+      <p:sp>
+        <p:nvSpPr>
+          <p:cNvPr id="18" name="Rectangle 17"/>
+          <p:cNvSpPr/>
+          <p:nvPr/>
+        </p:nvSpPr>
+        <p:spPr>
+          <a:xfrm>
+            <a:off x="1656735" y="3864076"/>
+            <a:ext cx="4178708" cy="491613"/>
+          </a:xfrm>
+          <a:prstGeom prst="rect">
+            <a:avLst/>
+          </a:prstGeom>
+          <a:noFill/>
+          <a:ln w="38100">
+            <a:solidFill>
+              <a:schemeClr val="accent6"/>
+            </a:solidFill>
+          </a:ln>
+        </p:spPr>
+        <p:style>
+          <a:lnRef idx="2">
+            <a:schemeClr val="accent1">
+              <a:shade val="50000"/>
+            </a:schemeClr>
+          </a:lnRef>
+          <a:fillRef idx="1">
+            <a:schemeClr val="accent1"/>
+          </a:fillRef>
+          <a:effectRef idx="0">
+            <a:schemeClr val="accent1"/>
+          </a:effectRef>
+          <a:fontRef idx="minor">
+            <a:schemeClr val="lt1"/>
+          </a:fontRef>
+        </p:style>
+        <p:txBody>
+          <a:bodyPr rtlCol="0" anchor="ctr"/>
+          <a:lstStyle/>
+          <a:p>
+            <a:pPr algn="ctr"/>
+            <a:endParaRPr lang="en-US"/>
+          </a:p>
+        </p:txBody>
+      </p:sp>
+    </p:spTree>
+    <p:extLst>
+      <p:ext uri="{BB962C8B-B14F-4D97-AF65-F5344CB8AC3E}">
+        <p14:creationId xmlns:p14="http://schemas.microsoft.com/office/powerpoint/2010/main" val="4088041726"/>
+      </p:ext>
+    </p:extLst>
+  </p:cSld>
+  <p:clrMapOvr>
+    <a:masterClrMapping/>
+  </p:clrMapOvr>
+  <p:timing>
+    <p:tnLst>
+      <p:par>
+        <p:cTn id="1" dur="indefinite" restart="never" nodeType="tmRoot">
+          <p:childTnLst>
+            <p:seq concurrent="1" nextAc="seek">
+              <p:cTn id="2" dur="indefinite" nodeType="mainSeq">
+                <p:childTnLst>
+                  <p:par>
+                    <p:cTn id="3" fill="hold">
+                      <p:stCondLst>
+                        <p:cond delay="indefinite"/>
+                      </p:stCondLst>
+                      <p:childTnLst>
+                        <p:par>
+                          <p:cTn id="4" fill="hold">
+                            <p:stCondLst>
+                              <p:cond delay="0"/>
+                            </p:stCondLst>
+                            <p:childTnLst>
+                              <p:par>
+                                <p:cTn id="5" presetID="1" presetClass="entr" presetSubtype="0" fill="hold" grpId="0" nodeType="clickEffect">
+                                  <p:stCondLst>
+                                    <p:cond delay="0"/>
+                                  </p:stCondLst>
+                                  <p:childTnLst>
+                                    <p:set>
+                                      <p:cBhvr>
+                                        <p:cTn id="6" dur="1" fill="hold">
+                                          <p:stCondLst>
+                                            <p:cond delay="0"/>
+                                          </p:stCondLst>
+                                        </p:cTn>
+                                        <p:tgtEl>
+                                          <p:spTgt spid="6"/>
+                                        </p:tgtEl>
+                                        <p:attrNameLst>
+                                          <p:attrName>style.visibility</p:attrName>
+                                        </p:attrNameLst>
+                                      </p:cBhvr>
+                                      <p:to>
+                                        <p:strVal val="visible"/>
+                                      </p:to>
+                                    </p:set>
+                                  </p:childTnLst>
+                                </p:cTn>
+                              </p:par>
+                            </p:childTnLst>
+                          </p:cTn>
+                        </p:par>
+                      </p:childTnLst>
+                    </p:cTn>
+                  </p:par>
+                  <p:par>
+                    <p:cTn id="7" fill="hold">
+                      <p:stCondLst>
+                        <p:cond delay="indefinite"/>
+                      </p:stCondLst>
+                      <p:childTnLst>
+                        <p:par>
+                          <p:cTn id="8" fill="hold">
+                            <p:stCondLst>
+                              <p:cond delay="0"/>
+                            </p:stCondLst>
+                            <p:childTnLst>
+                              <p:par>
+                                <p:cTn id="9" presetID="1" presetClass="exit" presetSubtype="0" fill="hold" grpId="1" nodeType="clickEffect">
+                                  <p:stCondLst>
+                                    <p:cond delay="0"/>
+                                  </p:stCondLst>
+                                  <p:childTnLst>
+                                    <p:set>
+                                      <p:cBhvr>
+                                        <p:cTn id="10" dur="1" fill="hold">
+                                          <p:stCondLst>
+                                            <p:cond delay="0"/>
+                                          </p:stCondLst>
+                                        </p:cTn>
+                                        <p:tgtEl>
+                                          <p:spTgt spid="6"/>
+                                        </p:tgtEl>
+                                        <p:attrNameLst>
+                                          <p:attrName>style.visibility</p:attrName>
+                                        </p:attrNameLst>
+                                      </p:cBhvr>
+                                      <p:to>
+                                        <p:strVal val="hidden"/>
+                                      </p:to>
+                                    </p:set>
+                                  </p:childTnLst>
+                                </p:cTn>
+                              </p:par>
+                              <p:par>
+                                <p:cTn id="11" presetID="1" presetClass="entr" presetSubtype="0" fill="hold" grpId="0" nodeType="withEffect">
+                                  <p:stCondLst>
+                                    <p:cond delay="0"/>
+                                  </p:stCondLst>
+                                  <p:childTnLst>
+                                    <p:set>
+                                      <p:cBhvr>
+                                        <p:cTn id="12" dur="1" fill="hold">
+                                          <p:stCondLst>
+                                            <p:cond delay="0"/>
+                                          </p:stCondLst>
+                                        </p:cTn>
+                                        <p:tgtEl>
+                                          <p:spTgt spid="16"/>
+                                        </p:tgtEl>
+                                        <p:attrNameLst>
+                                          <p:attrName>style.visibility</p:attrName>
+                                        </p:attrNameLst>
+                                      </p:cBhvr>
+                                      <p:to>
+                                        <p:strVal val="visible"/>
+                                      </p:to>
+                                    </p:set>
+                                  </p:childTnLst>
+                                </p:cTn>
+                              </p:par>
+                            </p:childTnLst>
+                          </p:cTn>
+                        </p:par>
+                      </p:childTnLst>
+                    </p:cTn>
+                  </p:par>
+                  <p:par>
+                    <p:cTn id="13" fill="hold">
+                      <p:stCondLst>
+                        <p:cond delay="indefinite"/>
+                      </p:stCondLst>
+                      <p:childTnLst>
+                        <p:par>
+                          <p:cTn id="14" fill="hold">
+                            <p:stCondLst>
+                              <p:cond delay="0"/>
+                            </p:stCondLst>
+                            <p:childTnLst>
+                              <p:par>
+                                <p:cTn id="15" presetID="1" presetClass="exit" presetSubtype="0" fill="hold" grpId="1" nodeType="clickEffect">
+                                  <p:stCondLst>
+                                    <p:cond delay="0"/>
+                                  </p:stCondLst>
+                                  <p:childTnLst>
+                                    <p:set>
+                                      <p:cBhvr>
+                                        <p:cTn id="16" dur="1" fill="hold">
+                                          <p:stCondLst>
+                                            <p:cond delay="0"/>
+                                          </p:stCondLst>
+                                        </p:cTn>
+                                        <p:tgtEl>
+                                          <p:spTgt spid="16"/>
+                                        </p:tgtEl>
+                                        <p:attrNameLst>
+                                          <p:attrName>style.visibility</p:attrName>
+                                        </p:attrNameLst>
+                                      </p:cBhvr>
+                                      <p:to>
+                                        <p:strVal val="hidden"/>
+                                      </p:to>
+                                    </p:set>
+                                  </p:childTnLst>
+                                </p:cTn>
+                              </p:par>
+                              <p:par>
+                                <p:cTn id="17" presetID="1" presetClass="entr" presetSubtype="0" fill="hold" grpId="0" nodeType="withEffect">
+                                  <p:stCondLst>
+                                    <p:cond delay="0"/>
+                                  </p:stCondLst>
+                                  <p:childTnLst>
+                                    <p:set>
+                                      <p:cBhvr>
+                                        <p:cTn id="18" dur="1" fill="hold">
+                                          <p:stCondLst>
+                                            <p:cond delay="0"/>
+                                          </p:stCondLst>
+                                        </p:cTn>
+                                        <p:tgtEl>
+                                          <p:spTgt spid="17"/>
+                                        </p:tgtEl>
+                                        <p:attrNameLst>
+                                          <p:attrName>style.visibility</p:attrName>
+                                        </p:attrNameLst>
+                                      </p:cBhvr>
+                                      <p:to>
+                                        <p:strVal val="visible"/>
+                                      </p:to>
+                                    </p:set>
+                                  </p:childTnLst>
+                                </p:cTn>
+                              </p:par>
+                            </p:childTnLst>
+                          </p:cTn>
+                        </p:par>
+                      </p:childTnLst>
+                    </p:cTn>
+                  </p:par>
+                  <p:par>
+                    <p:cTn id="19" fill="hold">
+                      <p:stCondLst>
+                        <p:cond delay="indefinite"/>
+                      </p:stCondLst>
+                      <p:childTnLst>
+                        <p:par>
+                          <p:cTn id="20" fill="hold">
+                            <p:stCondLst>
+                              <p:cond delay="0"/>
+                            </p:stCondLst>
+                            <p:childTnLst>
+                              <p:par>
+                                <p:cTn id="21" presetID="1" presetClass="exit" presetSubtype="0" fill="hold" grpId="1" nodeType="clickEffect">
+                                  <p:stCondLst>
+                                    <p:cond delay="0"/>
+                                  </p:stCondLst>
+                                  <p:childTnLst>
+                                    <p:set>
+                                      <p:cBhvr>
+                                        <p:cTn id="22" dur="1" fill="hold">
+                                          <p:stCondLst>
+                                            <p:cond delay="0"/>
+                                          </p:stCondLst>
+                                        </p:cTn>
+                                        <p:tgtEl>
+                                          <p:spTgt spid="17"/>
+                                        </p:tgtEl>
+                                        <p:attrNameLst>
+                                          <p:attrName>style.visibility</p:attrName>
+                                        </p:attrNameLst>
+                                      </p:cBhvr>
+                                      <p:to>
+                                        <p:strVal val="hidden"/>
+                                      </p:to>
+                                    </p:set>
+                                  </p:childTnLst>
+                                </p:cTn>
+                              </p:par>
+                              <p:par>
+                                <p:cTn id="23" presetID="1" presetClass="entr" presetSubtype="0" fill="hold" grpId="0" nodeType="withEffect">
+                                  <p:stCondLst>
+                                    <p:cond delay="0"/>
+                                  </p:stCondLst>
+                                  <p:childTnLst>
+                                    <p:set>
+                                      <p:cBhvr>
+                                        <p:cTn id="24" dur="1" fill="hold">
+                                          <p:stCondLst>
+                                            <p:cond delay="0"/>
+                                          </p:stCondLst>
+                                        </p:cTn>
+                                        <p:tgtEl>
+                                          <p:spTgt spid="18"/>
+                                        </p:tgtEl>
+                                        <p:attrNameLst>
+                                          <p:attrName>style.visibility</p:attrName>
+                                        </p:attrNameLst>
+                                      </p:cBhvr>
+                                      <p:to>
+                                        <p:strVal val="visible"/>
+                                      </p:to>
+                                    </p:set>
+                                  </p:childTnLst>
+                                </p:cTn>
+                              </p:par>
+                            </p:childTnLst>
+                          </p:cTn>
+                        </p:par>
+                      </p:childTnLst>
+                    </p:cTn>
+                  </p:par>
+                  <p:par>
+                    <p:cTn id="25" fill="hold">
+                      <p:stCondLst>
+                        <p:cond delay="indefinite"/>
+                      </p:stCondLst>
+                      <p:childTnLst>
+                        <p:par>
+                          <p:cTn id="26" fill="hold">
+                            <p:stCondLst>
+                              <p:cond delay="0"/>
+                            </p:stCondLst>
+                            <p:childTnLst>
+                              <p:par>
+                                <p:cTn id="27" presetID="1" presetClass="entr" presetSubtype="0" fill="hold" grpId="0" nodeType="clickEffect">
+                                  <p:stCondLst>
+                                    <p:cond delay="0"/>
+                                  </p:stCondLst>
+                                  <p:childTnLst>
+                                    <p:set>
+                                      <p:cBhvr>
+                                        <p:cTn id="28" dur="1" fill="hold">
+                                          <p:stCondLst>
+                                            <p:cond delay="0"/>
+                                          </p:stCondLst>
+                                        </p:cTn>
+                                        <p:tgtEl>
+                                          <p:spTgt spid="9"/>
+                                        </p:tgtEl>
+                                        <p:attrNameLst>
+                                          <p:attrName>style.visibility</p:attrName>
+                                        </p:attrNameLst>
+                                      </p:cBhvr>
+                                      <p:to>
+                                        <p:strVal val="visible"/>
+                                      </p:to>
+                                    </p:set>
+                                  </p:childTnLst>
+                                </p:cTn>
+                              </p:par>
+                            </p:childTnLst>
+                          </p:cTn>
+                        </p:par>
+                      </p:childTnLst>
+                    </p:cTn>
+                  </p:par>
+                  <p:par>
+                    <p:cTn id="29" fill="hold">
+                      <p:stCondLst>
+                        <p:cond delay="indefinite"/>
+                      </p:stCondLst>
+                      <p:childTnLst>
+                        <p:par>
+                          <p:cTn id="30" fill="hold">
+                            <p:stCondLst>
+                              <p:cond delay="0"/>
+                            </p:stCondLst>
+                            <p:childTnLst>
+                              <p:par>
+                                <p:cTn id="31" presetID="1" presetClass="entr" presetSubtype="0" fill="hold" grpId="0" nodeType="clickEffect">
+                                  <p:stCondLst>
+                                    <p:cond delay="0"/>
+                                  </p:stCondLst>
+                                  <p:childTnLst>
+                                    <p:set>
+                                      <p:cBhvr>
+                                        <p:cTn id="32" dur="1" fill="hold">
+                                          <p:stCondLst>
+                                            <p:cond delay="0"/>
+                                          </p:stCondLst>
+                                        </p:cTn>
+                                        <p:tgtEl>
+                                          <p:spTgt spid="7"/>
+                                        </p:tgtEl>
+                                        <p:attrNameLst>
+                                          <p:attrName>style.visibility</p:attrName>
+                                        </p:attrNameLst>
+                                      </p:cBhvr>
+                                      <p:to>
+                                        <p:strVal val="visible"/>
+                                      </p:to>
+                                    </p:set>
+                                  </p:childTnLst>
+                                </p:cTn>
+                              </p:par>
+                            </p:childTnLst>
+                          </p:cTn>
+                        </p:par>
+                      </p:childTnLst>
+                    </p:cTn>
+                  </p:par>
+                </p:childTnLst>
+              </p:cTn>
+              <p:prevCondLst>
+                <p:cond evt="onPrev" delay="0">
+                  <p:tgtEl>
+                    <p:sldTgt/>
+                  </p:tgtEl>
+                </p:cond>
+              </p:prevCondLst>
+              <p:nextCondLst>
+                <p:cond evt="onNext" delay="0">
+                  <p:tgtEl>
+                    <p:sldTgt/>
+                  </p:tgtEl>
+                </p:cond>
+              </p:nextCondLst>
+            </p:seq>
+          </p:childTnLst>
+        </p:cTn>
+      </p:par>
+    </p:tnLst>
+    <p:bldLst>
+      <p:bldP spid="6" grpId="0" animBg="1"/>
+      <p:bldP spid="6" grpId="1" animBg="1"/>
+      <p:bldP spid="7" grpId="0" animBg="1"/>
+      <p:bldP spid="9" grpId="0" animBg="1"/>
+      <p:bldP spid="16" grpId="0" animBg="1"/>
+      <p:bldP spid="16" grpId="1" animBg="1"/>
+      <p:bldP spid="17" grpId="0" animBg="1"/>
+      <p:bldP spid="17" grpId="1" animBg="1"/>
+      <p:bldP spid="18" grpId="0" animBg="1"/>
+    </p:bldLst>
+  </p:timing>
+</p:sld>
+</file>
+
+<file path=ppt/slides/slide11.xml><?xml version="1.0" encoding="utf-8"?>
+<p:sld xmlns:a="http://schemas.openxmlformats.org/drawingml/2006/main" xmlns:r="http://schemas.openxmlformats.org/officeDocument/2006/relationships" xmlns:p="http://schemas.openxmlformats.org/presentationml/2006/main">
+  <p:cSld>
+    <p:spTree>
+      <p:nvGrpSpPr>
+        <p:cNvPr id="1" name=""/>
+        <p:cNvGrpSpPr/>
+        <p:nvPr/>
+      </p:nvGrpSpPr>
+      <p:grpSpPr>
+        <a:xfrm>
+          <a:off x="0" y="0"/>
+          <a:ext cx="0" cy="0"/>
+          <a:chOff x="0" y="0"/>
+          <a:chExt cx="0" cy="0"/>
+        </a:xfrm>
+      </p:grpSpPr>
+      <p:sp>
+        <p:nvSpPr>
+          <p:cNvPr id="2" name="Title 1"/>
+          <p:cNvSpPr>
+            <a:spLocks noGrp="1"/>
+          </p:cNvSpPr>
+          <p:nvPr>
+            <p:ph type="title"/>
+          </p:nvPr>
+        </p:nvSpPr>
+        <p:spPr/>
+        <p:txBody>
+          <a:bodyPr/>
+          <a:lstStyle/>
+          <a:p>
+            <a:r>
               <a:rPr lang="en-US" dirty="0"/>
               <a:t>Rayleigh Fit </a:t>
             </a:r>
@@ -3361,7 +4141,7 @@
 </p:sld>
 </file>
 
-<file path=ppt/slides/slide11.xml><?xml version="1.0" encoding="utf-8"?>
+<file path=ppt/slides/slide12.xml><?xml version="1.0" encoding="utf-8"?>
 <p:sld xmlns:a="http://schemas.openxmlformats.org/drawingml/2006/main" xmlns:r="http://schemas.openxmlformats.org/officeDocument/2006/relationships" xmlns:p="http://schemas.openxmlformats.org/presentationml/2006/main">
   <p:cSld>
     <p:spTree>
@@ -3769,7 +4549,7 @@
 </p:sld>
 </file>
 
-<file path=ppt/slides/slide12.xml><?xml version="1.0" encoding="utf-8"?>
+<file path=ppt/slides/slide13.xml><?xml version="1.0" encoding="utf-8"?>
 <p:sld xmlns:a="http://schemas.openxmlformats.org/drawingml/2006/main" xmlns:r="http://schemas.openxmlformats.org/officeDocument/2006/relationships" xmlns:p="http://schemas.openxmlformats.org/presentationml/2006/main">
   <p:cSld>
     <p:spTree>
@@ -4744,85 +5524,6 @@
 </p:sld>
 </file>
 
-<file path=ppt/slides/slide13.xml><?xml version="1.0" encoding="utf-8"?>
-<p:sld xmlns:a="http://schemas.openxmlformats.org/drawingml/2006/main" xmlns:r="http://schemas.openxmlformats.org/officeDocument/2006/relationships" xmlns:p="http://schemas.openxmlformats.org/presentationml/2006/main">
-  <p:cSld>
-    <p:spTree>
-      <p:nvGrpSpPr>
-        <p:cNvPr id="1" name=""/>
-        <p:cNvGrpSpPr/>
-        <p:nvPr/>
-      </p:nvGrpSpPr>
-      <p:grpSpPr>
-        <a:xfrm>
-          <a:off x="0" y="0"/>
-          <a:ext cx="0" cy="0"/>
-          <a:chOff x="0" y="0"/>
-          <a:chExt cx="0" cy="0"/>
-        </a:xfrm>
-      </p:grpSpPr>
-      <p:sp>
-        <p:nvSpPr>
-          <p:cNvPr id="2" name="Title 1"/>
-          <p:cNvSpPr>
-            <a:spLocks noGrp="1"/>
-          </p:cNvSpPr>
-          <p:nvPr>
-            <p:ph type="title"/>
-          </p:nvPr>
-        </p:nvSpPr>
-        <p:spPr/>
-        <p:txBody>
-          <a:bodyPr/>
-          <a:lstStyle/>
-          <a:p>
-            <a:r>
-              <a:rPr lang="en-US" dirty="0" smtClean="0"/>
-              <a:t>Installation and setup</a:t>
-            </a:r>
-            <a:endParaRPr lang="en-US" dirty="0"/>
-          </a:p>
-        </p:txBody>
-      </p:sp>
-      <p:sp>
-        <p:nvSpPr>
-          <p:cNvPr id="3" name="Text Placeholder 2"/>
-          <p:cNvSpPr>
-            <a:spLocks noGrp="1"/>
-          </p:cNvSpPr>
-          <p:nvPr>
-            <p:ph type="body" sz="quarter" idx="18"/>
-          </p:nvPr>
-        </p:nvSpPr>
-        <p:spPr/>
-        <p:txBody>
-          <a:bodyPr/>
-          <a:lstStyle/>
-          <a:p>
-            <a:endParaRPr lang="en-US"/>
-          </a:p>
-        </p:txBody>
-      </p:sp>
-    </p:spTree>
-    <p:extLst>
-      <p:ext uri="{BB962C8B-B14F-4D97-AF65-F5344CB8AC3E}">
-        <p14:creationId xmlns:p14="http://schemas.microsoft.com/office/powerpoint/2010/main" val="313342365"/>
-      </p:ext>
-    </p:extLst>
-  </p:cSld>
-  <p:clrMapOvr>
-    <a:masterClrMapping/>
-  </p:clrMapOvr>
-  <p:timing>
-    <p:tnLst>
-      <p:par>
-        <p:cTn id="1" dur="indefinite" restart="never" nodeType="tmRoot"/>
-      </p:par>
-    </p:tnLst>
-  </p:timing>
-</p:sld>
-</file>
-
 <file path=ppt/slides/slide14.xml><?xml version="1.0" encoding="utf-8"?>
 <p:sld xmlns:a="http://schemas.openxmlformats.org/drawingml/2006/main" xmlns:r="http://schemas.openxmlformats.org/officeDocument/2006/relationships" xmlns:p="http://schemas.openxmlformats.org/presentationml/2006/main">
   <p:cSld>
@@ -4857,7 +5558,7 @@
           <a:p>
             <a:r>
               <a:rPr lang="en-US" dirty="0" smtClean="0"/>
-              <a:t>Workflow</a:t>
+              <a:t>Installation and setup</a:t>
             </a:r>
             <a:endParaRPr lang="en-US" dirty="0"/>
           </a:p>
@@ -4878,58 +5579,6 @@
           <a:bodyPr/>
           <a:lstStyle/>
           <a:p>
-            <a:r>
-              <a:rPr lang="en-US" dirty="0" smtClean="0"/>
-              <a:t>The procedure is valid for (</a:t>
-            </a:r>
-            <a:r>
-              <a:rPr lang="en-US" dirty="0" err="1" smtClean="0"/>
-              <a:t>pollyxt_noa</a:t>
-            </a:r>
-            <a:r>
-              <a:rPr lang="en-US" dirty="0" smtClean="0"/>
-              <a:t>, </a:t>
-            </a:r>
-            <a:r>
-              <a:rPr lang="en-US" dirty="0" err="1" smtClean="0"/>
-              <a:t>pollyxt_fmi</a:t>
-            </a:r>
-            <a:r>
-              <a:rPr lang="en-US" dirty="0" smtClean="0"/>
-              <a:t>, </a:t>
-            </a:r>
-            <a:r>
-              <a:rPr lang="en-US" dirty="0" err="1" smtClean="0"/>
-              <a:t>pollyxt_uw</a:t>
-            </a:r>
-            <a:r>
-              <a:rPr lang="en-US" dirty="0" smtClean="0"/>
-              <a:t>, </a:t>
-            </a:r>
-            <a:r>
-              <a:rPr lang="en-US" dirty="0" err="1" smtClean="0"/>
-              <a:t>pollyxt_tjk</a:t>
-            </a:r>
-            <a:r>
-              <a:rPr lang="en-US" dirty="0" smtClean="0"/>
-              <a:t>, </a:t>
-            </a:r>
-            <a:r>
-              <a:rPr lang="en-US" dirty="0" err="1" smtClean="0"/>
-              <a:t>pollyxt_lacros</a:t>
-            </a:r>
-            <a:r>
-              <a:rPr lang="en-US" dirty="0" smtClean="0"/>
-              <a:t>, </a:t>
-            </a:r>
-            <a:r>
-              <a:rPr lang="en-US" dirty="0" err="1" smtClean="0"/>
-              <a:t>pollyxt_tropos</a:t>
-            </a:r>
-            <a:r>
-              <a:rPr lang="en-US" dirty="0" smtClean="0"/>
-              <a:t>, Arielle, polly_1v2)</a:t>
-            </a:r>
             <a:endParaRPr lang="en-US" dirty="0"/>
           </a:p>
         </p:txBody>
@@ -4942,8 +5591,8 @@
         </p:nvSpPr>
         <p:spPr>
           <a:xfrm>
-            <a:off x="668594" y="1057762"/>
-            <a:ext cx="10196051" cy="1477328"/>
+            <a:off x="1837944" y="1097280"/>
+            <a:ext cx="7104888" cy="369332"/>
           </a:xfrm>
           <a:prstGeom prst="rect">
             <a:avLst/>
@@ -4951,13 +5600,13 @@
         </p:spPr>
         <p:style>
           <a:lnRef idx="2">
-            <a:schemeClr val="dk1"/>
+            <a:schemeClr val="accent1"/>
           </a:lnRef>
           <a:fillRef idx="1">
             <a:schemeClr val="lt1"/>
           </a:fillRef>
           <a:effectRef idx="0">
-            <a:schemeClr val="dk1"/>
+            <a:schemeClr val="accent1"/>
           </a:effectRef>
           <a:fontRef idx="minor">
             <a:schemeClr val="dk1"/>
@@ -4969,140 +5618,46 @@
           </a:bodyPr>
           <a:lstStyle/>
           <a:p>
-            <a:pPr marL="342900" indent="-342900">
-              <a:buAutoNum type="arabicPeriod"/>
-            </a:pPr>
-            <a:r>
-              <a:rPr lang="en-US" dirty="0" smtClean="0"/>
-              <a:t>Check the ‘pollynet_places_history.txt’ file to ensure the existence of your campaign info</a:t>
-            </a:r>
-          </a:p>
-          <a:p>
-            <a:pPr marL="342900" indent="-342900">
-              <a:buAutoNum type="arabicPeriod"/>
-            </a:pPr>
-            <a:r>
-              <a:rPr lang="en-US" dirty="0" smtClean="0"/>
-              <a:t>Setup a </a:t>
+            <a:r>
+              <a:rPr lang="en-US" dirty="0" err="1"/>
+              <a:t>g</a:t>
             </a:r>
             <a:r>
               <a:rPr lang="en-US" dirty="0" err="1" smtClean="0"/>
-              <a:t>polly</a:t>
-            </a:r>
-            <a:r>
-              <a:rPr lang="en-US" dirty="0" smtClean="0"/>
-              <a:t> </a:t>
-            </a:r>
-            <a:r>
-              <a:rPr lang="en-US" dirty="0" err="1" smtClean="0"/>
-              <a:t>config</a:t>
-            </a:r>
-            <a:r>
-              <a:rPr lang="en-US" dirty="0" smtClean="0"/>
-              <a:t> file under ‘../</a:t>
-            </a:r>
-            <a:r>
-              <a:rPr lang="en-US" dirty="0" err="1" smtClean="0"/>
-              <a:t>config</a:t>
-            </a:r>
-            <a:r>
-              <a:rPr lang="en-US" dirty="0" smtClean="0"/>
-              <a:t>’. </a:t>
-            </a:r>
-          </a:p>
-          <a:p>
-            <a:pPr marL="800025" lvl="1" indent="-342900">
-              <a:buFont typeface="Arial" panose="020B0604020202020204" pitchFamily="34" charset="0"/>
-              <a:buChar char="•"/>
-            </a:pPr>
-            <a:r>
-              <a:rPr lang="en-US" dirty="0" smtClean="0"/>
-              <a:t>Example</a:t>
-            </a:r>
-          </a:p>
-          <a:p>
-            <a:pPr marL="342900" indent="-342900">
-              <a:buFont typeface="+mj-lt"/>
-              <a:buAutoNum type="arabicPeriod"/>
-            </a:pPr>
-            <a:r>
-              <a:rPr lang="en-US" dirty="0" smtClean="0"/>
-              <a:t>Add a new entry for this campaign to link the processing modules with the corresponding </a:t>
-            </a:r>
-            <a:r>
-              <a:rPr lang="en-US" dirty="0" err="1" smtClean="0"/>
-              <a:t>config</a:t>
-            </a:r>
-            <a:r>
-              <a:rPr lang="en-US" dirty="0" smtClean="0"/>
-              <a:t> file</a:t>
-            </a:r>
-          </a:p>
-          <a:p>
-            <a:pPr marL="342900" indent="-342900">
-              <a:buFont typeface="+mj-lt"/>
-              <a:buAutoNum type="arabicPeriod"/>
-            </a:pPr>
-            <a:r>
-              <a:rPr lang="en-US" dirty="0" smtClean="0"/>
-              <a:t>Run the ‘</a:t>
-            </a:r>
-            <a:r>
-              <a:rPr lang="en-US" dirty="0" err="1" smtClean="0"/>
-              <a:t>pollynet_process_day</a:t>
-            </a:r>
-            <a:r>
-              <a:rPr lang="en-US" dirty="0" smtClean="0"/>
-              <a:t>’</a:t>
+              <a:t>it</a:t>
+            </a:r>
+            <a:r>
+              <a:rPr lang="en-US" dirty="0"/>
+              <a:t> clone https://github.com/ZPYin/Pollynet_Processing_Chain</a:t>
             </a:r>
           </a:p>
         </p:txBody>
       </p:sp>
       <p:sp>
         <p:nvSpPr>
-          <p:cNvPr id="5" name="Rectangle 4"/>
-          <p:cNvSpPr/>
+          <p:cNvPr id="5" name="TextBox 4"/>
+          <p:cNvSpPr txBox="1"/>
           <p:nvPr/>
         </p:nvSpPr>
         <p:spPr>
           <a:xfrm>
-            <a:off x="412955" y="3451791"/>
-            <a:ext cx="2202426" cy="521110"/>
+            <a:off x="1837944" y="1572768"/>
+            <a:ext cx="7388352" cy="369332"/>
           </a:xfrm>
           <a:prstGeom prst="rect">
             <a:avLst/>
           </a:prstGeom>
+          <a:noFill/>
         </p:spPr>
-        <p:style>
-          <a:lnRef idx="1">
-            <a:schemeClr val="accent1"/>
-          </a:lnRef>
-          <a:fillRef idx="3">
-            <a:schemeClr val="accent1"/>
-          </a:fillRef>
-          <a:effectRef idx="2">
-            <a:schemeClr val="accent1"/>
-          </a:effectRef>
-          <a:fontRef idx="minor">
-            <a:schemeClr val="lt1"/>
-          </a:fontRef>
-        </p:style>
         <p:txBody>
-          <a:bodyPr rtlCol="0" anchor="ctr"/>
+          <a:bodyPr wrap="square" rtlCol="0">
+            <a:spAutoFit/>
+          </a:bodyPr>
           <a:lstStyle/>
           <a:p>
-            <a:pPr algn="ctr"/>
             <a:r>
               <a:rPr lang="en-US" dirty="0" smtClean="0"/>
-              <a:t>Task from </a:t>
-            </a:r>
-            <a:r>
-              <a:rPr lang="en-US" dirty="0" err="1" smtClean="0"/>
-              <a:t>todolist</a:t>
-            </a:r>
-            <a:r>
-              <a:rPr lang="en-US" dirty="0" smtClean="0"/>
-              <a:t> file</a:t>
+              <a:t>This command will download the code from the remote GitHub repository</a:t>
             </a:r>
             <a:endParaRPr lang="en-US" dirty="0"/>
           </a:p>
@@ -5116,8 +5671,79 @@
         </p:nvSpPr>
         <p:spPr>
           <a:xfrm>
-            <a:off x="172065" y="4010441"/>
-            <a:ext cx="2684206" cy="369332"/>
+            <a:off x="1837944" y="2048256"/>
+            <a:ext cx="7104888" cy="646331"/>
+          </a:xfrm>
+          <a:prstGeom prst="rect">
+            <a:avLst/>
+          </a:prstGeom>
+        </p:spPr>
+        <p:style>
+          <a:lnRef idx="2">
+            <a:schemeClr val="accent1"/>
+          </a:lnRef>
+          <a:fillRef idx="1">
+            <a:schemeClr val="lt1"/>
+          </a:fillRef>
+          <a:effectRef idx="0">
+            <a:schemeClr val="accent1"/>
+          </a:effectRef>
+          <a:fontRef idx="minor">
+            <a:schemeClr val="dk1"/>
+          </a:fontRef>
+        </p:style>
+        <p:txBody>
+          <a:bodyPr wrap="square" rtlCol="0">
+            <a:spAutoFit/>
+          </a:bodyPr>
+          <a:lstStyle/>
+          <a:p>
+            <a:r>
+              <a:rPr lang="en-US" dirty="0" smtClean="0"/>
+              <a:t>setup the global </a:t>
+            </a:r>
+            <a:r>
+              <a:rPr lang="en-US" dirty="0" err="1" smtClean="0"/>
+              <a:t>config</a:t>
+            </a:r>
+            <a:r>
+              <a:rPr lang="en-US" dirty="0" smtClean="0"/>
+              <a:t> with editing: </a:t>
+            </a:r>
+            <a:r>
+              <a:rPr lang="en-US" dirty="0" err="1" smtClean="0"/>
+              <a:t>Pollynet_Processing_Chain</a:t>
+            </a:r>
+            <a:r>
+              <a:rPr lang="en-US" dirty="0" smtClean="0"/>
+              <a:t>/</a:t>
+            </a:r>
+            <a:r>
+              <a:rPr lang="en-US" dirty="0" err="1" smtClean="0"/>
+              <a:t>config</a:t>
+            </a:r>
+            <a:r>
+              <a:rPr lang="en-US" dirty="0" smtClean="0"/>
+              <a:t>/</a:t>
+            </a:r>
+            <a:r>
+              <a:rPr lang="en-US" dirty="0" err="1" smtClean="0"/>
+              <a:t>pollynet_processing_chain_config.json</a:t>
+            </a:r>
+            <a:endParaRPr lang="en-US" dirty="0"/>
+          </a:p>
+        </p:txBody>
+      </p:sp>
+      <p:sp>
+        <p:nvSpPr>
+          <p:cNvPr id="7" name="TextBox 6"/>
+          <p:cNvSpPr txBox="1"/>
+          <p:nvPr/>
+        </p:nvSpPr>
+        <p:spPr>
+          <a:xfrm>
+            <a:off x="1837944" y="2800743"/>
+            <a:ext cx="6986016" cy="646331"/>
           </a:xfrm>
           <a:prstGeom prst="rect">
             <a:avLst/>
@@ -5132,49 +5758,15 @@
           <a:p>
             <a:r>
               <a:rPr lang="en-US" dirty="0" smtClean="0"/>
-              <a:t>Each line represents a task</a:t>
-            </a:r>
-            <a:endParaRPr lang="en-US" dirty="0"/>
-          </a:p>
-        </p:txBody>
-      </p:sp>
-      <p:sp>
-        <p:nvSpPr>
-          <p:cNvPr id="7" name="Rectangle 6"/>
-          <p:cNvSpPr/>
-          <p:nvPr/>
-        </p:nvSpPr>
-        <p:spPr>
-          <a:xfrm>
-            <a:off x="3067664" y="2754277"/>
-            <a:ext cx="3185652" cy="1061884"/>
-          </a:xfrm>
-          <a:prstGeom prst="rect">
-            <a:avLst/>
-          </a:prstGeom>
-        </p:spPr>
-        <p:style>
-          <a:lnRef idx="1">
-            <a:schemeClr val="accent1"/>
-          </a:lnRef>
-          <a:fillRef idx="3">
-            <a:schemeClr val="accent1"/>
-          </a:fillRef>
-          <a:effectRef idx="2">
-            <a:schemeClr val="accent1"/>
-          </a:effectRef>
-          <a:fontRef idx="minor">
-            <a:schemeClr val="lt1"/>
-          </a:fontRef>
-        </p:style>
-        <p:txBody>
-          <a:bodyPr rtlCol="0" anchor="ctr"/>
-          <a:lstStyle/>
-          <a:p>
-            <a:pPr algn="ctr"/>
+              <a:t>You can go to ‘</a:t>
+            </a:r>
+            <a:r>
+              <a:rPr lang="en-US" dirty="0" err="1" smtClean="0"/>
+              <a:t>template_pollynet_processing_chain_config.json</a:t>
+            </a:r>
             <a:r>
               <a:rPr lang="en-US" dirty="0" smtClean="0"/>
-              <a:t>Pollynet_places_history.txt</a:t>
+              <a:t>’ to see how to configure it</a:t>
             </a:r>
             <a:endParaRPr lang="en-US" dirty="0"/>
           </a:p>
@@ -5188,8 +5780,69 @@
         </p:nvSpPr>
         <p:spPr>
           <a:xfrm>
-            <a:off x="6253316" y="2936436"/>
-            <a:ext cx="2418735" cy="646331"/>
+            <a:off x="1837944" y="3528477"/>
+            <a:ext cx="7104888" cy="923330"/>
+          </a:xfrm>
+          <a:prstGeom prst="rect">
+            <a:avLst/>
+          </a:prstGeom>
+        </p:spPr>
+        <p:style>
+          <a:lnRef idx="2">
+            <a:schemeClr val="accent1"/>
+          </a:lnRef>
+          <a:fillRef idx="1">
+            <a:schemeClr val="lt1"/>
+          </a:fillRef>
+          <a:effectRef idx="0">
+            <a:schemeClr val="accent1"/>
+          </a:effectRef>
+          <a:fontRef idx="minor">
+            <a:schemeClr val="dk1"/>
+          </a:fontRef>
+        </p:style>
+        <p:txBody>
+          <a:bodyPr wrap="square" rtlCol="0">
+            <a:spAutoFit/>
+          </a:bodyPr>
+          <a:lstStyle/>
+          <a:p>
+            <a:r>
+              <a:rPr lang="en-US" dirty="0" smtClean="0"/>
+              <a:t>Add the campaign information with editing:</a:t>
+            </a:r>
+          </a:p>
+          <a:p>
+            <a:r>
+              <a:rPr lang="en-US" dirty="0" err="1" smtClean="0"/>
+              <a:t>Pollynet_Processing_Chain</a:t>
+            </a:r>
+            <a:r>
+              <a:rPr lang="en-US" dirty="0" smtClean="0"/>
+              <a:t>/</a:t>
+            </a:r>
+            <a:r>
+              <a:rPr lang="en-US" dirty="0" err="1" smtClean="0"/>
+              <a:t>todo_filelist</a:t>
+            </a:r>
+            <a:r>
+              <a:rPr lang="en-US" dirty="0" smtClean="0"/>
+              <a:t>/pollynet_of_history_places_new.txt</a:t>
+            </a:r>
+            <a:endParaRPr lang="en-US" dirty="0"/>
+          </a:p>
+        </p:txBody>
+      </p:sp>
+      <p:sp>
+        <p:nvSpPr>
+          <p:cNvPr id="9" name="TextBox 8"/>
+          <p:cNvSpPr txBox="1"/>
+          <p:nvPr/>
+        </p:nvSpPr>
+        <p:spPr>
+          <a:xfrm>
+            <a:off x="1975104" y="4599432"/>
+            <a:ext cx="6967728" cy="646331"/>
           </a:xfrm>
           <a:prstGeom prst="rect">
             <a:avLst/>
@@ -5204,65 +5857,7 @@
           <a:p>
             <a:r>
               <a:rPr lang="en-US" dirty="0" smtClean="0"/>
-              <a:t>Search the campaign info: </a:t>
-            </a:r>
-            <a:r>
-              <a:rPr lang="en-US" dirty="0" err="1" smtClean="0"/>
-              <a:t>lat</a:t>
-            </a:r>
-            <a:r>
-              <a:rPr lang="en-US" dirty="0" smtClean="0"/>
-              <a:t>, </a:t>
-            </a:r>
-            <a:r>
-              <a:rPr lang="en-US" dirty="0" err="1" smtClean="0"/>
-              <a:t>lon</a:t>
-            </a:r>
-            <a:r>
-              <a:rPr lang="en-US" dirty="0" smtClean="0"/>
-              <a:t>, …</a:t>
-            </a:r>
-            <a:endParaRPr lang="en-US" dirty="0"/>
-          </a:p>
-        </p:txBody>
-      </p:sp>
-      <p:sp>
-        <p:nvSpPr>
-          <p:cNvPr id="9" name="Rectangle 8"/>
-          <p:cNvSpPr/>
-          <p:nvPr/>
-        </p:nvSpPr>
-        <p:spPr>
-          <a:xfrm>
-            <a:off x="3067664" y="3972901"/>
-            <a:ext cx="3106993" cy="801329"/>
-          </a:xfrm>
-          <a:prstGeom prst="rect">
-            <a:avLst/>
-          </a:prstGeom>
-        </p:spPr>
-        <p:style>
-          <a:lnRef idx="1">
-            <a:schemeClr val="accent1"/>
-          </a:lnRef>
-          <a:fillRef idx="3">
-            <a:schemeClr val="accent1"/>
-          </a:fillRef>
-          <a:effectRef idx="2">
-            <a:schemeClr val="accent1"/>
-          </a:effectRef>
-          <a:fontRef idx="minor">
-            <a:schemeClr val="lt1"/>
-          </a:fontRef>
-        </p:style>
-        <p:txBody>
-          <a:bodyPr rtlCol="0" anchor="ctr"/>
-          <a:lstStyle/>
-          <a:p>
-            <a:pPr algn="ctr"/>
-            <a:r>
-              <a:rPr lang="en-US" dirty="0" smtClean="0"/>
-              <a:t>Pollynet_processing_config_history.txt</a:t>
+              <a:t>Take care about the format of the settings, best way is to copy the line before and then edit it according to your own demands</a:t>
             </a:r>
             <a:endParaRPr lang="en-US" dirty="0"/>
           </a:p>
@@ -5276,56 +5871,10 @@
         </p:nvSpPr>
         <p:spPr>
           <a:xfrm>
-            <a:off x="6253316" y="3911900"/>
-            <a:ext cx="3991897" cy="923330"/>
+            <a:off x="1837944" y="5245763"/>
+            <a:ext cx="7104888" cy="646331"/>
           </a:xfrm>
           <a:prstGeom prst="rect">
-            <a:avLst/>
-          </a:prstGeom>
-          <a:noFill/>
-        </p:spPr>
-        <p:txBody>
-          <a:bodyPr wrap="square" rtlCol="0">
-            <a:spAutoFit/>
-          </a:bodyPr>
-          <a:lstStyle/>
-          <a:p>
-            <a:r>
-              <a:rPr lang="en-US" dirty="0" smtClean="0"/>
-              <a:t>Search the processing module and </a:t>
-            </a:r>
-            <a:r>
-              <a:rPr lang="en-US" dirty="0" err="1" smtClean="0"/>
-              <a:t>config</a:t>
-            </a:r>
-            <a:r>
-              <a:rPr lang="en-US" dirty="0" smtClean="0"/>
-              <a:t> file. (Each </a:t>
-            </a:r>
-            <a:r>
-              <a:rPr lang="en-US" dirty="0" err="1" smtClean="0"/>
-              <a:t>polly</a:t>
-            </a:r>
-            <a:r>
-              <a:rPr lang="en-US" dirty="0" smtClean="0"/>
-              <a:t> has its own processing module)</a:t>
-            </a:r>
-            <a:endParaRPr lang="en-US" dirty="0"/>
-          </a:p>
-        </p:txBody>
-      </p:sp>
-      <p:sp>
-        <p:nvSpPr>
-          <p:cNvPr id="11" name="Left Brace 10"/>
-          <p:cNvSpPr/>
-          <p:nvPr/>
-        </p:nvSpPr>
-        <p:spPr>
-          <a:xfrm>
-            <a:off x="2782529" y="3077497"/>
-            <a:ext cx="73742" cy="1480735"/>
-          </a:xfrm>
-          <a:prstGeom prst="leftBrace">
             <a:avLst/>
           </a:prstGeom>
         </p:spPr>
@@ -5333,62 +5882,114 @@
           <a:lnRef idx="2">
             <a:schemeClr val="accent1"/>
           </a:lnRef>
-          <a:fillRef idx="0">
-            <a:schemeClr val="accent1"/>
+          <a:fillRef idx="1">
+            <a:schemeClr val="lt1"/>
           </a:fillRef>
-          <a:effectRef idx="1">
+          <a:effectRef idx="0">
             <a:schemeClr val="accent1"/>
           </a:effectRef>
           <a:fontRef idx="minor">
-            <a:schemeClr val="tx1"/>
+            <a:schemeClr val="dk1"/>
           </a:fontRef>
         </p:style>
         <p:txBody>
-          <a:bodyPr rtlCol="0" anchor="ctr"/>
+          <a:bodyPr wrap="square" rtlCol="0">
+            <a:spAutoFit/>
+          </a:bodyPr>
           <a:lstStyle/>
           <a:p>
-            <a:pPr algn="ctr"/>
-            <a:endParaRPr lang="en-US"/>
+            <a:r>
+              <a:rPr lang="en-US" dirty="0" smtClean="0"/>
+              <a:t>Specify the </a:t>
+            </a:r>
+            <a:r>
+              <a:rPr lang="en-US" dirty="0" err="1" smtClean="0"/>
+              <a:t>polly</a:t>
+            </a:r>
+            <a:r>
+              <a:rPr lang="en-US" dirty="0" smtClean="0"/>
+              <a:t> settings with editing:</a:t>
+            </a:r>
+          </a:p>
+          <a:p>
+            <a:r>
+              <a:rPr lang="en-US" dirty="0" err="1" smtClean="0"/>
+              <a:t>Pollynet_Processing_Chain</a:t>
+            </a:r>
+            <a:r>
+              <a:rPr lang="en-US" dirty="0" smtClean="0"/>
+              <a:t>/</a:t>
+            </a:r>
+            <a:r>
+              <a:rPr lang="en-US" dirty="0" err="1" smtClean="0"/>
+              <a:t>config</a:t>
+            </a:r>
+            <a:r>
+              <a:rPr lang="en-US" dirty="0" smtClean="0"/>
+              <a:t>/{</a:t>
+            </a:r>
+            <a:r>
+              <a:rPr lang="en-US" dirty="0" err="1" smtClean="0"/>
+              <a:t>polly</a:t>
+            </a:r>
+            <a:r>
+              <a:rPr lang="en-US" dirty="0" smtClean="0"/>
+              <a:t>}_</a:t>
+            </a:r>
+            <a:r>
+              <a:rPr lang="en-US" dirty="0" err="1" smtClean="0"/>
+              <a:t>config</a:t>
+            </a:r>
+            <a:r>
+              <a:rPr lang="en-US" dirty="0" smtClean="0"/>
+              <a:t>_{date}.</a:t>
+            </a:r>
+            <a:r>
+              <a:rPr lang="en-US" dirty="0" err="1" smtClean="0"/>
+              <a:t>json</a:t>
+            </a:r>
+            <a:endParaRPr lang="en-US" dirty="0"/>
           </a:p>
         </p:txBody>
       </p:sp>
       <p:sp>
         <p:nvSpPr>
-          <p:cNvPr id="12" name="Rectangle 11"/>
-          <p:cNvSpPr/>
+          <p:cNvPr id="12" name="TextBox 11"/>
+          <p:cNvSpPr txBox="1"/>
           <p:nvPr/>
         </p:nvSpPr>
         <p:spPr>
           <a:xfrm>
-            <a:off x="2428567" y="5328338"/>
-            <a:ext cx="4965291" cy="934064"/>
+            <a:off x="1837944" y="6046403"/>
+            <a:ext cx="7104888" cy="646331"/>
           </a:xfrm>
           <a:prstGeom prst="rect">
             <a:avLst/>
           </a:prstGeom>
         </p:spPr>
         <p:style>
-          <a:lnRef idx="1">
+          <a:lnRef idx="2">
             <a:schemeClr val="accent1"/>
           </a:lnRef>
-          <a:fillRef idx="3">
-            <a:schemeClr val="accent1"/>
+          <a:fillRef idx="1">
+            <a:schemeClr val="lt1"/>
           </a:fillRef>
-          <a:effectRef idx="2">
+          <a:effectRef idx="0">
             <a:schemeClr val="accent1"/>
           </a:effectRef>
           <a:fontRef idx="minor">
-            <a:schemeClr val="lt1"/>
+            <a:schemeClr val="dk1"/>
           </a:fontRef>
         </p:style>
         <p:txBody>
-          <a:bodyPr rtlCol="0" anchor="ctr"/>
+          <a:bodyPr wrap="square" rtlCol="0">
+            <a:spAutoFit/>
+          </a:bodyPr>
           <a:lstStyle/>
           <a:p>
-            <a:pPr algn="ctr"/>
             <a:r>
               <a:rPr lang="en-US" dirty="0" smtClean="0"/>
-              <a:t>Load the </a:t>
+              <a:t>Add a new </a:t>
             </a:r>
             <a:r>
               <a:rPr lang="en-US" dirty="0" err="1" smtClean="0"/>
@@ -5396,54 +5997,34 @@
             </a:r>
             <a:r>
               <a:rPr lang="en-US" dirty="0" smtClean="0"/>
-              <a:t> and activate the processing module</a:t>
+              <a:t> history with editing:</a:t>
+            </a:r>
+          </a:p>
+          <a:p>
+            <a:r>
+              <a:rPr lang="en-US" dirty="0" err="1" smtClean="0"/>
+              <a:t>Pollynet_Processing_Chain</a:t>
+            </a:r>
+            <a:r>
+              <a:rPr lang="en-US" dirty="0" smtClean="0"/>
+              <a:t>/</a:t>
+            </a:r>
+            <a:r>
+              <a:rPr lang="en-US" dirty="0" err="1" smtClean="0"/>
+              <a:t>config</a:t>
+            </a:r>
+            <a:r>
+              <a:rPr lang="en-US" dirty="0" smtClean="0"/>
+              <a:t>/pollynet_Processing_config_history.txt</a:t>
             </a:r>
             <a:endParaRPr lang="en-US" dirty="0"/>
-          </a:p>
-        </p:txBody>
-      </p:sp>
-      <p:sp>
-        <p:nvSpPr>
-          <p:cNvPr id="13" name="Down Arrow 12"/>
-          <p:cNvSpPr/>
-          <p:nvPr/>
-        </p:nvSpPr>
-        <p:spPr>
-          <a:xfrm>
-            <a:off x="4336026" y="4887365"/>
-            <a:ext cx="324464" cy="340455"/>
-          </a:xfrm>
-          <a:prstGeom prst="downArrow">
-            <a:avLst/>
-          </a:prstGeom>
-        </p:spPr>
-        <p:style>
-          <a:lnRef idx="1">
-            <a:schemeClr val="accent1"/>
-          </a:lnRef>
-          <a:fillRef idx="3">
-            <a:schemeClr val="accent1"/>
-          </a:fillRef>
-          <a:effectRef idx="2">
-            <a:schemeClr val="accent1"/>
-          </a:effectRef>
-          <a:fontRef idx="minor">
-            <a:schemeClr val="lt1"/>
-          </a:fontRef>
-        </p:style>
-        <p:txBody>
-          <a:bodyPr rtlCol="0" anchor="ctr"/>
-          <a:lstStyle/>
-          <a:p>
-            <a:pPr algn="ctr"/>
-            <a:endParaRPr lang="en-US"/>
           </a:p>
         </p:txBody>
       </p:sp>
     </p:spTree>
     <p:extLst>
       <p:ext uri="{BB962C8B-B14F-4D97-AF65-F5344CB8AC3E}">
-        <p14:creationId xmlns:p14="http://schemas.microsoft.com/office/powerpoint/2010/main" val="2998283427"/>
+        <p14:creationId xmlns:p14="http://schemas.microsoft.com/office/powerpoint/2010/main" val="313342365"/>
       </p:ext>
     </p:extLst>
   </p:cSld>
@@ -7487,6 +8068,659 @@
           <a:lstStyle/>
           <a:p>
             <a:r>
+              <a:rPr lang="en-US" dirty="0" smtClean="0"/>
+              <a:t>Workflow</a:t>
+            </a:r>
+            <a:endParaRPr lang="en-US" dirty="0"/>
+          </a:p>
+        </p:txBody>
+      </p:sp>
+      <p:sp>
+        <p:nvSpPr>
+          <p:cNvPr id="3" name="Text Placeholder 2"/>
+          <p:cNvSpPr>
+            <a:spLocks noGrp="1"/>
+          </p:cNvSpPr>
+          <p:nvPr>
+            <p:ph type="body" sz="quarter" idx="18"/>
+          </p:nvPr>
+        </p:nvSpPr>
+        <p:spPr/>
+        <p:txBody>
+          <a:bodyPr/>
+          <a:lstStyle/>
+          <a:p>
+            <a:r>
+              <a:rPr lang="en-US" dirty="0" smtClean="0"/>
+              <a:t>The procedure is valid for (</a:t>
+            </a:r>
+            <a:r>
+              <a:rPr lang="en-US" dirty="0" err="1" smtClean="0"/>
+              <a:t>pollyxt_noa</a:t>
+            </a:r>
+            <a:r>
+              <a:rPr lang="en-US" dirty="0" smtClean="0"/>
+              <a:t>, </a:t>
+            </a:r>
+            <a:r>
+              <a:rPr lang="en-US" dirty="0" err="1" smtClean="0"/>
+              <a:t>pollyxt_fmi</a:t>
+            </a:r>
+            <a:r>
+              <a:rPr lang="en-US" dirty="0" smtClean="0"/>
+              <a:t>, </a:t>
+            </a:r>
+            <a:r>
+              <a:rPr lang="en-US" dirty="0" err="1" smtClean="0"/>
+              <a:t>pollyxt_uw</a:t>
+            </a:r>
+            <a:r>
+              <a:rPr lang="en-US" dirty="0" smtClean="0"/>
+              <a:t>, </a:t>
+            </a:r>
+            <a:r>
+              <a:rPr lang="en-US" dirty="0" err="1" smtClean="0"/>
+              <a:t>pollyxt_tjk</a:t>
+            </a:r>
+            <a:r>
+              <a:rPr lang="en-US" dirty="0" smtClean="0"/>
+              <a:t>, </a:t>
+            </a:r>
+            <a:r>
+              <a:rPr lang="en-US" dirty="0" err="1" smtClean="0"/>
+              <a:t>pollyxt_lacros</a:t>
+            </a:r>
+            <a:r>
+              <a:rPr lang="en-US" dirty="0" smtClean="0"/>
+              <a:t>, </a:t>
+            </a:r>
+            <a:r>
+              <a:rPr lang="en-US" dirty="0" err="1" smtClean="0"/>
+              <a:t>pollyxt_tropos</a:t>
+            </a:r>
+            <a:r>
+              <a:rPr lang="en-US" dirty="0" smtClean="0"/>
+              <a:t>, Arielle, polly_1v2)</a:t>
+            </a:r>
+            <a:endParaRPr lang="en-US" dirty="0"/>
+          </a:p>
+        </p:txBody>
+      </p:sp>
+      <p:sp>
+        <p:nvSpPr>
+          <p:cNvPr id="4" name="TextBox 3"/>
+          <p:cNvSpPr txBox="1"/>
+          <p:nvPr/>
+        </p:nvSpPr>
+        <p:spPr>
+          <a:xfrm>
+            <a:off x="668594" y="1057762"/>
+            <a:ext cx="10196051" cy="1477328"/>
+          </a:xfrm>
+          <a:prstGeom prst="rect">
+            <a:avLst/>
+          </a:prstGeom>
+        </p:spPr>
+        <p:style>
+          <a:lnRef idx="2">
+            <a:schemeClr val="dk1"/>
+          </a:lnRef>
+          <a:fillRef idx="1">
+            <a:schemeClr val="lt1"/>
+          </a:fillRef>
+          <a:effectRef idx="0">
+            <a:schemeClr val="dk1"/>
+          </a:effectRef>
+          <a:fontRef idx="minor">
+            <a:schemeClr val="dk1"/>
+          </a:fontRef>
+        </p:style>
+        <p:txBody>
+          <a:bodyPr wrap="square" rtlCol="0">
+            <a:spAutoFit/>
+          </a:bodyPr>
+          <a:lstStyle/>
+          <a:p>
+            <a:pPr marL="342900" indent="-342900">
+              <a:buAutoNum type="arabicPeriod"/>
+            </a:pPr>
+            <a:r>
+              <a:rPr lang="en-US" dirty="0" smtClean="0"/>
+              <a:t>Check the ‘pollynet_places_history.txt’ file to ensure the existence of your campaign info</a:t>
+            </a:r>
+          </a:p>
+          <a:p>
+            <a:pPr marL="342900" indent="-342900">
+              <a:buAutoNum type="arabicPeriod"/>
+            </a:pPr>
+            <a:r>
+              <a:rPr lang="en-US" dirty="0" smtClean="0"/>
+              <a:t>Setup a </a:t>
+            </a:r>
+            <a:r>
+              <a:rPr lang="en-US" dirty="0" err="1" smtClean="0"/>
+              <a:t>polly</a:t>
+            </a:r>
+            <a:r>
+              <a:rPr lang="en-US" dirty="0" smtClean="0"/>
+              <a:t> </a:t>
+            </a:r>
+            <a:r>
+              <a:rPr lang="en-US" dirty="0" err="1" smtClean="0"/>
+              <a:t>config</a:t>
+            </a:r>
+            <a:r>
+              <a:rPr lang="en-US" dirty="0" smtClean="0"/>
+              <a:t> file under ‘../</a:t>
+            </a:r>
+            <a:r>
+              <a:rPr lang="en-US" dirty="0" err="1" smtClean="0"/>
+              <a:t>config</a:t>
+            </a:r>
+            <a:r>
+              <a:rPr lang="en-US" dirty="0" smtClean="0"/>
+              <a:t>’. </a:t>
+            </a:r>
+          </a:p>
+          <a:p>
+            <a:pPr marL="800025" lvl="1" indent="-342900">
+              <a:buFont typeface="Arial" panose="020B0604020202020204" pitchFamily="34" charset="0"/>
+              <a:buChar char="•"/>
+            </a:pPr>
+            <a:r>
+              <a:rPr lang="en-US" dirty="0" smtClean="0"/>
+              <a:t>Example</a:t>
+            </a:r>
+          </a:p>
+          <a:p>
+            <a:pPr marL="342900" indent="-342900">
+              <a:buFont typeface="+mj-lt"/>
+              <a:buAutoNum type="arabicPeriod"/>
+            </a:pPr>
+            <a:r>
+              <a:rPr lang="en-US" dirty="0" smtClean="0"/>
+              <a:t>Add a new entry for this campaign to link the processing modules with the corresponding </a:t>
+            </a:r>
+            <a:r>
+              <a:rPr lang="en-US" dirty="0" err="1" smtClean="0"/>
+              <a:t>config</a:t>
+            </a:r>
+            <a:r>
+              <a:rPr lang="en-US" dirty="0" smtClean="0"/>
+              <a:t> file</a:t>
+            </a:r>
+          </a:p>
+          <a:p>
+            <a:pPr marL="342900" indent="-342900">
+              <a:buFont typeface="+mj-lt"/>
+              <a:buAutoNum type="arabicPeriod"/>
+            </a:pPr>
+            <a:r>
+              <a:rPr lang="en-US" dirty="0" smtClean="0"/>
+              <a:t>Run the ‘</a:t>
+            </a:r>
+            <a:r>
+              <a:rPr lang="en-US" dirty="0" err="1" smtClean="0"/>
+              <a:t>pollynet_process_day</a:t>
+            </a:r>
+            <a:r>
+              <a:rPr lang="en-US" dirty="0" smtClean="0"/>
+              <a:t>’</a:t>
+            </a:r>
+          </a:p>
+        </p:txBody>
+      </p:sp>
+      <p:sp>
+        <p:nvSpPr>
+          <p:cNvPr id="5" name="Rectangle 4"/>
+          <p:cNvSpPr/>
+          <p:nvPr/>
+        </p:nvSpPr>
+        <p:spPr>
+          <a:xfrm>
+            <a:off x="412955" y="3451791"/>
+            <a:ext cx="2202426" cy="521110"/>
+          </a:xfrm>
+          <a:prstGeom prst="rect">
+            <a:avLst/>
+          </a:prstGeom>
+        </p:spPr>
+        <p:style>
+          <a:lnRef idx="1">
+            <a:schemeClr val="accent1"/>
+          </a:lnRef>
+          <a:fillRef idx="3">
+            <a:schemeClr val="accent1"/>
+          </a:fillRef>
+          <a:effectRef idx="2">
+            <a:schemeClr val="accent1"/>
+          </a:effectRef>
+          <a:fontRef idx="minor">
+            <a:schemeClr val="lt1"/>
+          </a:fontRef>
+        </p:style>
+        <p:txBody>
+          <a:bodyPr rtlCol="0" anchor="ctr"/>
+          <a:lstStyle/>
+          <a:p>
+            <a:pPr algn="ctr"/>
+            <a:r>
+              <a:rPr lang="en-US" dirty="0" smtClean="0"/>
+              <a:t>Task from </a:t>
+            </a:r>
+            <a:r>
+              <a:rPr lang="en-US" dirty="0" err="1" smtClean="0"/>
+              <a:t>todolist</a:t>
+            </a:r>
+            <a:r>
+              <a:rPr lang="en-US" dirty="0" smtClean="0"/>
+              <a:t> file</a:t>
+            </a:r>
+            <a:endParaRPr lang="en-US" dirty="0"/>
+          </a:p>
+        </p:txBody>
+      </p:sp>
+      <p:sp>
+        <p:nvSpPr>
+          <p:cNvPr id="6" name="TextBox 5"/>
+          <p:cNvSpPr txBox="1"/>
+          <p:nvPr/>
+        </p:nvSpPr>
+        <p:spPr>
+          <a:xfrm>
+            <a:off x="172065" y="4010441"/>
+            <a:ext cx="2684206" cy="369332"/>
+          </a:xfrm>
+          <a:prstGeom prst="rect">
+            <a:avLst/>
+          </a:prstGeom>
+          <a:noFill/>
+        </p:spPr>
+        <p:txBody>
+          <a:bodyPr wrap="square" rtlCol="0">
+            <a:spAutoFit/>
+          </a:bodyPr>
+          <a:lstStyle/>
+          <a:p>
+            <a:r>
+              <a:rPr lang="en-US" dirty="0" smtClean="0"/>
+              <a:t>Each line represents a task</a:t>
+            </a:r>
+            <a:endParaRPr lang="en-US" dirty="0"/>
+          </a:p>
+        </p:txBody>
+      </p:sp>
+      <p:sp>
+        <p:nvSpPr>
+          <p:cNvPr id="7" name="Rectangle 6"/>
+          <p:cNvSpPr/>
+          <p:nvPr/>
+        </p:nvSpPr>
+        <p:spPr>
+          <a:xfrm>
+            <a:off x="3067664" y="2754277"/>
+            <a:ext cx="3185652" cy="1061884"/>
+          </a:xfrm>
+          <a:prstGeom prst="rect">
+            <a:avLst/>
+          </a:prstGeom>
+        </p:spPr>
+        <p:style>
+          <a:lnRef idx="1">
+            <a:schemeClr val="accent1"/>
+          </a:lnRef>
+          <a:fillRef idx="3">
+            <a:schemeClr val="accent1"/>
+          </a:fillRef>
+          <a:effectRef idx="2">
+            <a:schemeClr val="accent1"/>
+          </a:effectRef>
+          <a:fontRef idx="minor">
+            <a:schemeClr val="lt1"/>
+          </a:fontRef>
+        </p:style>
+        <p:txBody>
+          <a:bodyPr rtlCol="0" anchor="ctr"/>
+          <a:lstStyle/>
+          <a:p>
+            <a:pPr algn="ctr"/>
+            <a:r>
+              <a:rPr lang="en-US" dirty="0" smtClean="0"/>
+              <a:t>Pollynet_places_history.txt</a:t>
+            </a:r>
+            <a:endParaRPr lang="en-US" dirty="0"/>
+          </a:p>
+        </p:txBody>
+      </p:sp>
+      <p:sp>
+        <p:nvSpPr>
+          <p:cNvPr id="8" name="TextBox 7"/>
+          <p:cNvSpPr txBox="1"/>
+          <p:nvPr/>
+        </p:nvSpPr>
+        <p:spPr>
+          <a:xfrm>
+            <a:off x="6253316" y="2936436"/>
+            <a:ext cx="2418735" cy="646331"/>
+          </a:xfrm>
+          <a:prstGeom prst="rect">
+            <a:avLst/>
+          </a:prstGeom>
+          <a:noFill/>
+        </p:spPr>
+        <p:txBody>
+          <a:bodyPr wrap="square" rtlCol="0">
+            <a:spAutoFit/>
+          </a:bodyPr>
+          <a:lstStyle/>
+          <a:p>
+            <a:r>
+              <a:rPr lang="en-US" dirty="0" smtClean="0"/>
+              <a:t>Search the campaign info: </a:t>
+            </a:r>
+            <a:r>
+              <a:rPr lang="en-US" dirty="0" err="1" smtClean="0"/>
+              <a:t>lat</a:t>
+            </a:r>
+            <a:r>
+              <a:rPr lang="en-US" dirty="0" smtClean="0"/>
+              <a:t>, </a:t>
+            </a:r>
+            <a:r>
+              <a:rPr lang="en-US" dirty="0" err="1" smtClean="0"/>
+              <a:t>lon</a:t>
+            </a:r>
+            <a:r>
+              <a:rPr lang="en-US" dirty="0" smtClean="0"/>
+              <a:t>, </a:t>
+            </a:r>
+            <a:r>
+              <a:rPr lang="en-US" dirty="0" smtClean="0"/>
+              <a:t>label</a:t>
+            </a:r>
+            <a:endParaRPr lang="en-US" dirty="0"/>
+          </a:p>
+        </p:txBody>
+      </p:sp>
+      <p:sp>
+        <p:nvSpPr>
+          <p:cNvPr id="9" name="Rectangle 8"/>
+          <p:cNvSpPr/>
+          <p:nvPr/>
+        </p:nvSpPr>
+        <p:spPr>
+          <a:xfrm>
+            <a:off x="3067664" y="3972901"/>
+            <a:ext cx="3106993" cy="801329"/>
+          </a:xfrm>
+          <a:prstGeom prst="rect">
+            <a:avLst/>
+          </a:prstGeom>
+        </p:spPr>
+        <p:style>
+          <a:lnRef idx="1">
+            <a:schemeClr val="accent1"/>
+          </a:lnRef>
+          <a:fillRef idx="3">
+            <a:schemeClr val="accent1"/>
+          </a:fillRef>
+          <a:effectRef idx="2">
+            <a:schemeClr val="accent1"/>
+          </a:effectRef>
+          <a:fontRef idx="minor">
+            <a:schemeClr val="lt1"/>
+          </a:fontRef>
+        </p:style>
+        <p:txBody>
+          <a:bodyPr rtlCol="0" anchor="ctr"/>
+          <a:lstStyle/>
+          <a:p>
+            <a:pPr algn="ctr"/>
+            <a:r>
+              <a:rPr lang="en-US" dirty="0" smtClean="0"/>
+              <a:t>Pollynet_processing_config_history.txt</a:t>
+            </a:r>
+            <a:endParaRPr lang="en-US" dirty="0"/>
+          </a:p>
+        </p:txBody>
+      </p:sp>
+      <p:sp>
+        <p:nvSpPr>
+          <p:cNvPr id="10" name="TextBox 9"/>
+          <p:cNvSpPr txBox="1"/>
+          <p:nvPr/>
+        </p:nvSpPr>
+        <p:spPr>
+          <a:xfrm>
+            <a:off x="6253316" y="3911900"/>
+            <a:ext cx="3991897" cy="923330"/>
+          </a:xfrm>
+          <a:prstGeom prst="rect">
+            <a:avLst/>
+          </a:prstGeom>
+          <a:noFill/>
+        </p:spPr>
+        <p:txBody>
+          <a:bodyPr wrap="square" rtlCol="0">
+            <a:spAutoFit/>
+          </a:bodyPr>
+          <a:lstStyle/>
+          <a:p>
+            <a:r>
+              <a:rPr lang="en-US" dirty="0" smtClean="0"/>
+              <a:t>Search the processing module and </a:t>
+            </a:r>
+            <a:r>
+              <a:rPr lang="en-US" dirty="0" err="1" smtClean="0"/>
+              <a:t>config</a:t>
+            </a:r>
+            <a:r>
+              <a:rPr lang="en-US" dirty="0" smtClean="0"/>
+              <a:t> file. (Each </a:t>
+            </a:r>
+            <a:r>
+              <a:rPr lang="en-US" dirty="0" err="1" smtClean="0"/>
+              <a:t>polly</a:t>
+            </a:r>
+            <a:r>
+              <a:rPr lang="en-US" dirty="0" smtClean="0"/>
+              <a:t> has its own processing module)</a:t>
+            </a:r>
+            <a:endParaRPr lang="en-US" dirty="0"/>
+          </a:p>
+        </p:txBody>
+      </p:sp>
+      <p:sp>
+        <p:nvSpPr>
+          <p:cNvPr id="11" name="Left Brace 10"/>
+          <p:cNvSpPr/>
+          <p:nvPr/>
+        </p:nvSpPr>
+        <p:spPr>
+          <a:xfrm>
+            <a:off x="2782529" y="3077497"/>
+            <a:ext cx="73742" cy="1480735"/>
+          </a:xfrm>
+          <a:prstGeom prst="leftBrace">
+            <a:avLst/>
+          </a:prstGeom>
+        </p:spPr>
+        <p:style>
+          <a:lnRef idx="2">
+            <a:schemeClr val="accent1"/>
+          </a:lnRef>
+          <a:fillRef idx="0">
+            <a:schemeClr val="accent1"/>
+          </a:fillRef>
+          <a:effectRef idx="1">
+            <a:schemeClr val="accent1"/>
+          </a:effectRef>
+          <a:fontRef idx="minor">
+            <a:schemeClr val="tx1"/>
+          </a:fontRef>
+        </p:style>
+        <p:txBody>
+          <a:bodyPr rtlCol="0" anchor="ctr"/>
+          <a:lstStyle/>
+          <a:p>
+            <a:pPr algn="ctr"/>
+            <a:endParaRPr lang="en-US"/>
+          </a:p>
+        </p:txBody>
+      </p:sp>
+      <p:sp>
+        <p:nvSpPr>
+          <p:cNvPr id="12" name="Rectangle 11"/>
+          <p:cNvSpPr/>
+          <p:nvPr/>
+        </p:nvSpPr>
+        <p:spPr>
+          <a:xfrm>
+            <a:off x="2428567" y="5328338"/>
+            <a:ext cx="4965291" cy="934064"/>
+          </a:xfrm>
+          <a:prstGeom prst="rect">
+            <a:avLst/>
+          </a:prstGeom>
+        </p:spPr>
+        <p:style>
+          <a:lnRef idx="1">
+            <a:schemeClr val="accent1"/>
+          </a:lnRef>
+          <a:fillRef idx="3">
+            <a:schemeClr val="accent1"/>
+          </a:fillRef>
+          <a:effectRef idx="2">
+            <a:schemeClr val="accent1"/>
+          </a:effectRef>
+          <a:fontRef idx="minor">
+            <a:schemeClr val="lt1"/>
+          </a:fontRef>
+        </p:style>
+        <p:txBody>
+          <a:bodyPr rtlCol="0" anchor="ctr"/>
+          <a:lstStyle/>
+          <a:p>
+            <a:pPr algn="ctr"/>
+            <a:r>
+              <a:rPr lang="en-US" dirty="0" smtClean="0"/>
+              <a:t>Load the </a:t>
+            </a:r>
+            <a:r>
+              <a:rPr lang="en-US" dirty="0" err="1" smtClean="0"/>
+              <a:t>polly</a:t>
+            </a:r>
+            <a:r>
+              <a:rPr lang="en-US" dirty="0" smtClean="0"/>
+              <a:t> </a:t>
+            </a:r>
+            <a:r>
+              <a:rPr lang="en-US" dirty="0" err="1" smtClean="0"/>
+              <a:t>config</a:t>
+            </a:r>
+            <a:r>
+              <a:rPr lang="en-US" dirty="0" smtClean="0"/>
+              <a:t> according the ‘Pollynet_processing_config_history.txt’ </a:t>
+            </a:r>
+            <a:r>
+              <a:rPr lang="en-US" dirty="0" smtClean="0"/>
+              <a:t>and activate the processing module</a:t>
+            </a:r>
+            <a:endParaRPr lang="en-US" dirty="0"/>
+          </a:p>
+        </p:txBody>
+      </p:sp>
+      <p:sp>
+        <p:nvSpPr>
+          <p:cNvPr id="13" name="Down Arrow 12"/>
+          <p:cNvSpPr/>
+          <p:nvPr/>
+        </p:nvSpPr>
+        <p:spPr>
+          <a:xfrm>
+            <a:off x="4336026" y="4887365"/>
+            <a:ext cx="324464" cy="340455"/>
+          </a:xfrm>
+          <a:prstGeom prst="downArrow">
+            <a:avLst/>
+          </a:prstGeom>
+        </p:spPr>
+        <p:style>
+          <a:lnRef idx="1">
+            <a:schemeClr val="accent1"/>
+          </a:lnRef>
+          <a:fillRef idx="3">
+            <a:schemeClr val="accent1"/>
+          </a:fillRef>
+          <a:effectRef idx="2">
+            <a:schemeClr val="accent1"/>
+          </a:effectRef>
+          <a:fontRef idx="minor">
+            <a:schemeClr val="lt1"/>
+          </a:fontRef>
+        </p:style>
+        <p:txBody>
+          <a:bodyPr rtlCol="0" anchor="ctr"/>
+          <a:lstStyle/>
+          <a:p>
+            <a:pPr algn="ctr"/>
+            <a:endParaRPr lang="en-US"/>
+          </a:p>
+        </p:txBody>
+      </p:sp>
+    </p:spTree>
+    <p:extLst>
+      <p:ext uri="{BB962C8B-B14F-4D97-AF65-F5344CB8AC3E}">
+        <p14:creationId xmlns:p14="http://schemas.microsoft.com/office/powerpoint/2010/main" val="1241123231"/>
+      </p:ext>
+    </p:extLst>
+  </p:cSld>
+  <p:clrMapOvr>
+    <a:masterClrMapping/>
+  </p:clrMapOvr>
+  <p:timing>
+    <p:tnLst>
+      <p:par>
+        <p:cTn id="1" dur="indefinite" restart="never" nodeType="tmRoot"/>
+      </p:par>
+    </p:tnLst>
+  </p:timing>
+</p:sld>
+</file>
+
+<file path=ppt/slides/slide7.xml><?xml version="1.0" encoding="utf-8"?>
+<p:sld xmlns:a="http://schemas.openxmlformats.org/drawingml/2006/main" xmlns:r="http://schemas.openxmlformats.org/officeDocument/2006/relationships" xmlns:p="http://schemas.openxmlformats.org/presentationml/2006/main">
+  <p:cSld>
+    <p:spTree>
+      <p:nvGrpSpPr>
+        <p:cNvPr id="1" name=""/>
+        <p:cNvGrpSpPr/>
+        <p:nvPr/>
+      </p:nvGrpSpPr>
+      <p:grpSpPr>
+        <a:xfrm>
+          <a:off x="0" y="0"/>
+          <a:ext cx="0" cy="0"/>
+          <a:chOff x="0" y="0"/>
+          <a:chExt cx="0" cy="0"/>
+        </a:xfrm>
+      </p:grpSpPr>
+      <p:sp>
+        <p:nvSpPr>
+          <p:cNvPr id="2" name="Title 1"/>
+          <p:cNvSpPr>
+            <a:spLocks noGrp="1"/>
+          </p:cNvSpPr>
+          <p:nvPr>
+            <p:ph type="title"/>
+          </p:nvPr>
+        </p:nvSpPr>
+        <p:spPr/>
+        <p:txBody>
+          <a:bodyPr/>
+          <a:lstStyle/>
+          <a:p>
+            <a:r>
               <a:rPr lang="en-US" dirty="0"/>
               <a:t>Rayleigh Fit</a:t>
             </a:r>
@@ -9517,7 +10751,7 @@
 </p:sld>
 </file>
 
-<file path=ppt/slides/slide7.xml><?xml version="1.0" encoding="utf-8"?>
+<file path=ppt/slides/slide8.xml><?xml version="1.0" encoding="utf-8"?>
 <p:sld xmlns:a="http://schemas.openxmlformats.org/drawingml/2006/main" xmlns:r="http://schemas.openxmlformats.org/officeDocument/2006/relationships" xmlns:p="http://schemas.openxmlformats.org/presentationml/2006/main">
   <p:cSld>
     <p:spTree>
@@ -12109,7 +13343,7 @@
 </p:sld>
 </file>
 
-<file path=ppt/slides/slide8.xml><?xml version="1.0" encoding="utf-8"?>
+<file path=ppt/slides/slide9.xml><?xml version="1.0" encoding="utf-8"?>
 <p:sld xmlns:a="http://schemas.openxmlformats.org/drawingml/2006/main" xmlns:r="http://schemas.openxmlformats.org/officeDocument/2006/relationships" xmlns:p="http://schemas.openxmlformats.org/presentationml/2006/main">
   <p:cSld>
     <p:spTree>
@@ -14421,786 +15655,6 @@
 </p:sld>
 </file>
 
-<file path=ppt/slides/slide9.xml><?xml version="1.0" encoding="utf-8"?>
-<p:sld xmlns:a="http://schemas.openxmlformats.org/drawingml/2006/main" xmlns:r="http://schemas.openxmlformats.org/officeDocument/2006/relationships" xmlns:p="http://schemas.openxmlformats.org/presentationml/2006/main">
-  <p:cSld>
-    <p:spTree>
-      <p:nvGrpSpPr>
-        <p:cNvPr id="1" name=""/>
-        <p:cNvGrpSpPr/>
-        <p:nvPr/>
-      </p:nvGrpSpPr>
-      <p:grpSpPr>
-        <a:xfrm>
-          <a:off x="0" y="0"/>
-          <a:ext cx="0" cy="0"/>
-          <a:chOff x="0" y="0"/>
-          <a:chExt cx="0" cy="0"/>
-        </a:xfrm>
-      </p:grpSpPr>
-      <p:sp>
-        <p:nvSpPr>
-          <p:cNvPr id="2" name="Title 1"/>
-          <p:cNvSpPr>
-            <a:spLocks noGrp="1"/>
-          </p:cNvSpPr>
-          <p:nvPr>
-            <p:ph type="title"/>
-          </p:nvPr>
-        </p:nvSpPr>
-        <p:spPr/>
-        <p:txBody>
-          <a:bodyPr/>
-          <a:lstStyle/>
-          <a:p>
-            <a:r>
-              <a:rPr lang="en-US" altLang="zh-CN" dirty="0" smtClean="0"/>
-              <a:t>Shortage of sliding fixed window </a:t>
-            </a:r>
-            <a:endParaRPr lang="en-US" dirty="0"/>
-          </a:p>
-        </p:txBody>
-      </p:sp>
-      <p:sp>
-        <p:nvSpPr>
-          <p:cNvPr id="10" name="Text Placeholder 9"/>
-          <p:cNvSpPr>
-            <a:spLocks noGrp="1"/>
-          </p:cNvSpPr>
-          <p:nvPr>
-            <p:ph type="body" sz="quarter" idx="18"/>
-          </p:nvPr>
-        </p:nvSpPr>
-        <p:spPr/>
-        <p:txBody>
-          <a:bodyPr/>
-          <a:lstStyle/>
-          <a:p>
-            <a:endParaRPr lang="en-US"/>
-          </a:p>
-        </p:txBody>
-      </p:sp>
-      <p:grpSp>
-        <p:nvGrpSpPr>
-          <p:cNvPr id="5" name="Group 4"/>
-          <p:cNvGrpSpPr/>
-          <p:nvPr/>
-        </p:nvGrpSpPr>
-        <p:grpSpPr>
-          <a:xfrm>
-            <a:off x="1998408" y="1690688"/>
-            <a:ext cx="3309781" cy="4543425"/>
-            <a:chOff x="838200" y="1690688"/>
-            <a:chExt cx="3309781" cy="4543425"/>
-          </a:xfrm>
-        </p:grpSpPr>
-        <p:pic>
-          <p:nvPicPr>
-            <p:cNvPr id="3" name="Picture 2"/>
-            <p:cNvPicPr>
-              <a:picLocks noChangeAspect="1"/>
-            </p:cNvPicPr>
-            <p:nvPr/>
-          </p:nvPicPr>
-          <p:blipFill>
-            <a:blip r:embed="rId2"/>
-            <a:stretch>
-              <a:fillRect/>
-            </a:stretch>
-          </p:blipFill>
-          <p:spPr>
-            <a:xfrm>
-              <a:off x="1023781" y="1690688"/>
-              <a:ext cx="3124200" cy="4543425"/>
-            </a:xfrm>
-            <a:prstGeom prst="rect">
-              <a:avLst/>
-            </a:prstGeom>
-          </p:spPr>
-        </p:pic>
-        <p:pic>
-          <p:nvPicPr>
-            <p:cNvPr id="4" name="Picture 3"/>
-            <p:cNvPicPr>
-              <a:picLocks noChangeAspect="1"/>
-            </p:cNvPicPr>
-            <p:nvPr/>
-          </p:nvPicPr>
-          <p:blipFill rotWithShape="1">
-            <a:blip r:embed="rId3"/>
-            <a:srcRect l="1" r="13306" b="1957"/>
-            <a:stretch/>
-          </p:blipFill>
-          <p:spPr>
-            <a:xfrm>
-              <a:off x="838200" y="1690688"/>
-              <a:ext cx="198181" cy="4510549"/>
-            </a:xfrm>
-            <a:prstGeom prst="rect">
-              <a:avLst/>
-            </a:prstGeom>
-          </p:spPr>
-        </p:pic>
-      </p:grpSp>
-      <p:sp>
-        <p:nvSpPr>
-          <p:cNvPr id="6" name="Rectangle 5"/>
-          <p:cNvSpPr/>
-          <p:nvPr/>
-        </p:nvSpPr>
-        <p:spPr>
-          <a:xfrm>
-            <a:off x="1656735" y="5112774"/>
-            <a:ext cx="4178708" cy="491613"/>
-          </a:xfrm>
-          <a:prstGeom prst="rect">
-            <a:avLst/>
-          </a:prstGeom>
-          <a:noFill/>
-          <a:ln w="38100">
-            <a:solidFill>
-              <a:schemeClr val="accent6"/>
-            </a:solidFill>
-          </a:ln>
-        </p:spPr>
-        <p:style>
-          <a:lnRef idx="2">
-            <a:schemeClr val="accent1">
-              <a:shade val="50000"/>
-            </a:schemeClr>
-          </a:lnRef>
-          <a:fillRef idx="1">
-            <a:schemeClr val="accent1"/>
-          </a:fillRef>
-          <a:effectRef idx="0">
-            <a:schemeClr val="accent1"/>
-          </a:effectRef>
-          <a:fontRef idx="minor">
-            <a:schemeClr val="lt1"/>
-          </a:fontRef>
-        </p:style>
-        <p:txBody>
-          <a:bodyPr rtlCol="0" anchor="ctr"/>
-          <a:lstStyle/>
-          <a:p>
-            <a:pPr algn="ctr"/>
-            <a:endParaRPr lang="en-US"/>
-          </a:p>
-        </p:txBody>
-      </p:sp>
-      <p:sp>
-        <p:nvSpPr>
-          <p:cNvPr id="7" name="TextBox 6"/>
-          <p:cNvSpPr txBox="1"/>
-          <p:nvPr/>
-        </p:nvSpPr>
-        <p:spPr>
-          <a:xfrm>
-            <a:off x="6049295" y="3648218"/>
-            <a:ext cx="4563398" cy="1200329"/>
-          </a:xfrm>
-          <a:prstGeom prst="rect">
-            <a:avLst/>
-          </a:prstGeom>
-          <a:noFill/>
-          <a:ln>
-            <a:solidFill>
-              <a:schemeClr val="accent6"/>
-            </a:solidFill>
-          </a:ln>
-        </p:spPr>
-        <p:txBody>
-          <a:bodyPr wrap="square" rtlCol="0">
-            <a:spAutoFit/>
-          </a:bodyPr>
-          <a:lstStyle/>
-          <a:p>
-            <a:r>
-              <a:rPr lang="en-US" dirty="0" smtClean="0"/>
-              <a:t>Omission: This possible interval will not be found if a large fixed window (like 1 km) was used, since the width of aerosol-free area is only 450m.</a:t>
-            </a:r>
-            <a:endParaRPr lang="en-US" dirty="0"/>
-          </a:p>
-        </p:txBody>
-      </p:sp>
-      <p:sp>
-        <p:nvSpPr>
-          <p:cNvPr id="9" name="TextBox 8"/>
-          <p:cNvSpPr txBox="1"/>
-          <p:nvPr/>
-        </p:nvSpPr>
-        <p:spPr>
-          <a:xfrm>
-            <a:off x="6049295" y="2583286"/>
-            <a:ext cx="4563398" cy="646331"/>
-          </a:xfrm>
-          <a:prstGeom prst="rect">
-            <a:avLst/>
-          </a:prstGeom>
-          <a:noFill/>
-          <a:ln>
-            <a:solidFill>
-              <a:schemeClr val="accent6"/>
-            </a:solidFill>
-          </a:ln>
-        </p:spPr>
-        <p:txBody>
-          <a:bodyPr wrap="square" rtlCol="0">
-            <a:spAutoFit/>
-          </a:bodyPr>
-          <a:lstStyle/>
-          <a:p>
-            <a:r>
-              <a:rPr lang="en-US" dirty="0" smtClean="0"/>
-              <a:t>More computation: all the sub-areas with a fixed width will be tested.</a:t>
-            </a:r>
-            <a:endParaRPr lang="en-US" dirty="0"/>
-          </a:p>
-        </p:txBody>
-      </p:sp>
-      <p:sp>
-        <p:nvSpPr>
-          <p:cNvPr id="16" name="Rectangle 15"/>
-          <p:cNvSpPr/>
-          <p:nvPr/>
-        </p:nvSpPr>
-        <p:spPr>
-          <a:xfrm>
-            <a:off x="1656735" y="4970206"/>
-            <a:ext cx="4178708" cy="491613"/>
-          </a:xfrm>
-          <a:prstGeom prst="rect">
-            <a:avLst/>
-          </a:prstGeom>
-          <a:noFill/>
-          <a:ln w="38100">
-            <a:solidFill>
-              <a:schemeClr val="accent6"/>
-            </a:solidFill>
-          </a:ln>
-        </p:spPr>
-        <p:style>
-          <a:lnRef idx="2">
-            <a:schemeClr val="accent1">
-              <a:shade val="50000"/>
-            </a:schemeClr>
-          </a:lnRef>
-          <a:fillRef idx="1">
-            <a:schemeClr val="accent1"/>
-          </a:fillRef>
-          <a:effectRef idx="0">
-            <a:schemeClr val="accent1"/>
-          </a:effectRef>
-          <a:fontRef idx="minor">
-            <a:schemeClr val="lt1"/>
-          </a:fontRef>
-        </p:style>
-        <p:txBody>
-          <a:bodyPr rtlCol="0" anchor="ctr"/>
-          <a:lstStyle/>
-          <a:p>
-            <a:pPr algn="ctr"/>
-            <a:endParaRPr lang="en-US"/>
-          </a:p>
-        </p:txBody>
-      </p:sp>
-      <p:sp>
-        <p:nvSpPr>
-          <p:cNvPr id="17" name="Rectangle 16"/>
-          <p:cNvSpPr/>
-          <p:nvPr/>
-        </p:nvSpPr>
-        <p:spPr>
-          <a:xfrm>
-            <a:off x="1656735" y="4787541"/>
-            <a:ext cx="4178708" cy="491613"/>
-          </a:xfrm>
-          <a:prstGeom prst="rect">
-            <a:avLst/>
-          </a:prstGeom>
-          <a:noFill/>
-          <a:ln w="38100">
-            <a:solidFill>
-              <a:schemeClr val="accent6"/>
-            </a:solidFill>
-          </a:ln>
-        </p:spPr>
-        <p:style>
-          <a:lnRef idx="2">
-            <a:schemeClr val="accent1">
-              <a:shade val="50000"/>
-            </a:schemeClr>
-          </a:lnRef>
-          <a:fillRef idx="1">
-            <a:schemeClr val="accent1"/>
-          </a:fillRef>
-          <a:effectRef idx="0">
-            <a:schemeClr val="accent1"/>
-          </a:effectRef>
-          <a:fontRef idx="minor">
-            <a:schemeClr val="lt1"/>
-          </a:fontRef>
-        </p:style>
-        <p:txBody>
-          <a:bodyPr rtlCol="0" anchor="ctr"/>
-          <a:lstStyle/>
-          <a:p>
-            <a:pPr algn="ctr"/>
-            <a:endParaRPr lang="en-US"/>
-          </a:p>
-        </p:txBody>
-      </p:sp>
-      <p:sp>
-        <p:nvSpPr>
-          <p:cNvPr id="18" name="Rectangle 17"/>
-          <p:cNvSpPr/>
-          <p:nvPr/>
-        </p:nvSpPr>
-        <p:spPr>
-          <a:xfrm>
-            <a:off x="1656735" y="3864076"/>
-            <a:ext cx="4178708" cy="491613"/>
-          </a:xfrm>
-          <a:prstGeom prst="rect">
-            <a:avLst/>
-          </a:prstGeom>
-          <a:noFill/>
-          <a:ln w="38100">
-            <a:solidFill>
-              <a:schemeClr val="accent6"/>
-            </a:solidFill>
-          </a:ln>
-        </p:spPr>
-        <p:style>
-          <a:lnRef idx="2">
-            <a:schemeClr val="accent1">
-              <a:shade val="50000"/>
-            </a:schemeClr>
-          </a:lnRef>
-          <a:fillRef idx="1">
-            <a:schemeClr val="accent1"/>
-          </a:fillRef>
-          <a:effectRef idx="0">
-            <a:schemeClr val="accent1"/>
-          </a:effectRef>
-          <a:fontRef idx="minor">
-            <a:schemeClr val="lt1"/>
-          </a:fontRef>
-        </p:style>
-        <p:txBody>
-          <a:bodyPr rtlCol="0" anchor="ctr"/>
-          <a:lstStyle/>
-          <a:p>
-            <a:pPr algn="ctr"/>
-            <a:endParaRPr lang="en-US"/>
-          </a:p>
-        </p:txBody>
-      </p:sp>
-    </p:spTree>
-    <p:extLst>
-      <p:ext uri="{BB962C8B-B14F-4D97-AF65-F5344CB8AC3E}">
-        <p14:creationId xmlns:p14="http://schemas.microsoft.com/office/powerpoint/2010/main" val="4088041726"/>
-      </p:ext>
-    </p:extLst>
-  </p:cSld>
-  <p:clrMapOvr>
-    <a:masterClrMapping/>
-  </p:clrMapOvr>
-  <p:timing>
-    <p:tnLst>
-      <p:par>
-        <p:cTn id="1" dur="indefinite" restart="never" nodeType="tmRoot">
-          <p:childTnLst>
-            <p:seq concurrent="1" nextAc="seek">
-              <p:cTn id="2" dur="indefinite" nodeType="mainSeq">
-                <p:childTnLst>
-                  <p:par>
-                    <p:cTn id="3" fill="hold">
-                      <p:stCondLst>
-                        <p:cond delay="indefinite"/>
-                      </p:stCondLst>
-                      <p:childTnLst>
-                        <p:par>
-                          <p:cTn id="4" fill="hold">
-                            <p:stCondLst>
-                              <p:cond delay="0"/>
-                            </p:stCondLst>
-                            <p:childTnLst>
-                              <p:par>
-                                <p:cTn id="5" presetID="1" presetClass="entr" presetSubtype="0" fill="hold" grpId="0" nodeType="clickEffect">
-                                  <p:stCondLst>
-                                    <p:cond delay="0"/>
-                                  </p:stCondLst>
-                                  <p:childTnLst>
-                                    <p:set>
-                                      <p:cBhvr>
-                                        <p:cTn id="6" dur="1" fill="hold">
-                                          <p:stCondLst>
-                                            <p:cond delay="0"/>
-                                          </p:stCondLst>
-                                        </p:cTn>
-                                        <p:tgtEl>
-                                          <p:spTgt spid="6"/>
-                                        </p:tgtEl>
-                                        <p:attrNameLst>
-                                          <p:attrName>style.visibility</p:attrName>
-                                        </p:attrNameLst>
-                                      </p:cBhvr>
-                                      <p:to>
-                                        <p:strVal val="visible"/>
-                                      </p:to>
-                                    </p:set>
-                                  </p:childTnLst>
-                                </p:cTn>
-                              </p:par>
-                            </p:childTnLst>
-                          </p:cTn>
-                        </p:par>
-                      </p:childTnLst>
-                    </p:cTn>
-                  </p:par>
-                  <p:par>
-                    <p:cTn id="7" fill="hold">
-                      <p:stCondLst>
-                        <p:cond delay="indefinite"/>
-                      </p:stCondLst>
-                      <p:childTnLst>
-                        <p:par>
-                          <p:cTn id="8" fill="hold">
-                            <p:stCondLst>
-                              <p:cond delay="0"/>
-                            </p:stCondLst>
-                            <p:childTnLst>
-                              <p:par>
-                                <p:cTn id="9" presetID="1" presetClass="exit" presetSubtype="0" fill="hold" grpId="1" nodeType="clickEffect">
-                                  <p:stCondLst>
-                                    <p:cond delay="0"/>
-                                  </p:stCondLst>
-                                  <p:childTnLst>
-                                    <p:set>
-                                      <p:cBhvr>
-                                        <p:cTn id="10" dur="1" fill="hold">
-                                          <p:stCondLst>
-                                            <p:cond delay="0"/>
-                                          </p:stCondLst>
-                                        </p:cTn>
-                                        <p:tgtEl>
-                                          <p:spTgt spid="6"/>
-                                        </p:tgtEl>
-                                        <p:attrNameLst>
-                                          <p:attrName>style.visibility</p:attrName>
-                                        </p:attrNameLst>
-                                      </p:cBhvr>
-                                      <p:to>
-                                        <p:strVal val="hidden"/>
-                                      </p:to>
-                                    </p:set>
-                                  </p:childTnLst>
-                                </p:cTn>
-                              </p:par>
-                              <p:par>
-                                <p:cTn id="11" presetID="1" presetClass="entr" presetSubtype="0" fill="hold" grpId="0" nodeType="withEffect">
-                                  <p:stCondLst>
-                                    <p:cond delay="0"/>
-                                  </p:stCondLst>
-                                  <p:childTnLst>
-                                    <p:set>
-                                      <p:cBhvr>
-                                        <p:cTn id="12" dur="1" fill="hold">
-                                          <p:stCondLst>
-                                            <p:cond delay="0"/>
-                                          </p:stCondLst>
-                                        </p:cTn>
-                                        <p:tgtEl>
-                                          <p:spTgt spid="16"/>
-                                        </p:tgtEl>
-                                        <p:attrNameLst>
-                                          <p:attrName>style.visibility</p:attrName>
-                                        </p:attrNameLst>
-                                      </p:cBhvr>
-                                      <p:to>
-                                        <p:strVal val="visible"/>
-                                      </p:to>
-                                    </p:set>
-                                  </p:childTnLst>
-                                </p:cTn>
-                              </p:par>
-                            </p:childTnLst>
-                          </p:cTn>
-                        </p:par>
-                      </p:childTnLst>
-                    </p:cTn>
-                  </p:par>
-                  <p:par>
-                    <p:cTn id="13" fill="hold">
-                      <p:stCondLst>
-                        <p:cond delay="indefinite"/>
-                      </p:stCondLst>
-                      <p:childTnLst>
-                        <p:par>
-                          <p:cTn id="14" fill="hold">
-                            <p:stCondLst>
-                              <p:cond delay="0"/>
-                            </p:stCondLst>
-                            <p:childTnLst>
-                              <p:par>
-                                <p:cTn id="15" presetID="1" presetClass="exit" presetSubtype="0" fill="hold" grpId="1" nodeType="clickEffect">
-                                  <p:stCondLst>
-                                    <p:cond delay="0"/>
-                                  </p:stCondLst>
-                                  <p:childTnLst>
-                                    <p:set>
-                                      <p:cBhvr>
-                                        <p:cTn id="16" dur="1" fill="hold">
-                                          <p:stCondLst>
-                                            <p:cond delay="0"/>
-                                          </p:stCondLst>
-                                        </p:cTn>
-                                        <p:tgtEl>
-                                          <p:spTgt spid="16"/>
-                                        </p:tgtEl>
-                                        <p:attrNameLst>
-                                          <p:attrName>style.visibility</p:attrName>
-                                        </p:attrNameLst>
-                                      </p:cBhvr>
-                                      <p:to>
-                                        <p:strVal val="hidden"/>
-                                      </p:to>
-                                    </p:set>
-                                  </p:childTnLst>
-                                </p:cTn>
-                              </p:par>
-                              <p:par>
-                                <p:cTn id="17" presetID="1" presetClass="entr" presetSubtype="0" fill="hold" grpId="0" nodeType="withEffect">
-                                  <p:stCondLst>
-                                    <p:cond delay="0"/>
-                                  </p:stCondLst>
-                                  <p:childTnLst>
-                                    <p:set>
-                                      <p:cBhvr>
-                                        <p:cTn id="18" dur="1" fill="hold">
-                                          <p:stCondLst>
-                                            <p:cond delay="0"/>
-                                          </p:stCondLst>
-                                        </p:cTn>
-                                        <p:tgtEl>
-                                          <p:spTgt spid="17"/>
-                                        </p:tgtEl>
-                                        <p:attrNameLst>
-                                          <p:attrName>style.visibility</p:attrName>
-                                        </p:attrNameLst>
-                                      </p:cBhvr>
-                                      <p:to>
-                                        <p:strVal val="visible"/>
-                                      </p:to>
-                                    </p:set>
-                                  </p:childTnLst>
-                                </p:cTn>
-                              </p:par>
-                            </p:childTnLst>
-                          </p:cTn>
-                        </p:par>
-                      </p:childTnLst>
-                    </p:cTn>
-                  </p:par>
-                  <p:par>
-                    <p:cTn id="19" fill="hold">
-                      <p:stCondLst>
-                        <p:cond delay="indefinite"/>
-                      </p:stCondLst>
-                      <p:childTnLst>
-                        <p:par>
-                          <p:cTn id="20" fill="hold">
-                            <p:stCondLst>
-                              <p:cond delay="0"/>
-                            </p:stCondLst>
-                            <p:childTnLst>
-                              <p:par>
-                                <p:cTn id="21" presetID="1" presetClass="exit" presetSubtype="0" fill="hold" grpId="1" nodeType="clickEffect">
-                                  <p:stCondLst>
-                                    <p:cond delay="0"/>
-                                  </p:stCondLst>
-                                  <p:childTnLst>
-                                    <p:set>
-                                      <p:cBhvr>
-                                        <p:cTn id="22" dur="1" fill="hold">
-                                          <p:stCondLst>
-                                            <p:cond delay="0"/>
-                                          </p:stCondLst>
-                                        </p:cTn>
-                                        <p:tgtEl>
-                                          <p:spTgt spid="17"/>
-                                        </p:tgtEl>
-                                        <p:attrNameLst>
-                                          <p:attrName>style.visibility</p:attrName>
-                                        </p:attrNameLst>
-                                      </p:cBhvr>
-                                      <p:to>
-                                        <p:strVal val="hidden"/>
-                                      </p:to>
-                                    </p:set>
-                                  </p:childTnLst>
-                                </p:cTn>
-                              </p:par>
-                              <p:par>
-                                <p:cTn id="23" presetID="1" presetClass="entr" presetSubtype="0" fill="hold" grpId="0" nodeType="withEffect">
-                                  <p:stCondLst>
-                                    <p:cond delay="0"/>
-                                  </p:stCondLst>
-                                  <p:childTnLst>
-                                    <p:set>
-                                      <p:cBhvr>
-                                        <p:cTn id="24" dur="1" fill="hold">
-                                          <p:stCondLst>
-                                            <p:cond delay="0"/>
-                                          </p:stCondLst>
-                                        </p:cTn>
-                                        <p:tgtEl>
-                                          <p:spTgt spid="18"/>
-                                        </p:tgtEl>
-                                        <p:attrNameLst>
-                                          <p:attrName>style.visibility</p:attrName>
-                                        </p:attrNameLst>
-                                      </p:cBhvr>
-                                      <p:to>
-                                        <p:strVal val="visible"/>
-                                      </p:to>
-                                    </p:set>
-                                  </p:childTnLst>
-                                </p:cTn>
-                              </p:par>
-                            </p:childTnLst>
-                          </p:cTn>
-                        </p:par>
-                      </p:childTnLst>
-                    </p:cTn>
-                  </p:par>
-                  <p:par>
-                    <p:cTn id="25" fill="hold">
-                      <p:stCondLst>
-                        <p:cond delay="indefinite"/>
-                      </p:stCondLst>
-                      <p:childTnLst>
-                        <p:par>
-                          <p:cTn id="26" fill="hold">
-                            <p:stCondLst>
-                              <p:cond delay="0"/>
-                            </p:stCondLst>
-                            <p:childTnLst>
-                              <p:par>
-                                <p:cTn id="27" presetID="1" presetClass="entr" presetSubtype="0" fill="hold" grpId="0" nodeType="clickEffect">
-                                  <p:stCondLst>
-                                    <p:cond delay="0"/>
-                                  </p:stCondLst>
-                                  <p:childTnLst>
-                                    <p:set>
-                                      <p:cBhvr>
-                                        <p:cTn id="28" dur="1" fill="hold">
-                                          <p:stCondLst>
-                                            <p:cond delay="0"/>
-                                          </p:stCondLst>
-                                        </p:cTn>
-                                        <p:tgtEl>
-                                          <p:spTgt spid="9"/>
-                                        </p:tgtEl>
-                                        <p:attrNameLst>
-                                          <p:attrName>style.visibility</p:attrName>
-                                        </p:attrNameLst>
-                                      </p:cBhvr>
-                                      <p:to>
-                                        <p:strVal val="visible"/>
-                                      </p:to>
-                                    </p:set>
-                                  </p:childTnLst>
-                                </p:cTn>
-                              </p:par>
-                            </p:childTnLst>
-                          </p:cTn>
-                        </p:par>
-                      </p:childTnLst>
-                    </p:cTn>
-                  </p:par>
-                  <p:par>
-                    <p:cTn id="29" fill="hold">
-                      <p:stCondLst>
-                        <p:cond delay="indefinite"/>
-                      </p:stCondLst>
-                      <p:childTnLst>
-                        <p:par>
-                          <p:cTn id="30" fill="hold">
-                            <p:stCondLst>
-                              <p:cond delay="0"/>
-                            </p:stCondLst>
-                            <p:childTnLst>
-                              <p:par>
-                                <p:cTn id="31" presetID="1" presetClass="entr" presetSubtype="0" fill="hold" grpId="0" nodeType="clickEffect">
-                                  <p:stCondLst>
-                                    <p:cond delay="0"/>
-                                  </p:stCondLst>
-                                  <p:childTnLst>
-                                    <p:set>
-                                      <p:cBhvr>
-                                        <p:cTn id="32" dur="1" fill="hold">
-                                          <p:stCondLst>
-                                            <p:cond delay="0"/>
-                                          </p:stCondLst>
-                                        </p:cTn>
-                                        <p:tgtEl>
-                                          <p:spTgt spid="7"/>
-                                        </p:tgtEl>
-                                        <p:attrNameLst>
-                                          <p:attrName>style.visibility</p:attrName>
-                                        </p:attrNameLst>
-                                      </p:cBhvr>
-                                      <p:to>
-                                        <p:strVal val="visible"/>
-                                      </p:to>
-                                    </p:set>
-                                  </p:childTnLst>
-                                </p:cTn>
-                              </p:par>
-                            </p:childTnLst>
-                          </p:cTn>
-                        </p:par>
-                      </p:childTnLst>
-                    </p:cTn>
-                  </p:par>
-                </p:childTnLst>
-              </p:cTn>
-              <p:prevCondLst>
-                <p:cond evt="onPrev" delay="0">
-                  <p:tgtEl>
-                    <p:sldTgt/>
-                  </p:tgtEl>
-                </p:cond>
-              </p:prevCondLst>
-              <p:nextCondLst>
-                <p:cond evt="onNext" delay="0">
-                  <p:tgtEl>
-                    <p:sldTgt/>
-                  </p:tgtEl>
-                </p:cond>
-              </p:nextCondLst>
-            </p:seq>
-          </p:childTnLst>
-        </p:cTn>
-      </p:par>
-    </p:tnLst>
-    <p:bldLst>
-      <p:bldP spid="6" grpId="0" animBg="1"/>
-      <p:bldP spid="6" grpId="1" animBg="1"/>
-      <p:bldP spid="7" grpId="0" animBg="1"/>
-      <p:bldP spid="9" grpId="0" animBg="1"/>
-      <p:bldP spid="16" grpId="0" animBg="1"/>
-      <p:bldP spid="16" grpId="1" animBg="1"/>
-      <p:bldP spid="17" grpId="0" animBg="1"/>
-      <p:bldP spid="17" grpId="1" animBg="1"/>
-      <p:bldP spid="18" grpId="0" animBg="1"/>
-    </p:bldLst>
-  </p:timing>
-</p:sld>
-</file>
-
 <file path=ppt/theme/theme1.xml><?xml version="1.0" encoding="utf-8"?>
 <a:theme xmlns:a="http://schemas.openxmlformats.org/drawingml/2006/main" name="tropos_presentation_16to9">
   <a:themeElements>

</xml_diff>

<commit_message>
Bugfixes: correct the format of water vapor calibration results
</commit_message>
<xml_diff>
--- a/doc/Pollynet_Processing_Chain.pptx
+++ b/doc/Pollynet_Processing_Chain.pptx
@@ -5,7 +5,7 @@
     <p:sldMasterId id="2147483672" r:id="rId1"/>
   </p:sldMasterIdLst>
   <p:notesMasterIdLst>
-    <p:notesMasterId r:id="rId22"/>
+    <p:notesMasterId r:id="rId23"/>
   </p:notesMasterIdLst>
   <p:sldIdLst>
     <p:sldId id="269" r:id="rId2"/>
@@ -28,6 +28,7 @@
     <p:sldId id="267" r:id="rId19"/>
     <p:sldId id="268" r:id="rId20"/>
     <p:sldId id="287" r:id="rId21"/>
+    <p:sldId id="288" r:id="rId22"/>
   </p:sldIdLst>
   <p:sldSz cx="12192000" cy="6858000"/>
   <p:notesSz cx="6858000" cy="9144000"/>
@@ -3178,11 +3179,7 @@
               <a:pPr algn="ctr"/>
               <a:r>
                 <a:rPr lang="en-US" dirty="0" smtClean="0"/>
-                <a:t>p</a:t>
-              </a:r>
-              <a:r>
-                <a:rPr lang="en-US" dirty="0" smtClean="0"/>
-                <a:t>ollynet_places_history_new.txt</a:t>
+                <a:t>pollynet_places_history_new.txt</a:t>
               </a:r>
               <a:endParaRPr lang="en-US" dirty="0"/>
             </a:p>
@@ -3591,7 +3588,6 @@
               <a:rPr lang="en-US" sz="5400" dirty="0"/>
               <a:t>Picasso Structure </a:t>
             </a:r>
-            <a:endParaRPr lang="en-US" sz="5400" dirty="0"/>
           </a:p>
         </p:txBody>
       </p:sp>
@@ -14333,7 +14329,6 @@
               <a:rPr lang="en-US" sz="2800" dirty="0" smtClean="0"/>
               <a:t>Configurations</a:t>
             </a:r>
-            <a:endParaRPr lang="en-US" sz="2800" dirty="0" smtClean="0"/>
           </a:p>
           <a:p>
             <a:pPr marL="514350" indent="-514350">
@@ -14345,11 +14340,7 @@
             </a:pPr>
             <a:r>
               <a:rPr lang="en-US" sz="2800" dirty="0" smtClean="0"/>
-              <a:t>Future </a:t>
-            </a:r>
-            <a:r>
-              <a:rPr lang="en-US" sz="2800" dirty="0" smtClean="0"/>
-              <a:t>Plan</a:t>
+              <a:t>Future Plan</a:t>
             </a:r>
             <a:endParaRPr lang="en-US" sz="2800" dirty="0"/>
           </a:p>
@@ -14491,11 +14482,7 @@
                 <a:pPr algn="ctr"/>
                 <a:r>
                   <a:rPr lang="en-US" dirty="0" smtClean="0"/>
-                  <a:t>p</a:t>
-                </a:r>
-                <a:r>
-                  <a:rPr lang="en-US" dirty="0" smtClean="0"/>
-                  <a:t>ollynet_places_history_new.txt</a:t>
+                  <a:t>pollynet_places_history_new.txt</a:t>
                 </a:r>
                 <a:endParaRPr lang="en-US" dirty="0"/>
               </a:p>
@@ -14924,6 +14911,78 @@
     <p:extLst>
       <p:ext uri="{BB962C8B-B14F-4D97-AF65-F5344CB8AC3E}">
         <p14:creationId xmlns:p14="http://schemas.microsoft.com/office/powerpoint/2010/main" val="1252782217"/>
+      </p:ext>
+    </p:extLst>
+  </p:cSld>
+  <p:clrMapOvr>
+    <a:masterClrMapping/>
+  </p:clrMapOvr>
+</p:sld>
+</file>
+
+<file path=ppt/slides/slide21.xml><?xml version="1.0" encoding="utf-8"?>
+<p:sld xmlns:a="http://schemas.openxmlformats.org/drawingml/2006/main" xmlns:r="http://schemas.openxmlformats.org/officeDocument/2006/relationships" xmlns:p="http://schemas.openxmlformats.org/presentationml/2006/main">
+  <p:cSld>
+    <p:spTree>
+      <p:nvGrpSpPr>
+        <p:cNvPr id="1" name=""/>
+        <p:cNvGrpSpPr/>
+        <p:nvPr/>
+      </p:nvGrpSpPr>
+      <p:grpSpPr>
+        <a:xfrm>
+          <a:off x="0" y="0"/>
+          <a:ext cx="0" cy="0"/>
+          <a:chOff x="0" y="0"/>
+          <a:chExt cx="0" cy="0"/>
+        </a:xfrm>
+      </p:grpSpPr>
+      <p:sp>
+        <p:nvSpPr>
+          <p:cNvPr id="2" name="Title 1"/>
+          <p:cNvSpPr>
+            <a:spLocks noGrp="1"/>
+          </p:cNvSpPr>
+          <p:nvPr>
+            <p:ph type="title"/>
+          </p:nvPr>
+        </p:nvSpPr>
+        <p:spPr/>
+        <p:txBody>
+          <a:bodyPr/>
+          <a:lstStyle/>
+          <a:p>
+            <a:r>
+              <a:rPr lang="en-US" dirty="0" smtClean="0"/>
+              <a:t>Version Control</a:t>
+            </a:r>
+            <a:endParaRPr lang="en-US" dirty="0"/>
+          </a:p>
+        </p:txBody>
+      </p:sp>
+      <p:sp>
+        <p:nvSpPr>
+          <p:cNvPr id="3" name="Text Placeholder 2"/>
+          <p:cNvSpPr>
+            <a:spLocks noGrp="1"/>
+          </p:cNvSpPr>
+          <p:nvPr>
+            <p:ph type="body" sz="quarter" idx="18"/>
+          </p:nvPr>
+        </p:nvSpPr>
+        <p:spPr/>
+        <p:txBody>
+          <a:bodyPr/>
+          <a:lstStyle/>
+          <a:p>
+            <a:endParaRPr lang="en-US"/>
+          </a:p>
+        </p:txBody>
+      </p:sp>
+    </p:spTree>
+    <p:extLst>
+      <p:ext uri="{BB962C8B-B14F-4D97-AF65-F5344CB8AC3E}">
+        <p14:creationId xmlns:p14="http://schemas.microsoft.com/office/powerpoint/2010/main" val="2913014266"/>
       </p:ext>
     </p:extLst>
   </p:cSld>
@@ -16475,17 +16534,8 @@
           <a:p>
             <a:r>
               <a:rPr lang="en-US" dirty="0" smtClean="0"/>
-              <a:t>If </a:t>
-            </a:r>
-            <a:r>
-              <a:rPr lang="en-US" dirty="0" smtClean="0"/>
-              <a:t>you want to develop new features, we recommend you to pull the ‘dev’ </a:t>
-            </a:r>
-            <a:r>
-              <a:rPr lang="en-US" dirty="0" smtClean="0"/>
-              <a:t>branch as well:</a:t>
-            </a:r>
-            <a:endParaRPr lang="en-US" dirty="0" smtClean="0"/>
+              <a:t>If you want to develop new features, we recommend you to pull the ‘dev’ branch as well:</a:t>
+            </a:r>
           </a:p>
           <a:p>
             <a:r>
@@ -17008,15 +17058,7 @@
             </a:pPr>
             <a:r>
               <a:rPr lang="en-US" sz="1600" dirty="0" smtClean="0"/>
-              <a:t>directories</a:t>
-            </a:r>
-            <a:r>
-              <a:rPr lang="en-US" sz="1600" dirty="0" smtClean="0"/>
-              <a:t>: according to your own requirements</a:t>
-            </a:r>
-            <a:r>
-              <a:rPr lang="en-US" sz="1600" dirty="0" smtClean="0"/>
-              <a:t>. -</a:t>
+              <a:t>directories: according to your own requirements. -</a:t>
             </a:r>
             <a:endParaRPr lang="en-US" sz="1600" dirty="0"/>
           </a:p>
@@ -17184,15 +17226,7 @@
           <a:p>
             <a:r>
               <a:rPr lang="en-US" altLang="zh-CN" sz="1600" dirty="0" smtClean="0"/>
-              <a:t>python 3 folder: </a:t>
-            </a:r>
-            <a:r>
-              <a:rPr lang="en-US" altLang="zh-CN" sz="1600" dirty="0" smtClean="0"/>
-              <a:t>Picasso </a:t>
-            </a:r>
-            <a:r>
-              <a:rPr lang="en-US" altLang="zh-CN" sz="1600" dirty="0" smtClean="0"/>
-              <a:t>uses python3 for data visualization if ‘</a:t>
+              <a:t>python 3 folder: Picasso uses python3 for data visualization if ‘</a:t>
             </a:r>
             <a:r>
               <a:rPr lang="en-US" altLang="zh-CN" sz="1600" dirty="0" err="1" smtClean="0"/>
@@ -17383,15 +17417,7 @@
           <a:p>
             <a:r>
               <a:rPr lang="en-US" sz="2800" b="1" dirty="0" smtClean="0"/>
-              <a:t>Picasso</a:t>
-            </a:r>
-            <a:r>
-              <a:rPr lang="en-US" sz="2800" b="1" dirty="0" smtClean="0"/>
-              <a:t> adds </a:t>
-            </a:r>
-            <a:r>
-              <a:rPr lang="en-US" sz="2800" b="1" dirty="0" smtClean="0"/>
-              <a:t>campaign:</a:t>
+              <a:t>Picasso adds campaign:</a:t>
             </a:r>
             <a:endParaRPr lang="en-US" sz="2800" b="1" dirty="0"/>
           </a:p>
@@ -17639,11 +17665,7 @@
           <a:p>
             <a:r>
               <a:rPr lang="en-US" sz="2800" b="1" dirty="0" smtClean="0"/>
-              <a:t>Picasso</a:t>
-            </a:r>
-            <a:r>
-              <a:rPr lang="en-US" sz="2800" b="1" dirty="0" smtClean="0"/>
-              <a:t> adds </a:t>
+              <a:t>Picasso adds </a:t>
             </a:r>
             <a:r>
               <a:rPr lang="en-US" sz="2800" b="1" dirty="0" err="1" smtClean="0"/>
@@ -18159,15 +18181,7 @@
             </a:r>
             <a:r>
               <a:rPr lang="en-US" dirty="0" smtClean="0"/>
-              <a:t> history file works as a lookup table for </a:t>
-            </a:r>
-            <a:r>
-              <a:rPr lang="en-US" dirty="0" smtClean="0"/>
-              <a:t>Picasso </a:t>
-            </a:r>
-            <a:r>
-              <a:rPr lang="en-US" dirty="0" smtClean="0"/>
-              <a:t>to search the corresponding </a:t>
+              <a:t> history file works as a lookup table for Picasso to search the corresponding </a:t>
             </a:r>
             <a:r>
               <a:rPr lang="en-US" dirty="0" err="1" smtClean="0"/>

</xml_diff>

<commit_message>
Improvement: unify the aspect ratio of target classification plot
</commit_message>
<xml_diff>
--- a/doc/Pollynet_Processing_Chain.pptx
+++ b/doc/Pollynet_Processing_Chain.pptx
@@ -3030,11 +3030,7 @@
           <a:p>
             <a:r>
               <a:rPr lang="en-US" dirty="0" smtClean="0"/>
-              <a:t>Add a new </a:t>
-            </a:r>
-            <a:r>
-              <a:rPr lang="en-US" dirty="0" smtClean="0"/>
-              <a:t>campaign</a:t>
+              <a:t>Add a new campaign</a:t>
             </a:r>
             <a:endParaRPr lang="en-US" dirty="0"/>
           </a:p>
@@ -3427,11 +3423,7 @@
               </a:r>
               <a:r>
                 <a:rPr lang="en-US" dirty="0" smtClean="0"/>
-                <a:t>. </a:t>
-              </a:r>
-              <a:r>
-                <a:rPr lang="en-US" dirty="0" smtClean="0"/>
-                <a:t>New link entry</a:t>
+                <a:t>. New link entry</a:t>
               </a:r>
               <a:endParaRPr lang="en-US" dirty="0"/>
             </a:p>
@@ -3465,11 +3457,7 @@
               </a:r>
               <a:r>
                 <a:rPr lang="en-US" dirty="0" smtClean="0"/>
-                <a:t>. </a:t>
-              </a:r>
-              <a:r>
-                <a:rPr lang="en-US" dirty="0" smtClean="0"/>
-                <a:t>New </a:t>
+                <a:t>. New </a:t>
               </a:r>
               <a:r>
                 <a:rPr lang="en-US" dirty="0" err="1" smtClean="0"/>
@@ -5008,11 +4996,7 @@
             </a:pPr>
             <a:r>
               <a:rPr lang="en-US" sz="2800" dirty="0" smtClean="0"/>
-              <a:t>Download and </a:t>
-            </a:r>
-            <a:r>
-              <a:rPr lang="en-US" sz="2800" dirty="0" smtClean="0"/>
-              <a:t>Setup</a:t>
+              <a:t>Download and Setup</a:t>
             </a:r>
           </a:p>
           <a:p>
@@ -15857,7 +15841,15 @@
           <a:p>
             <a:r>
               <a:rPr lang="en-US" dirty="0" smtClean="0"/>
-              <a:t>Requirements for Picasso</a:t>
+              <a:t>Requirements for </a:t>
+            </a:r>
+            <a:r>
+              <a:rPr lang="en-US" dirty="0" err="1" smtClean="0"/>
+              <a:t>Runing</a:t>
+            </a:r>
+            <a:r>
+              <a:rPr lang="en-US" dirty="0" smtClean="0"/>
+              <a:t> Picasso</a:t>
             </a:r>
             <a:endParaRPr lang="en-US" dirty="0"/>
           </a:p>
@@ -17655,7 +17647,11 @@
               <a:pPr algn="ctr"/>
               <a:r>
                 <a:rPr lang="en-US" dirty="0" smtClean="0"/>
-                <a:t>pollynet_places_history_new.txt</a:t>
+                <a:t>pollynet_history_of_places_</a:t>
+              </a:r>
+              <a:r>
+                <a:rPr lang="en-US" dirty="0" smtClean="0"/>
+                <a:t>new.txt</a:t>
               </a:r>
               <a:endParaRPr lang="en-US" dirty="0"/>
             </a:p>
@@ -17742,10 +17738,6 @@
             <a:p>
               <a:pPr algn="ctr"/>
               <a:r>
-                <a:rPr lang="en-US" dirty="0" smtClean="0"/>
-                <a:t>Load the </a:t>
-              </a:r>
-              <a:r>
                 <a:rPr lang="en-US" dirty="0" err="1" smtClean="0"/>
                 <a:t>polly</a:t>
               </a:r>
@@ -17756,6 +17748,14 @@
               <a:r>
                 <a:rPr lang="en-US" dirty="0" err="1" smtClean="0"/>
                 <a:t>config</a:t>
+              </a:r>
+              <a:r>
+                <a:rPr lang="en-US" dirty="0"/>
+                <a:t> </a:t>
+              </a:r>
+              <a:r>
+                <a:rPr lang="en-US" dirty="0" smtClean="0"/>
+                <a:t>file</a:t>
               </a:r>
               <a:endParaRPr lang="en-US" dirty="0"/>
             </a:p>
@@ -17797,11 +17797,15 @@
               <a:pPr algn="ctr"/>
               <a:r>
                 <a:rPr lang="en-US" dirty="0" err="1" smtClean="0"/>
-                <a:t>pollyxt_xxx</a:t>
+                <a:t>polly</a:t>
               </a:r>
               <a:r>
                 <a:rPr lang="en-US" dirty="0" smtClean="0"/>
-                <a:t> defaults</a:t>
+                <a:t> </a:t>
+              </a:r>
+              <a:r>
+                <a:rPr lang="en-US" dirty="0" smtClean="0"/>
+                <a:t>defaults</a:t>
               </a:r>
               <a:endParaRPr lang="en-US" dirty="0"/>
             </a:p>
@@ -17891,12 +17895,8 @@
             <a:p>
               <a:pPr algn="ctr"/>
               <a:r>
-                <a:rPr lang="en-US" dirty="0" err="1" smtClean="0"/>
-                <a:t>pollyxt_xxx</a:t>
-              </a:r>
-              <a:r>
                 <a:rPr lang="en-US" dirty="0" smtClean="0"/>
-                <a:t> module</a:t>
+                <a:t>Polly processing module</a:t>
               </a:r>
               <a:endParaRPr lang="en-US" dirty="0"/>
             </a:p>
@@ -17946,6 +17946,30 @@
           </a:p>
         </p:txBody>
       </p:sp>
+      <p:pic>
+        <p:nvPicPr>
+          <p:cNvPr id="10" name="Picture 9"/>
+          <p:cNvPicPr>
+            <a:picLocks noChangeAspect="1"/>
+          </p:cNvPicPr>
+          <p:nvPr/>
+        </p:nvPicPr>
+        <p:blipFill>
+          <a:blip r:embed="rId2"/>
+          <a:stretch>
+            <a:fillRect/>
+          </a:stretch>
+        </p:blipFill>
+        <p:spPr>
+          <a:xfrm>
+            <a:off x="1050831" y="3086350"/>
+            <a:ext cx="3192452" cy="3698767"/>
+          </a:xfrm>
+          <a:prstGeom prst="rect">
+            <a:avLst/>
+          </a:prstGeom>
+        </p:spPr>
+      </p:pic>
     </p:spTree>
     <p:extLst>
       <p:ext uri="{BB962C8B-B14F-4D97-AF65-F5344CB8AC3E}">

</xml_diff>

<commit_message>
Note: change the license from MIT to GPL
</commit_message>
<xml_diff>
--- a/doc/Pollynet_Processing_Chain.pptx
+++ b/doc/Pollynet_Processing_Chain.pptx
@@ -9,8 +9,8 @@
   </p:notesMasterIdLst>
   <p:sldIdLst>
     <p:sldId id="269" r:id="rId2"/>
-    <p:sldId id="270" r:id="rId3"/>
-    <p:sldId id="285" r:id="rId4"/>
+    <p:sldId id="285" r:id="rId3"/>
+    <p:sldId id="270" r:id="rId4"/>
     <p:sldId id="284" r:id="rId5"/>
     <p:sldId id="277" r:id="rId6"/>
     <p:sldId id="289" r:id="rId7"/>
@@ -2499,6 +2499,30 @@
           <a:chExt cx="0" cy="0"/>
         </a:xfrm>
       </p:grpSpPr>
+      <p:pic>
+        <p:nvPicPr>
+          <p:cNvPr id="4" name="Picture 3"/>
+          <p:cNvPicPr>
+            <a:picLocks noChangeAspect="1"/>
+          </p:cNvPicPr>
+          <p:nvPr/>
+        </p:nvPicPr>
+        <p:blipFill>
+          <a:blip r:embed="rId2"/>
+          <a:stretch>
+            <a:fillRect/>
+          </a:stretch>
+        </p:blipFill>
+        <p:spPr>
+          <a:xfrm>
+            <a:off x="9544153" y="1308537"/>
+            <a:ext cx="1695537" cy="1695537"/>
+          </a:xfrm>
+          <a:prstGeom prst="rect">
+            <a:avLst/>
+          </a:prstGeom>
+        </p:spPr>
+      </p:pic>
       <p:sp>
         <p:nvSpPr>
           <p:cNvPr id="2" name="Title 1"/>
@@ -2556,6 +2580,299 @@
               <a:t>2019-07-21</a:t>
             </a:r>
             <a:endParaRPr lang="en-US" dirty="0"/>
+          </a:p>
+        </p:txBody>
+      </p:sp>
+      <p:sp>
+        <p:nvSpPr>
+          <p:cNvPr id="5" name="Rectangle 4"/>
+          <p:cNvSpPr/>
+          <p:nvPr/>
+        </p:nvSpPr>
+        <p:spPr>
+          <a:xfrm>
+            <a:off x="3962026" y="2988048"/>
+            <a:ext cx="6144760" cy="923330"/>
+          </a:xfrm>
+          <a:prstGeom prst="rect">
+            <a:avLst/>
+          </a:prstGeom>
+          <a:noFill/>
+        </p:spPr>
+        <p:txBody>
+          <a:bodyPr wrap="none" lIns="91440" tIns="45720" rIns="91440" bIns="45720">
+            <a:spAutoFit/>
+          </a:bodyPr>
+          <a:lstStyle/>
+          <a:p>
+            <a:pPr algn="ctr"/>
+            <a:r>
+              <a:rPr lang="en-US" sz="5400" b="0" cap="none" spc="0" dirty="0" smtClean="0">
+                <a:ln w="0"/>
+                <a:gradFill>
+                  <a:gsLst>
+                    <a:gs pos="0">
+                      <a:schemeClr val="accent5">
+                        <a:lumMod val="50000"/>
+                      </a:schemeClr>
+                    </a:gs>
+                    <a:gs pos="50000">
+                      <a:schemeClr val="accent5"/>
+                    </a:gs>
+                    <a:gs pos="100000">
+                      <a:schemeClr val="accent5">
+                        <a:lumMod val="60000"/>
+                        <a:lumOff val="40000"/>
+                      </a:schemeClr>
+                    </a:gs>
+                  </a:gsLst>
+                  <a:lin ang="5400000"/>
+                </a:gradFill>
+                <a:effectLst>
+                  <a:reflection blurRad="6350" stA="53000" endA="300" endPos="35500" dir="5400000" sy="-90000" algn="bl" rotWithShape="0"/>
+                </a:effectLst>
+              </a:rPr>
+              <a:t>Automate everything</a:t>
+            </a:r>
+            <a:endParaRPr lang="en-US" sz="5400" b="0" cap="none" spc="0" dirty="0">
+              <a:ln w="0"/>
+              <a:gradFill>
+                <a:gsLst>
+                  <a:gs pos="0">
+                    <a:schemeClr val="accent5">
+                      <a:lumMod val="50000"/>
+                    </a:schemeClr>
+                  </a:gs>
+                  <a:gs pos="50000">
+                    <a:schemeClr val="accent5"/>
+                  </a:gs>
+                  <a:gs pos="100000">
+                    <a:schemeClr val="accent5">
+                      <a:lumMod val="60000"/>
+                      <a:lumOff val="40000"/>
+                    </a:schemeClr>
+                  </a:gs>
+                </a:gsLst>
+                <a:lin ang="5400000"/>
+              </a:gradFill>
+              <a:effectLst>
+                <a:reflection blurRad="6350" stA="53000" endA="300" endPos="35500" dir="5400000" sy="-90000" algn="bl" rotWithShape="0"/>
+              </a:effectLst>
+            </a:endParaRPr>
+          </a:p>
+        </p:txBody>
+      </p:sp>
+      <p:sp>
+        <p:nvSpPr>
+          <p:cNvPr id="8" name="Rectangle 7"/>
+          <p:cNvSpPr/>
+          <p:nvPr/>
+        </p:nvSpPr>
+        <p:spPr>
+          <a:xfrm>
+            <a:off x="4267959" y="3782542"/>
+            <a:ext cx="7219733" cy="923330"/>
+          </a:xfrm>
+          <a:prstGeom prst="rect">
+            <a:avLst/>
+          </a:prstGeom>
+          <a:noFill/>
+        </p:spPr>
+        <p:txBody>
+          <a:bodyPr wrap="none" lIns="91440" tIns="45720" rIns="91440" bIns="45720">
+            <a:spAutoFit/>
+          </a:bodyPr>
+          <a:lstStyle/>
+          <a:p>
+            <a:pPr algn="ctr"/>
+            <a:r>
+              <a:rPr lang="en-US" sz="5400" dirty="0" smtClean="0">
+                <a:ln w="0"/>
+                <a:gradFill>
+                  <a:gsLst>
+                    <a:gs pos="0">
+                      <a:schemeClr val="accent5">
+                        <a:lumMod val="50000"/>
+                      </a:schemeClr>
+                    </a:gs>
+                    <a:gs pos="50000">
+                      <a:schemeClr val="accent5"/>
+                    </a:gs>
+                    <a:gs pos="100000">
+                      <a:schemeClr val="accent5">
+                        <a:lumMod val="60000"/>
+                        <a:lumOff val="40000"/>
+                      </a:schemeClr>
+                    </a:gs>
+                  </a:gsLst>
+                  <a:lin ang="5400000"/>
+                </a:gradFill>
+                <a:effectLst>
+                  <a:reflection blurRad="6350" stA="53000" endA="300" endPos="35500" dir="5400000" sy="-90000" algn="bl" rotWithShape="0"/>
+                </a:effectLst>
+              </a:rPr>
+              <a:t>Data Processing </a:t>
+            </a:r>
+            <a:r>
+              <a:rPr lang="en-US" sz="5400" dirty="0">
+                <a:ln w="0"/>
+                <a:gradFill>
+                  <a:gsLst>
+                    <a:gs pos="0">
+                      <a:schemeClr val="accent5">
+                        <a:lumMod val="50000"/>
+                      </a:schemeClr>
+                    </a:gs>
+                    <a:gs pos="50000">
+                      <a:schemeClr val="accent5"/>
+                    </a:gs>
+                    <a:gs pos="100000">
+                      <a:schemeClr val="accent5">
+                        <a:lumMod val="60000"/>
+                        <a:lumOff val="40000"/>
+                      </a:schemeClr>
+                    </a:gs>
+                  </a:gsLst>
+                  <a:lin ang="5400000"/>
+                </a:gradFill>
+                <a:effectLst>
+                  <a:reflection blurRad="6350" stA="53000" endA="300" endPos="35500" dir="5400000" sy="-90000" algn="bl" rotWithShape="0"/>
+                </a:effectLst>
+              </a:rPr>
+              <a:t>P</a:t>
+            </a:r>
+            <a:r>
+              <a:rPr lang="en-US" sz="5400" dirty="0" smtClean="0">
+                <a:ln w="0"/>
+                <a:gradFill>
+                  <a:gsLst>
+                    <a:gs pos="0">
+                      <a:schemeClr val="accent5">
+                        <a:lumMod val="50000"/>
+                      </a:schemeClr>
+                    </a:gs>
+                    <a:gs pos="50000">
+                      <a:schemeClr val="accent5"/>
+                    </a:gs>
+                    <a:gs pos="100000">
+                      <a:schemeClr val="accent5">
+                        <a:lumMod val="60000"/>
+                        <a:lumOff val="40000"/>
+                      </a:schemeClr>
+                    </a:gs>
+                  </a:gsLst>
+                  <a:lin ang="5400000"/>
+                </a:gradFill>
+                <a:effectLst>
+                  <a:reflection blurRad="6350" stA="53000" endA="300" endPos="35500" dir="5400000" sy="-90000" algn="bl" rotWithShape="0"/>
+                </a:effectLst>
+              </a:rPr>
+              <a:t>latform</a:t>
+            </a:r>
+            <a:endParaRPr lang="en-US" sz="5400" b="0" cap="none" spc="0" dirty="0">
+              <a:ln w="0"/>
+              <a:gradFill>
+                <a:gsLst>
+                  <a:gs pos="0">
+                    <a:schemeClr val="accent5">
+                      <a:lumMod val="50000"/>
+                    </a:schemeClr>
+                  </a:gs>
+                  <a:gs pos="50000">
+                    <a:schemeClr val="accent5"/>
+                  </a:gs>
+                  <a:gs pos="100000">
+                    <a:schemeClr val="accent5">
+                      <a:lumMod val="60000"/>
+                      <a:lumOff val="40000"/>
+                    </a:schemeClr>
+                  </a:gs>
+                </a:gsLst>
+                <a:lin ang="5400000"/>
+              </a:gradFill>
+              <a:effectLst>
+                <a:reflection blurRad="6350" stA="53000" endA="300" endPos="35500" dir="5400000" sy="-90000" algn="bl" rotWithShape="0"/>
+              </a:effectLst>
+            </a:endParaRPr>
+          </a:p>
+        </p:txBody>
+      </p:sp>
+      <p:sp>
+        <p:nvSpPr>
+          <p:cNvPr id="9" name="Rectangle 8"/>
+          <p:cNvSpPr/>
+          <p:nvPr/>
+        </p:nvSpPr>
+        <p:spPr>
+          <a:xfrm>
+            <a:off x="4597071" y="4625663"/>
+            <a:ext cx="4874669" cy="923330"/>
+          </a:xfrm>
+          <a:prstGeom prst="rect">
+            <a:avLst/>
+          </a:prstGeom>
+          <a:noFill/>
+        </p:spPr>
+        <p:txBody>
+          <a:bodyPr wrap="none" lIns="91440" tIns="45720" rIns="91440" bIns="45720">
+            <a:spAutoFit/>
+          </a:bodyPr>
+          <a:lstStyle/>
+          <a:p>
+            <a:pPr algn="ctr"/>
+            <a:r>
+              <a:rPr lang="en-US" sz="5400" dirty="0" smtClean="0">
+                <a:ln w="0"/>
+                <a:gradFill>
+                  <a:gsLst>
+                    <a:gs pos="0">
+                      <a:schemeClr val="accent5">
+                        <a:lumMod val="50000"/>
+                      </a:schemeClr>
+                    </a:gs>
+                    <a:gs pos="50000">
+                      <a:schemeClr val="accent5"/>
+                    </a:gs>
+                    <a:gs pos="100000">
+                      <a:schemeClr val="accent5">
+                        <a:lumMod val="60000"/>
+                        <a:lumOff val="40000"/>
+                      </a:schemeClr>
+                    </a:gs>
+                  </a:gsLst>
+                  <a:lin ang="5400000"/>
+                </a:gradFill>
+                <a:effectLst>
+                  <a:reflection blurRad="6350" stA="53000" endA="300" endPos="35500" dir="5400000" sy="-90000" algn="bl" rotWithShape="0"/>
+                </a:effectLst>
+              </a:rPr>
+              <a:t>Polly community</a:t>
+            </a:r>
+            <a:endParaRPr lang="en-US" sz="5400" b="0" cap="none" spc="0" dirty="0">
+              <a:ln w="0"/>
+              <a:gradFill>
+                <a:gsLst>
+                  <a:gs pos="0">
+                    <a:schemeClr val="accent5">
+                      <a:lumMod val="50000"/>
+                    </a:schemeClr>
+                  </a:gs>
+                  <a:gs pos="50000">
+                    <a:schemeClr val="accent5"/>
+                  </a:gs>
+                  <a:gs pos="100000">
+                    <a:schemeClr val="accent5">
+                      <a:lumMod val="60000"/>
+                      <a:lumOff val="40000"/>
+                    </a:schemeClr>
+                  </a:gs>
+                </a:gsLst>
+                <a:lin ang="5400000"/>
+              </a:gradFill>
+              <a:effectLst>
+                <a:reflection blurRad="6350" stA="53000" endA="300" endPos="35500" dir="5400000" sy="-90000" algn="bl" rotWithShape="0"/>
+              </a:effectLst>
+            </a:endParaRPr>
           </a:p>
         </p:txBody>
       </p:sp>
@@ -4940,7 +5257,7 @@
           <a:p>
             <a:r>
               <a:rPr lang="en-US" dirty="0" smtClean="0"/>
-              <a:t>Outline</a:t>
+              <a:t>PollyNET</a:t>
             </a:r>
             <a:endParaRPr lang="en-US" dirty="0"/>
           </a:p>
@@ -4967,14 +5284,94 @@
       </p:sp>
       <p:sp>
         <p:nvSpPr>
-          <p:cNvPr id="4" name="TextBox 3"/>
+          <p:cNvPr id="7" name="Rectangle 6"/>
+          <p:cNvSpPr/>
+          <p:nvPr/>
+        </p:nvSpPr>
+        <p:spPr>
+          <a:xfrm>
+            <a:off x="5710714" y="1926267"/>
+            <a:ext cx="2604378" cy="2033555"/>
+          </a:xfrm>
+          <a:prstGeom prst="rect">
+            <a:avLst/>
+          </a:prstGeom>
+          <a:noFill/>
+          <a:ln w="38100">
+            <a:solidFill>
+              <a:srgbClr val="FF0000"/>
+            </a:solidFill>
+          </a:ln>
+        </p:spPr>
+        <p:style>
+          <a:lnRef idx="1">
+            <a:schemeClr val="accent1"/>
+          </a:lnRef>
+          <a:fillRef idx="3">
+            <a:schemeClr val="accent1"/>
+          </a:fillRef>
+          <a:effectRef idx="2">
+            <a:schemeClr val="accent1"/>
+          </a:effectRef>
+          <a:fontRef idx="minor">
+            <a:schemeClr val="lt1"/>
+          </a:fontRef>
+        </p:style>
+        <p:txBody>
+          <a:bodyPr rtlCol="0" anchor="ctr"/>
+          <a:lstStyle/>
+          <a:p>
+            <a:pPr algn="ctr"/>
+            <a:endParaRPr lang="en-US"/>
+          </a:p>
+        </p:txBody>
+      </p:sp>
+      <p:cxnSp>
+        <p:nvCxnSpPr>
+          <p:cNvPr id="9" name="Straight Arrow Connector 8"/>
+          <p:cNvCxnSpPr/>
+          <p:nvPr/>
+        </p:nvCxnSpPr>
+        <p:spPr>
+          <a:xfrm flipV="1">
+            <a:off x="6944836" y="4039876"/>
+            <a:ext cx="0" cy="529389"/>
+          </a:xfrm>
+          <a:prstGeom prst="straightConnector1">
+            <a:avLst/>
+          </a:prstGeom>
+          <a:ln w="76200">
+            <a:solidFill>
+              <a:srgbClr val="FF0000"/>
+            </a:solidFill>
+            <a:tailEnd type="triangle"/>
+          </a:ln>
+        </p:spPr>
+        <p:style>
+          <a:lnRef idx="2">
+            <a:schemeClr val="accent1"/>
+          </a:lnRef>
+          <a:fillRef idx="0">
+            <a:schemeClr val="accent1"/>
+          </a:fillRef>
+          <a:effectRef idx="1">
+            <a:schemeClr val="accent1"/>
+          </a:effectRef>
+          <a:fontRef idx="minor">
+            <a:schemeClr val="tx1"/>
+          </a:fontRef>
+        </p:style>
+      </p:cxnSp>
+      <p:sp>
+        <p:nvSpPr>
+          <p:cNvPr id="10" name="TextBox 9"/>
           <p:cNvSpPr txBox="1"/>
           <p:nvPr/>
         </p:nvSpPr>
         <p:spPr>
           <a:xfrm>
-            <a:off x="1130709" y="1632848"/>
-            <a:ext cx="9881420" cy="1384995"/>
+            <a:off x="4923233" y="4530985"/>
+            <a:ext cx="4152321" cy="461665"/>
           </a:xfrm>
           <a:prstGeom prst="rect">
             <a:avLst/>
@@ -4987,42 +5384,550 @@
           </a:bodyPr>
           <a:lstStyle/>
           <a:p>
-            <a:pPr marL="514350" indent="-514350">
-              <a:lnSpc>
-                <a:spcPct val="150000"/>
-              </a:lnSpc>
-              <a:buFont typeface="Wingdings" panose="05000000000000000000" pitchFamily="2" charset="2"/>
-              <a:buChar char="Ø"/>
+            <a:pPr algn="ctr"/>
+            <a:r>
+              <a:rPr lang="en-US" sz="2400" b="1" dirty="0" smtClean="0"/>
+              <a:t>Picasso</a:t>
+            </a:r>
+            <a:endParaRPr lang="en-US" sz="2400" b="1" dirty="0"/>
+          </a:p>
+        </p:txBody>
+      </p:sp>
+      <p:cxnSp>
+        <p:nvCxnSpPr>
+          <p:cNvPr id="12" name="Straight Arrow Connector 11"/>
+          <p:cNvCxnSpPr/>
+          <p:nvPr/>
+        </p:nvCxnSpPr>
+        <p:spPr>
+          <a:xfrm>
+            <a:off x="1368077" y="1321663"/>
+            <a:ext cx="10242211" cy="0"/>
+          </a:xfrm>
+          <a:prstGeom prst="straightConnector1">
+            <a:avLst/>
+          </a:prstGeom>
+          <a:ln w="76200">
+            <a:tailEnd type="triangle"/>
+          </a:ln>
+        </p:spPr>
+        <p:style>
+          <a:lnRef idx="2">
+            <a:schemeClr val="dk1"/>
+          </a:lnRef>
+          <a:fillRef idx="0">
+            <a:schemeClr val="dk1"/>
+          </a:fillRef>
+          <a:effectRef idx="1">
+            <a:schemeClr val="dk1"/>
+          </a:effectRef>
+          <a:fontRef idx="minor">
+            <a:schemeClr val="tx1"/>
+          </a:fontRef>
+        </p:style>
+      </p:cxnSp>
+      <p:cxnSp>
+        <p:nvCxnSpPr>
+          <p:cNvPr id="15" name="Straight Arrow Connector 14"/>
+          <p:cNvCxnSpPr/>
+          <p:nvPr/>
+        </p:nvCxnSpPr>
+        <p:spPr>
+          <a:xfrm>
+            <a:off x="2469548" y="3041153"/>
+            <a:ext cx="530994" cy="20855"/>
+          </a:xfrm>
+          <a:prstGeom prst="straightConnector1">
+            <a:avLst/>
+          </a:prstGeom>
+          <a:ln w="76200">
+            <a:solidFill>
+              <a:schemeClr val="tx1"/>
+            </a:solidFill>
+            <a:tailEnd type="triangle"/>
+          </a:ln>
+        </p:spPr>
+        <p:style>
+          <a:lnRef idx="2">
+            <a:schemeClr val="accent1"/>
+          </a:lnRef>
+          <a:fillRef idx="0">
+            <a:schemeClr val="accent1"/>
+          </a:fillRef>
+          <a:effectRef idx="1">
+            <a:schemeClr val="accent1"/>
+          </a:effectRef>
+          <a:fontRef idx="minor">
+            <a:schemeClr val="tx1"/>
+          </a:fontRef>
+        </p:style>
+      </p:cxnSp>
+      <p:cxnSp>
+        <p:nvCxnSpPr>
+          <p:cNvPr id="18" name="Straight Arrow Connector 17"/>
+          <p:cNvCxnSpPr/>
+          <p:nvPr/>
+        </p:nvCxnSpPr>
+        <p:spPr>
+          <a:xfrm>
+            <a:off x="4785584" y="3113668"/>
+            <a:ext cx="530994" cy="20855"/>
+          </a:xfrm>
+          <a:prstGeom prst="straightConnector1">
+            <a:avLst/>
+          </a:prstGeom>
+          <a:ln w="76200">
+            <a:solidFill>
+              <a:schemeClr val="tx1"/>
+            </a:solidFill>
+            <a:tailEnd type="triangle"/>
+          </a:ln>
+        </p:spPr>
+        <p:style>
+          <a:lnRef idx="2">
+            <a:schemeClr val="accent1"/>
+          </a:lnRef>
+          <a:fillRef idx="0">
+            <a:schemeClr val="accent1"/>
+          </a:fillRef>
+          <a:effectRef idx="1">
+            <a:schemeClr val="accent1"/>
+          </a:effectRef>
+          <a:fontRef idx="minor">
+            <a:schemeClr val="tx1"/>
+          </a:fontRef>
+        </p:style>
+      </p:cxnSp>
+      <p:pic>
+        <p:nvPicPr>
+          <p:cNvPr id="21" name="Picture 20"/>
+          <p:cNvPicPr>
+            <a:picLocks noChangeAspect="1"/>
+          </p:cNvPicPr>
+          <p:nvPr/>
+        </p:nvPicPr>
+        <p:blipFill>
+          <a:blip r:embed="rId2"/>
+          <a:stretch>
+            <a:fillRect/>
+          </a:stretch>
+        </p:blipFill>
+        <p:spPr>
+          <a:xfrm>
+            <a:off x="6154891" y="2103931"/>
+            <a:ext cx="1695537" cy="1695537"/>
+          </a:xfrm>
+          <a:prstGeom prst="rect">
+            <a:avLst/>
+          </a:prstGeom>
+        </p:spPr>
+      </p:pic>
+      <p:cxnSp>
+        <p:nvCxnSpPr>
+          <p:cNvPr id="22" name="Straight Arrow Connector 21"/>
+          <p:cNvCxnSpPr/>
+          <p:nvPr/>
+        </p:nvCxnSpPr>
+        <p:spPr>
+          <a:xfrm>
+            <a:off x="8709228" y="3134523"/>
+            <a:ext cx="530994" cy="20855"/>
+          </a:xfrm>
+          <a:prstGeom prst="straightConnector1">
+            <a:avLst/>
+          </a:prstGeom>
+          <a:ln w="76200">
+            <a:solidFill>
+              <a:schemeClr val="tx1"/>
+            </a:solidFill>
+            <a:tailEnd type="triangle"/>
+          </a:ln>
+        </p:spPr>
+        <p:style>
+          <a:lnRef idx="2">
+            <a:schemeClr val="accent1"/>
+          </a:lnRef>
+          <a:fillRef idx="0">
+            <a:schemeClr val="accent1"/>
+          </a:fillRef>
+          <a:effectRef idx="1">
+            <a:schemeClr val="accent1"/>
+          </a:effectRef>
+          <a:fontRef idx="minor">
+            <a:schemeClr val="tx1"/>
+          </a:fontRef>
+        </p:style>
+      </p:cxnSp>
+      <p:grpSp>
+        <p:nvGrpSpPr>
+          <p:cNvPr id="11" name="Group 10"/>
+          <p:cNvGrpSpPr/>
+          <p:nvPr/>
+        </p:nvGrpSpPr>
+        <p:grpSpPr>
+          <a:xfrm>
+            <a:off x="301798" y="2137181"/>
+            <a:ext cx="3065989" cy="2130418"/>
+            <a:chOff x="301798" y="2795941"/>
+            <a:chExt cx="3065989" cy="2130418"/>
+          </a:xfrm>
+        </p:grpSpPr>
+        <p:pic>
+          <p:nvPicPr>
+            <p:cNvPr id="13" name="Picture 12"/>
+            <p:cNvPicPr>
+              <a:picLocks noChangeAspect="1"/>
+            </p:cNvPicPr>
+            <p:nvPr/>
+          </p:nvPicPr>
+          <p:blipFill>
+            <a:blip r:embed="rId3"/>
+            <a:stretch>
+              <a:fillRect/>
+            </a:stretch>
+          </p:blipFill>
+          <p:spPr>
+            <a:xfrm>
+              <a:off x="301798" y="2795941"/>
+              <a:ext cx="1978678" cy="1828800"/>
+            </a:xfrm>
+            <a:prstGeom prst="rect">
+              <a:avLst/>
+            </a:prstGeom>
+          </p:spPr>
+        </p:pic>
+        <p:sp>
+          <p:nvSpPr>
+            <p:cNvPr id="24" name="TextBox 23"/>
+            <p:cNvSpPr txBox="1"/>
+            <p:nvPr/>
+          </p:nvSpPr>
+          <p:spPr>
+            <a:xfrm>
+              <a:off x="470583" y="4618582"/>
+              <a:ext cx="2897204" cy="307777"/>
+            </a:xfrm>
+            <a:prstGeom prst="rect">
+              <a:avLst/>
+            </a:prstGeom>
+            <a:noFill/>
+          </p:spPr>
+          <p:txBody>
+            <a:bodyPr wrap="square" rtlCol="0">
+              <a:spAutoFit/>
+            </a:bodyPr>
+            <a:lstStyle/>
+            <a:p>
+              <a:r>
+                <a:rPr lang="en-US" sz="1400" b="1" dirty="0" smtClean="0"/>
+                <a:t>PollyNET Measurements</a:t>
+              </a:r>
+              <a:endParaRPr lang="en-US" sz="1400" b="1" dirty="0"/>
+            </a:p>
+          </p:txBody>
+        </p:sp>
+      </p:grpSp>
+      <p:grpSp>
+        <p:nvGrpSpPr>
+          <p:cNvPr id="8" name="Group 7"/>
+          <p:cNvGrpSpPr/>
+          <p:nvPr/>
+        </p:nvGrpSpPr>
+        <p:grpSpPr>
+          <a:xfrm>
+            <a:off x="2977483" y="2427868"/>
+            <a:ext cx="2897204" cy="1724596"/>
+            <a:chOff x="2977483" y="3086628"/>
+            <a:chExt cx="2897204" cy="1724596"/>
+          </a:xfrm>
+        </p:grpSpPr>
+        <p:pic>
+          <p:nvPicPr>
+            <p:cNvPr id="17" name="Picture 16"/>
+            <p:cNvPicPr>
+              <a:picLocks noChangeAspect="1"/>
+            </p:cNvPicPr>
+            <p:nvPr/>
+          </p:nvPicPr>
+          <p:blipFill>
+            <a:blip r:embed="rId4"/>
+            <a:stretch>
+              <a:fillRect/>
+            </a:stretch>
+          </p:blipFill>
+          <p:spPr>
+            <a:xfrm>
+              <a:off x="3189614" y="3086628"/>
+              <a:ext cx="1406898" cy="1371600"/>
+            </a:xfrm>
+            <a:prstGeom prst="rect">
+              <a:avLst/>
+            </a:prstGeom>
+          </p:spPr>
+        </p:pic>
+        <p:sp>
+          <p:nvSpPr>
+            <p:cNvPr id="25" name="TextBox 24"/>
+            <p:cNvSpPr txBox="1"/>
+            <p:nvPr/>
+          </p:nvSpPr>
+          <p:spPr>
+            <a:xfrm>
+              <a:off x="2977483" y="4503447"/>
+              <a:ext cx="2897204" cy="307777"/>
+            </a:xfrm>
+            <a:prstGeom prst="rect">
+              <a:avLst/>
+            </a:prstGeom>
+            <a:noFill/>
+          </p:spPr>
+          <p:txBody>
+            <a:bodyPr wrap="square" rtlCol="0">
+              <a:spAutoFit/>
+            </a:bodyPr>
+            <a:lstStyle/>
+            <a:p>
+              <a:r>
+                <a:rPr lang="en-US" sz="1400" b="1" dirty="0" smtClean="0"/>
+                <a:t>PollyNET Data Server</a:t>
+              </a:r>
+              <a:endParaRPr lang="en-US" sz="1400" b="1" dirty="0"/>
+            </a:p>
+          </p:txBody>
+        </p:sp>
+      </p:grpSp>
+      <p:grpSp>
+        <p:nvGrpSpPr>
+          <p:cNvPr id="6" name="Group 5"/>
+          <p:cNvGrpSpPr/>
+          <p:nvPr/>
+        </p:nvGrpSpPr>
+        <p:grpSpPr>
+          <a:xfrm>
+            <a:off x="1163727" y="4459318"/>
+            <a:ext cx="2825821" cy="940373"/>
+            <a:chOff x="1163727" y="5118078"/>
+            <a:chExt cx="2825821" cy="940373"/>
+          </a:xfrm>
+        </p:grpSpPr>
+        <p:sp>
+          <p:nvSpPr>
+            <p:cNvPr id="4" name="Left Brace 3"/>
+            <p:cNvSpPr/>
+            <p:nvPr/>
+          </p:nvSpPr>
+          <p:spPr>
+            <a:xfrm rot="16200000">
+              <a:off x="2316083" y="3965722"/>
+              <a:ext cx="521110" cy="2825821"/>
+            </a:xfrm>
+            <a:prstGeom prst="leftBrace">
+              <a:avLst/>
+            </a:prstGeom>
+          </p:spPr>
+          <p:style>
+            <a:lnRef idx="2">
+              <a:schemeClr val="accent1"/>
+            </a:lnRef>
+            <a:fillRef idx="0">
+              <a:schemeClr val="accent1"/>
+            </a:fillRef>
+            <a:effectRef idx="1">
+              <a:schemeClr val="accent1"/>
+            </a:effectRef>
+            <a:fontRef idx="minor">
+              <a:schemeClr val="tx1"/>
+            </a:fontRef>
+          </p:style>
+          <p:txBody>
+            <a:bodyPr rtlCol="0" anchor="ctr"/>
+            <a:lstStyle/>
+            <a:p>
+              <a:pPr algn="ctr"/>
+              <a:endParaRPr lang="en-US"/>
+            </a:p>
+          </p:txBody>
+        </p:sp>
+        <p:sp>
+          <p:nvSpPr>
+            <p:cNvPr id="5" name="TextBox 4"/>
+            <p:cNvSpPr txBox="1"/>
+            <p:nvPr/>
+          </p:nvSpPr>
+          <p:spPr>
+            <a:xfrm>
+              <a:off x="1918560" y="5689119"/>
+              <a:ext cx="1960385" cy="369332"/>
+            </a:xfrm>
+            <a:prstGeom prst="rect">
+              <a:avLst/>
+            </a:prstGeom>
+            <a:noFill/>
+          </p:spPr>
+          <p:txBody>
+            <a:bodyPr wrap="square" rtlCol="0">
+              <a:spAutoFit/>
+            </a:bodyPr>
+            <a:lstStyle/>
+            <a:p>
+              <a:r>
+                <a:rPr lang="en-US" b="1" dirty="0" smtClean="0"/>
+                <a:t>Continuously</a:t>
+              </a:r>
+              <a:endParaRPr lang="en-US" b="1" dirty="0"/>
+            </a:p>
+          </p:txBody>
+        </p:sp>
+      </p:grpSp>
+      <p:grpSp>
+        <p:nvGrpSpPr>
+          <p:cNvPr id="16" name="Group 15"/>
+          <p:cNvGrpSpPr/>
+          <p:nvPr/>
+        </p:nvGrpSpPr>
+        <p:grpSpPr>
+          <a:xfrm>
+            <a:off x="9468899" y="1564152"/>
+            <a:ext cx="2565785" cy="3264497"/>
+            <a:chOff x="9468899" y="2222912"/>
+            <a:chExt cx="2565785" cy="3264497"/>
+          </a:xfrm>
+        </p:grpSpPr>
+        <p:pic>
+          <p:nvPicPr>
+            <p:cNvPr id="23" name="Picture 22"/>
+            <p:cNvPicPr>
+              <a:picLocks noChangeAspect="1"/>
+            </p:cNvPicPr>
+            <p:nvPr/>
+          </p:nvPicPr>
+          <p:blipFill>
+            <a:blip r:embed="rId5"/>
+            <a:stretch>
+              <a:fillRect/>
+            </a:stretch>
+          </p:blipFill>
+          <p:spPr>
+            <a:xfrm>
+              <a:off x="9468899" y="2222912"/>
+              <a:ext cx="2489328" cy="2775093"/>
+            </a:xfrm>
+            <a:prstGeom prst="rect">
+              <a:avLst/>
+            </a:prstGeom>
+          </p:spPr>
+        </p:pic>
+        <p:sp>
+          <p:nvSpPr>
+            <p:cNvPr id="14" name="TextBox 13"/>
+            <p:cNvSpPr txBox="1"/>
+            <p:nvPr/>
+          </p:nvSpPr>
+          <p:spPr>
+            <a:xfrm>
+              <a:off x="10009239" y="5118077"/>
+              <a:ext cx="2025445" cy="369332"/>
+            </a:xfrm>
+            <a:prstGeom prst="rect">
+              <a:avLst/>
+            </a:prstGeom>
+            <a:noFill/>
+          </p:spPr>
+          <p:txBody>
+            <a:bodyPr wrap="square" rtlCol="0">
+              <a:spAutoFit/>
+            </a:bodyPr>
+            <a:lstStyle/>
+            <a:p>
+              <a:r>
+                <a:rPr lang="en-US" b="1" dirty="0" smtClean="0"/>
+                <a:t>UI/</a:t>
+              </a:r>
+              <a:r>
+                <a:rPr lang="en-US" b="1" dirty="0" err="1" smtClean="0"/>
+                <a:t>polly</a:t>
+              </a:r>
+              <a:r>
+                <a:rPr lang="en-US" b="1" dirty="0" smtClean="0"/>
+                <a:t> web</a:t>
+              </a:r>
+              <a:endParaRPr lang="en-US" b="1" dirty="0"/>
+            </a:p>
+          </p:txBody>
+        </p:sp>
+      </p:grpSp>
+      <p:sp>
+        <p:nvSpPr>
+          <p:cNvPr id="20" name="TextBox 19"/>
+          <p:cNvSpPr txBox="1"/>
+          <p:nvPr/>
+        </p:nvSpPr>
+        <p:spPr>
+          <a:xfrm>
+            <a:off x="5396541" y="4921161"/>
+            <a:ext cx="3679013" cy="1754326"/>
+          </a:xfrm>
+          <a:prstGeom prst="rect">
+            <a:avLst/>
+          </a:prstGeom>
+          <a:noFill/>
+        </p:spPr>
+        <p:txBody>
+          <a:bodyPr wrap="square" rtlCol="0">
+            <a:spAutoFit/>
+          </a:bodyPr>
+          <a:lstStyle/>
+          <a:p>
+            <a:pPr marL="285750" indent="-285750">
+              <a:buFont typeface="Arial" panose="020B0604020202020204" pitchFamily="34" charset="0"/>
+              <a:buChar char="•"/>
             </a:pPr>
             <a:r>
-              <a:rPr lang="en-US" sz="2800" dirty="0" smtClean="0"/>
-              <a:t>Download and Setup</a:t>
+              <a:rPr lang="en-US" dirty="0" smtClean="0"/>
+              <a:t>Lidar calibration</a:t>
             </a:r>
           </a:p>
           <a:p>
-            <a:pPr marL="514350" indent="-514350">
-              <a:lnSpc>
-                <a:spcPct val="150000"/>
-              </a:lnSpc>
-              <a:buFont typeface="Wingdings" panose="05000000000000000000" pitchFamily="2" charset="2"/>
-              <a:buChar char="Ø"/>
+            <a:pPr marL="285750" indent="-285750">
+              <a:buFont typeface="Arial" panose="020B0604020202020204" pitchFamily="34" charset="0"/>
+              <a:buChar char="•"/>
             </a:pPr>
             <a:r>
-              <a:rPr lang="en-US" sz="2800" dirty="0" smtClean="0"/>
-              <a:t>Hands-on to support new </a:t>
-            </a:r>
-            <a:r>
-              <a:rPr lang="en-US" sz="2800" dirty="0" err="1" smtClean="0"/>
-              <a:t>pollyxt</a:t>
-            </a:r>
-            <a:endParaRPr lang="en-US" sz="2800" dirty="0" smtClean="0"/>
+              <a:rPr lang="en-US" dirty="0" err="1" smtClean="0"/>
+              <a:t>depol</a:t>
+            </a:r>
+            <a:r>
+              <a:rPr lang="en-US" dirty="0" smtClean="0"/>
+              <a:t> calibration, water vapor calibration</a:t>
+            </a:r>
+          </a:p>
+          <a:p>
+            <a:pPr marL="285750" indent="-285750">
+              <a:buFont typeface="Arial" panose="020B0604020202020204" pitchFamily="34" charset="0"/>
+              <a:buChar char="•"/>
+            </a:pPr>
+            <a:r>
+              <a:rPr lang="en-US" dirty="0" smtClean="0"/>
+              <a:t>aerosol extensive and intensive properties</a:t>
+            </a:r>
+          </a:p>
+          <a:p>
+            <a:pPr marL="285750" indent="-285750">
+              <a:buFont typeface="Arial" panose="020B0604020202020204" pitchFamily="34" charset="0"/>
+              <a:buChar char="•"/>
+            </a:pPr>
+            <a:r>
+              <a:rPr lang="en-US" dirty="0" smtClean="0"/>
+              <a:t>housekeeping, overlap function, …</a:t>
+            </a:r>
+            <a:endParaRPr lang="en-US" dirty="0"/>
           </a:p>
         </p:txBody>
       </p:sp>
     </p:spTree>
     <p:extLst>
       <p:ext uri="{BB962C8B-B14F-4D97-AF65-F5344CB8AC3E}">
-        <p14:creationId xmlns:p14="http://schemas.microsoft.com/office/powerpoint/2010/main" val="1937983664"/>
+        <p14:creationId xmlns:p14="http://schemas.microsoft.com/office/powerpoint/2010/main" val="3386628013"/>
       </p:ext>
     </p:extLst>
   </p:cSld>
@@ -15358,7 +16263,7 @@
           <a:p>
             <a:r>
               <a:rPr lang="en-US" dirty="0" smtClean="0"/>
-              <a:t>PollyNET Workflow</a:t>
+              <a:t>Outline</a:t>
             </a:r>
             <a:endParaRPr lang="en-US" dirty="0"/>
           </a:p>
@@ -15385,94 +16290,14 @@
       </p:sp>
       <p:sp>
         <p:nvSpPr>
-          <p:cNvPr id="7" name="Rectangle 6"/>
-          <p:cNvSpPr/>
-          <p:nvPr/>
-        </p:nvSpPr>
-        <p:spPr>
-          <a:xfrm>
-            <a:off x="5710714" y="2585027"/>
-            <a:ext cx="2604378" cy="2033555"/>
-          </a:xfrm>
-          <a:prstGeom prst="rect">
-            <a:avLst/>
-          </a:prstGeom>
-          <a:noFill/>
-          <a:ln w="38100">
-            <a:solidFill>
-              <a:srgbClr val="FF0000"/>
-            </a:solidFill>
-          </a:ln>
-        </p:spPr>
-        <p:style>
-          <a:lnRef idx="1">
-            <a:schemeClr val="accent1"/>
-          </a:lnRef>
-          <a:fillRef idx="3">
-            <a:schemeClr val="accent1"/>
-          </a:fillRef>
-          <a:effectRef idx="2">
-            <a:schemeClr val="accent1"/>
-          </a:effectRef>
-          <a:fontRef idx="minor">
-            <a:schemeClr val="lt1"/>
-          </a:fontRef>
-        </p:style>
-        <p:txBody>
-          <a:bodyPr rtlCol="0" anchor="ctr"/>
-          <a:lstStyle/>
-          <a:p>
-            <a:pPr algn="ctr"/>
-            <a:endParaRPr lang="en-US"/>
-          </a:p>
-        </p:txBody>
-      </p:sp>
-      <p:cxnSp>
-        <p:nvCxnSpPr>
-          <p:cNvPr id="9" name="Straight Arrow Connector 8"/>
-          <p:cNvCxnSpPr/>
-          <p:nvPr/>
-        </p:nvCxnSpPr>
-        <p:spPr>
-          <a:xfrm flipV="1">
-            <a:off x="6961998" y="4842869"/>
-            <a:ext cx="0" cy="529389"/>
-          </a:xfrm>
-          <a:prstGeom prst="straightConnector1">
-            <a:avLst/>
-          </a:prstGeom>
-          <a:ln w="76200">
-            <a:solidFill>
-              <a:srgbClr val="FF0000"/>
-            </a:solidFill>
-            <a:tailEnd type="triangle"/>
-          </a:ln>
-        </p:spPr>
-        <p:style>
-          <a:lnRef idx="2">
-            <a:schemeClr val="accent1"/>
-          </a:lnRef>
-          <a:fillRef idx="0">
-            <a:schemeClr val="accent1"/>
-          </a:fillRef>
-          <a:effectRef idx="1">
-            <a:schemeClr val="accent1"/>
-          </a:effectRef>
-          <a:fontRef idx="minor">
-            <a:schemeClr val="tx1"/>
-          </a:fontRef>
-        </p:style>
-      </p:cxnSp>
-      <p:sp>
-        <p:nvSpPr>
-          <p:cNvPr id="10" name="TextBox 9"/>
+          <p:cNvPr id="4" name="TextBox 3"/>
           <p:cNvSpPr txBox="1"/>
           <p:nvPr/>
         </p:nvSpPr>
         <p:spPr>
           <a:xfrm>
-            <a:off x="5257800" y="5412120"/>
-            <a:ext cx="4152321" cy="461665"/>
+            <a:off x="1671484" y="1347713"/>
+            <a:ext cx="9881420" cy="2031325"/>
           </a:xfrm>
           <a:prstGeom prst="rect">
             <a:avLst/>
@@ -15485,319 +16310,55 @@
           </a:bodyPr>
           <a:lstStyle/>
           <a:p>
-            <a:r>
-              <a:rPr lang="en-US" sz="2400" b="1" dirty="0"/>
-              <a:t>P</a:t>
-            </a:r>
-            <a:r>
-              <a:rPr lang="en-US" sz="2400" b="1" dirty="0" smtClean="0"/>
-              <a:t>ollyNET processing program</a:t>
-            </a:r>
-            <a:endParaRPr lang="en-US" sz="2400" b="1" dirty="0"/>
+            <a:pPr marL="514350" indent="-514350">
+              <a:lnSpc>
+                <a:spcPct val="150000"/>
+              </a:lnSpc>
+              <a:buFont typeface="Wingdings" panose="05000000000000000000" pitchFamily="2" charset="2"/>
+              <a:buChar char="Ø"/>
+            </a:pPr>
+            <a:r>
+              <a:rPr lang="en-US" sz="2800" dirty="0" smtClean="0"/>
+              <a:t>Download and Setup</a:t>
+            </a:r>
           </a:p>
-        </p:txBody>
-      </p:sp>
-      <p:cxnSp>
-        <p:nvCxnSpPr>
-          <p:cNvPr id="12" name="Straight Arrow Connector 11"/>
-          <p:cNvCxnSpPr/>
-          <p:nvPr/>
-        </p:nvCxnSpPr>
-        <p:spPr>
-          <a:xfrm>
-            <a:off x="1163726" y="1636295"/>
-            <a:ext cx="10242211" cy="0"/>
-          </a:xfrm>
-          <a:prstGeom prst="straightConnector1">
-            <a:avLst/>
-          </a:prstGeom>
-          <a:ln w="76200">
-            <a:tailEnd type="triangle"/>
-          </a:ln>
-        </p:spPr>
-        <p:style>
-          <a:lnRef idx="2">
-            <a:schemeClr val="dk1"/>
-          </a:lnRef>
-          <a:fillRef idx="0">
-            <a:schemeClr val="dk1"/>
-          </a:fillRef>
-          <a:effectRef idx="1">
-            <a:schemeClr val="dk1"/>
-          </a:effectRef>
-          <a:fontRef idx="minor">
-            <a:schemeClr val="tx1"/>
-          </a:fontRef>
-        </p:style>
-      </p:cxnSp>
-      <p:pic>
-        <p:nvPicPr>
-          <p:cNvPr id="13" name="Picture 12"/>
-          <p:cNvPicPr>
-            <a:picLocks noChangeAspect="1"/>
-          </p:cNvPicPr>
-          <p:nvPr/>
-        </p:nvPicPr>
-        <p:blipFill>
-          <a:blip r:embed="rId2"/>
-          <a:stretch>
-            <a:fillRect/>
-          </a:stretch>
-        </p:blipFill>
-        <p:spPr>
-          <a:xfrm>
-            <a:off x="301798" y="2795941"/>
-            <a:ext cx="1978678" cy="1828800"/>
-          </a:xfrm>
-          <a:prstGeom prst="rect">
-            <a:avLst/>
-          </a:prstGeom>
-        </p:spPr>
-      </p:pic>
-      <p:cxnSp>
-        <p:nvCxnSpPr>
-          <p:cNvPr id="15" name="Straight Arrow Connector 14"/>
-          <p:cNvCxnSpPr/>
-          <p:nvPr/>
-        </p:nvCxnSpPr>
-        <p:spPr>
-          <a:xfrm>
-            <a:off x="2469548" y="3699913"/>
-            <a:ext cx="530994" cy="20855"/>
-          </a:xfrm>
-          <a:prstGeom prst="straightConnector1">
-            <a:avLst/>
-          </a:prstGeom>
-          <a:ln w="76200">
-            <a:solidFill>
-              <a:schemeClr val="tx1"/>
-            </a:solidFill>
-            <a:tailEnd type="triangle"/>
-          </a:ln>
-        </p:spPr>
-        <p:style>
-          <a:lnRef idx="2">
-            <a:schemeClr val="accent1"/>
-          </a:lnRef>
-          <a:fillRef idx="0">
-            <a:schemeClr val="accent1"/>
-          </a:fillRef>
-          <a:effectRef idx="1">
-            <a:schemeClr val="accent1"/>
-          </a:effectRef>
-          <a:fontRef idx="minor">
-            <a:schemeClr val="tx1"/>
-          </a:fontRef>
-        </p:style>
-      </p:cxnSp>
-      <p:pic>
-        <p:nvPicPr>
-          <p:cNvPr id="17" name="Picture 16"/>
-          <p:cNvPicPr>
-            <a:picLocks noChangeAspect="1"/>
-          </p:cNvPicPr>
-          <p:nvPr/>
-        </p:nvPicPr>
-        <p:blipFill>
-          <a:blip r:embed="rId3"/>
-          <a:stretch>
-            <a:fillRect/>
-          </a:stretch>
-        </p:blipFill>
-        <p:spPr>
-          <a:xfrm>
-            <a:off x="3189614" y="3086628"/>
-            <a:ext cx="1406898" cy="1371600"/>
-          </a:xfrm>
-          <a:prstGeom prst="rect">
-            <a:avLst/>
-          </a:prstGeom>
-        </p:spPr>
-      </p:pic>
-      <p:cxnSp>
-        <p:nvCxnSpPr>
-          <p:cNvPr id="18" name="Straight Arrow Connector 17"/>
-          <p:cNvCxnSpPr/>
-          <p:nvPr/>
-        </p:nvCxnSpPr>
-        <p:spPr>
-          <a:xfrm>
-            <a:off x="4785584" y="3772428"/>
-            <a:ext cx="530994" cy="20855"/>
-          </a:xfrm>
-          <a:prstGeom prst="straightConnector1">
-            <a:avLst/>
-          </a:prstGeom>
-          <a:ln w="76200">
-            <a:solidFill>
-              <a:schemeClr val="tx1"/>
-            </a:solidFill>
-            <a:tailEnd type="triangle"/>
-          </a:ln>
-        </p:spPr>
-        <p:style>
-          <a:lnRef idx="2">
-            <a:schemeClr val="accent1"/>
-          </a:lnRef>
-          <a:fillRef idx="0">
-            <a:schemeClr val="accent1"/>
-          </a:fillRef>
-          <a:effectRef idx="1">
-            <a:schemeClr val="accent1"/>
-          </a:effectRef>
-          <a:fontRef idx="minor">
-            <a:schemeClr val="tx1"/>
-          </a:fontRef>
-        </p:style>
-      </p:cxnSp>
-      <p:pic>
-        <p:nvPicPr>
-          <p:cNvPr id="21" name="Picture 20"/>
-          <p:cNvPicPr>
-            <a:picLocks noChangeAspect="1"/>
-          </p:cNvPicPr>
-          <p:nvPr/>
-        </p:nvPicPr>
-        <p:blipFill>
-          <a:blip r:embed="rId4"/>
-          <a:stretch>
-            <a:fillRect/>
-          </a:stretch>
-        </p:blipFill>
-        <p:spPr>
-          <a:xfrm>
-            <a:off x="6154891" y="2762691"/>
-            <a:ext cx="1695537" cy="1695537"/>
-          </a:xfrm>
-          <a:prstGeom prst="rect">
-            <a:avLst/>
-          </a:prstGeom>
-        </p:spPr>
-      </p:pic>
-      <p:cxnSp>
-        <p:nvCxnSpPr>
-          <p:cNvPr id="22" name="Straight Arrow Connector 21"/>
-          <p:cNvCxnSpPr/>
-          <p:nvPr/>
-        </p:nvCxnSpPr>
-        <p:spPr>
-          <a:xfrm>
-            <a:off x="8709228" y="3793283"/>
-            <a:ext cx="530994" cy="20855"/>
-          </a:xfrm>
-          <a:prstGeom prst="straightConnector1">
-            <a:avLst/>
-          </a:prstGeom>
-          <a:ln w="76200">
-            <a:solidFill>
-              <a:schemeClr val="tx1"/>
-            </a:solidFill>
-            <a:tailEnd type="triangle"/>
-          </a:ln>
-        </p:spPr>
-        <p:style>
-          <a:lnRef idx="2">
-            <a:schemeClr val="accent1"/>
-          </a:lnRef>
-          <a:fillRef idx="0">
-            <a:schemeClr val="accent1"/>
-          </a:fillRef>
-          <a:effectRef idx="1">
-            <a:schemeClr val="accent1"/>
-          </a:effectRef>
-          <a:fontRef idx="minor">
-            <a:schemeClr val="tx1"/>
-          </a:fontRef>
-        </p:style>
-      </p:cxnSp>
-      <p:pic>
-        <p:nvPicPr>
-          <p:cNvPr id="23" name="Picture 22"/>
-          <p:cNvPicPr>
-            <a:picLocks noChangeAspect="1"/>
-          </p:cNvPicPr>
-          <p:nvPr/>
-        </p:nvPicPr>
-        <p:blipFill>
-          <a:blip r:embed="rId5"/>
-          <a:stretch>
-            <a:fillRect/>
-          </a:stretch>
-        </p:blipFill>
-        <p:spPr>
-          <a:xfrm>
-            <a:off x="9468899" y="2222912"/>
-            <a:ext cx="2489328" cy="2775093"/>
-          </a:xfrm>
-          <a:prstGeom prst="rect">
-            <a:avLst/>
-          </a:prstGeom>
-        </p:spPr>
-      </p:pic>
-      <p:sp>
-        <p:nvSpPr>
-          <p:cNvPr id="24" name="TextBox 23"/>
-          <p:cNvSpPr txBox="1"/>
-          <p:nvPr/>
-        </p:nvSpPr>
-        <p:spPr>
-          <a:xfrm>
-            <a:off x="470583" y="4618582"/>
-            <a:ext cx="2897204" cy="307777"/>
-          </a:xfrm>
-          <a:prstGeom prst="rect">
-            <a:avLst/>
-          </a:prstGeom>
-          <a:noFill/>
-        </p:spPr>
-        <p:txBody>
-          <a:bodyPr wrap="square" rtlCol="0">
-            <a:spAutoFit/>
-          </a:bodyPr>
-          <a:lstStyle/>
           <a:p>
-            <a:r>
-              <a:rPr lang="en-US" sz="1400" b="1" dirty="0" smtClean="0"/>
-              <a:t>PollyNET Measurements</a:t>
-            </a:r>
-            <a:endParaRPr lang="en-US" sz="1400" b="1" dirty="0"/>
+            <a:pPr marL="514350" indent="-514350">
+              <a:lnSpc>
+                <a:spcPct val="150000"/>
+              </a:lnSpc>
+              <a:buFont typeface="Wingdings" panose="05000000000000000000" pitchFamily="2" charset="2"/>
+              <a:buChar char="Ø"/>
+            </a:pPr>
+            <a:r>
+              <a:rPr lang="en-US" sz="2800" dirty="0" smtClean="0"/>
+              <a:t>Hands-on</a:t>
+            </a:r>
           </a:p>
-        </p:txBody>
-      </p:sp>
-      <p:sp>
-        <p:nvSpPr>
-          <p:cNvPr id="25" name="TextBox 24"/>
-          <p:cNvSpPr txBox="1"/>
-          <p:nvPr/>
-        </p:nvSpPr>
-        <p:spPr>
-          <a:xfrm>
-            <a:off x="2977483" y="4503447"/>
-            <a:ext cx="2897204" cy="307777"/>
-          </a:xfrm>
-          <a:prstGeom prst="rect">
-            <a:avLst/>
-          </a:prstGeom>
-          <a:noFill/>
-        </p:spPr>
-        <p:txBody>
-          <a:bodyPr wrap="square" rtlCol="0">
-            <a:spAutoFit/>
-          </a:bodyPr>
-          <a:lstStyle/>
           <a:p>
-            <a:r>
-              <a:rPr lang="en-US" sz="1400" b="1" dirty="0" smtClean="0"/>
-              <a:t>PollyNET Data Server</a:t>
-            </a:r>
-            <a:endParaRPr lang="en-US" sz="1400" b="1" dirty="0"/>
+            <a:pPr marL="514350" indent="-514350">
+              <a:lnSpc>
+                <a:spcPct val="150000"/>
+              </a:lnSpc>
+              <a:buFont typeface="Wingdings" panose="05000000000000000000" pitchFamily="2" charset="2"/>
+              <a:buChar char="Ø"/>
+            </a:pPr>
+            <a:r>
+              <a:rPr lang="en-US" sz="2800" dirty="0" smtClean="0"/>
+              <a:t>Concept about Version Control with </a:t>
+            </a:r>
+            <a:r>
+              <a:rPr lang="en-US" sz="2800" dirty="0" err="1" smtClean="0"/>
+              <a:t>Git</a:t>
+            </a:r>
+            <a:endParaRPr lang="en-US" sz="2800" dirty="0" smtClean="0"/>
           </a:p>
         </p:txBody>
       </p:sp>
     </p:spTree>
     <p:extLst>
       <p:ext uri="{BB962C8B-B14F-4D97-AF65-F5344CB8AC3E}">
-        <p14:creationId xmlns:p14="http://schemas.microsoft.com/office/powerpoint/2010/main" val="3386628013"/>
+        <p14:creationId xmlns:p14="http://schemas.microsoft.com/office/powerpoint/2010/main" val="1937983664"/>
       </p:ext>
     </p:extLst>
   </p:cSld>
@@ -17647,11 +18208,7 @@
               <a:pPr algn="ctr"/>
               <a:r>
                 <a:rPr lang="en-US" dirty="0" smtClean="0"/>
-                <a:t>pollynet_history_of_places_</a:t>
-              </a:r>
-              <a:r>
-                <a:rPr lang="en-US" dirty="0" smtClean="0"/>
-                <a:t>new.txt</a:t>
+                <a:t>pollynet_history_of_places_new.txt</a:t>
               </a:r>
               <a:endParaRPr lang="en-US" dirty="0"/>
             </a:p>
@@ -17801,11 +18358,7 @@
               </a:r>
               <a:r>
                 <a:rPr lang="en-US" dirty="0" smtClean="0"/>
-                <a:t> </a:t>
-              </a:r>
-              <a:r>
-                <a:rPr lang="en-US" dirty="0" smtClean="0"/>
-                <a:t>defaults</a:t>
+                <a:t> defaults</a:t>
               </a:r>
               <a:endParaRPr lang="en-US" dirty="0"/>
             </a:p>

</xml_diff>

<commit_message>
Improvement: add a argument of 'hRange' for read_processed_data to control the data size
</commit_message>
<xml_diff>
--- a/doc/Pollynet_Processing_Chain.pptx
+++ b/doc/Pollynet_Processing_Chain.pptx
@@ -222,7 +222,7 @@
           <a:p>
             <a:fld id="{F3738501-0686-434C-B9DB-E21550C6BC10}" type="datetimeFigureOut">
               <a:rPr lang="en-US" smtClean="0"/>
-              <a:t>8/19/2019</a:t>
+              <a:t>8/20/2019</a:t>
             </a:fld>
             <a:endParaRPr lang="en-US"/>
           </a:p>
@@ -2127,7 +2127,7 @@
           <a:p>
             <a:fld id="{AB21D1C1-A974-4CDD-890D-2FCDFA70CDD6}" type="datetimeFigureOut">
               <a:rPr lang="en-US" smtClean="0"/>
-              <a:t>8/19/2019</a:t>
+              <a:t>8/20/2019</a:t>
             </a:fld>
             <a:endParaRPr lang="en-US"/>
           </a:p>
@@ -16319,7 +16319,11 @@
             </a:pPr>
             <a:r>
               <a:rPr lang="en-US" sz="2800" dirty="0" smtClean="0"/>
-              <a:t>Download and Setup</a:t>
+              <a:t>Download </a:t>
+            </a:r>
+            <a:r>
+              <a:rPr lang="en-US" sz="2800" dirty="0" smtClean="0"/>
+              <a:t>and Setup</a:t>
             </a:r>
           </a:p>
           <a:p>

</xml_diff>

<commit_message>
Enhancement: Add SNR criteria for target classification
</commit_message>
<xml_diff>
--- a/doc/Pollynet_Processing_Chain.pptx
+++ b/doc/Pollynet_Processing_Chain.pptx
@@ -146,6 +146,9 @@
     <p:ext uri="{EFAFB233-063F-42B5-8137-9DF3F51BA10A}">
       <p15:sldGuideLst xmlns:p15="http://schemas.microsoft.com/office/powerpoint/2012/main"/>
     </p:ext>
+    <p:ext uri="{2D200454-40CA-4A62-9FC3-DE9A4176ACB9}">
+      <p15:notesGuideLst xmlns:p15="http://schemas.microsoft.com/office/powerpoint/2012/main"/>
+    </p:ext>
   </p:extLst>
 </p:presentation>
 </file>
@@ -232,7 +235,7 @@
           <a:p>
             <a:fld id="{2E5A5E8D-E55E-4F38-82DC-B11F795BC482}" type="datetimeFigureOut">
               <a:rPr lang="en-US" smtClean="0"/>
-              <a:t>8/24/2019</a:t>
+              <a:t>8/29/2019</a:t>
             </a:fld>
             <a:endParaRPr lang="en-US"/>
           </a:p>
@@ -397,7 +400,7 @@
           <a:p>
             <a:fld id="{F3738501-0686-434C-B9DB-E21550C6BC10}" type="datetimeFigureOut">
               <a:rPr lang="en-US" smtClean="0"/>
-              <a:t>8/24/2019</a:t>
+              <a:t>8/29/2019</a:t>
             </a:fld>
             <a:endParaRPr lang="en-US"/>
           </a:p>
@@ -2074,7 +2077,7 @@
           <a:p>
             <a:fld id="{AB21D1C1-A974-4CDD-890D-2FCDFA70CDD6}" type="datetimeFigureOut">
               <a:rPr lang="en-US" smtClean="0"/>
-              <a:t>8/24/2019</a:t>
+              <a:t>8/29/2019</a:t>
             </a:fld>
             <a:endParaRPr lang="en-US"/>
           </a:p>
@@ -2958,15 +2961,7 @@
           <a:p>
             <a:r>
               <a:rPr lang="en-US" dirty="0" smtClean="0"/>
-              <a:t>Normally, this file was generated from the database. But if there is no connection to the database, you need to add new campaign </a:t>
-            </a:r>
-            <a:r>
-              <a:rPr lang="en-US" dirty="0" smtClean="0"/>
-              <a:t>manually</a:t>
-            </a:r>
-            <a:r>
-              <a:rPr lang="en-US" dirty="0" smtClean="0"/>
-              <a:t>. </a:t>
+              <a:t>Normally, this file was generated from the database. But if there is no connection to the database, you need to add new campaign manually. </a:t>
             </a:r>
           </a:p>
           <a:p>
@@ -2975,11 +2970,7 @@
           <a:p>
             <a:r>
               <a:rPr lang="en-US" dirty="0" smtClean="0"/>
-              <a:t>(Be careful about the character of the ‘space’, actually it consists of ‘tab’. So better way is to copy the line before </a:t>
-            </a:r>
-            <a:r>
-              <a:rPr lang="en-US" dirty="0" smtClean="0"/>
-              <a:t>and then edit it according to your own demands.</a:t>
+              <a:t>(Be careful about the character of the ‘space’, actually it consists of ‘tab’. So better way is to copy the line before and then edit it according to your own demands.</a:t>
             </a:r>
             <a:endParaRPr lang="en-US" dirty="0"/>
           </a:p>
@@ -6136,11 +6127,7 @@
               </a:r>
               <a:r>
                 <a:rPr lang="en-US" sz="1400" b="1" dirty="0" err="1" smtClean="0"/>
-                <a:t>Polly</a:t>
-              </a:r>
-              <a:r>
-                <a:rPr lang="en-US" sz="1400" b="1" dirty="0" err="1" smtClean="0"/>
-                <a:t>XT_LACRO</a:t>
+                <a:t>PollyXT_LACRO</a:t>
               </a:r>
               <a:r>
                 <a:rPr lang="en-US" sz="1400" b="1" dirty="0" smtClean="0"/>
@@ -7185,11 +7172,7 @@
             </a:r>
             <a:r>
               <a:rPr lang="en-US" sz="2800" b="1" dirty="0" smtClean="0"/>
-              <a:t> data first</a:t>
-            </a:r>
-            <a:r>
-              <a:rPr lang="en-US" sz="2800" b="1" dirty="0" smtClean="0"/>
-              <a:t>)</a:t>
+              <a:t> data first)</a:t>
             </a:r>
             <a:endParaRPr lang="en-US" sz="2800" b="1" dirty="0"/>
           </a:p>
@@ -7317,11 +7300,7 @@
             </a:r>
             <a:r>
               <a:rPr lang="en-US" sz="2000" dirty="0" smtClean="0"/>
-              <a:t>output (Level 1 (signal correction), Level 2 (calibration results, extensive and intensive properties</a:t>
-            </a:r>
-            <a:r>
-              <a:rPr lang="en-US" sz="2000" dirty="0" smtClean="0"/>
-              <a:t>))</a:t>
+              <a:t>output (Level 1 (signal correction), Level 2 (calibration results, extensive and intensive properties))</a:t>
             </a:r>
           </a:p>
           <a:p>
@@ -7334,15 +7313,7 @@
             </a:pPr>
             <a:r>
               <a:rPr lang="en-US" sz="2000" dirty="0" smtClean="0"/>
-              <a:t>Dual-FOV </a:t>
-            </a:r>
-            <a:r>
-              <a:rPr lang="en-US" sz="2000" dirty="0" smtClean="0"/>
-              <a:t>method for retrieving cloud microphysical </a:t>
-            </a:r>
-            <a:r>
-              <a:rPr lang="en-US" sz="2000" dirty="0" smtClean="0"/>
-              <a:t>properties</a:t>
+              <a:t>Dual-FOV method for retrieving cloud microphysical properties</a:t>
             </a:r>
           </a:p>
         </p:txBody>
@@ -21870,11 +21841,7 @@
               <a:p>
                 <a:r>
                   <a:rPr lang="en-US" dirty="0" smtClean="0"/>
-                  <a:t>MATLAB </a:t>
-                </a:r>
-                <a:r>
-                  <a:rPr lang="en-US" dirty="0" smtClean="0"/>
-                  <a:t>&gt;= 2014a</a:t>
+                  <a:t>MATLAB &gt;= 2014a</a:t>
                 </a:r>
                 <a:endParaRPr lang="en-US" dirty="0"/>
               </a:p>
@@ -25263,7 +25230,7 @@
         <p:spPr>
           <a:xfrm>
             <a:off x="6184760" y="2949284"/>
-            <a:ext cx="4212687" cy="338554"/>
+            <a:ext cx="4212687" cy="830997"/>
           </a:xfrm>
           <a:prstGeom prst="rect">
             <a:avLst/>
@@ -25291,13 +25258,18 @@
           <a:p>
             <a:r>
               <a:rPr lang="en-US" sz="1600" dirty="0" smtClean="0"/>
-              <a:t>directories: according to your own </a:t>
-            </a:r>
-            <a:r>
-              <a:rPr lang="en-US" sz="1600" dirty="0" smtClean="0"/>
-              <a:t>requirements</a:t>
-            </a:r>
+              <a:t>directories: according to your own requirements</a:t>
+            </a:r>
+          </a:p>
+          <a:p>
             <a:endParaRPr lang="en-US" sz="1600" dirty="0"/>
+          </a:p>
+          <a:p>
+            <a:r>
+              <a:rPr lang="en-US" sz="1600" b="1" dirty="0" smtClean="0"/>
+              <a:t>‘//’ for windows path separator</a:t>
+            </a:r>
+            <a:endParaRPr lang="en-US" sz="1600" b="1" dirty="0"/>
           </a:p>
         </p:txBody>
       </p:sp>
@@ -25486,9 +25458,9 @@
         <p:grpSpPr>
           <a:xfrm>
             <a:off x="91440" y="970358"/>
-            <a:ext cx="8241792" cy="1155158"/>
+            <a:ext cx="11569618" cy="1155158"/>
             <a:chOff x="91440" y="970358"/>
-            <a:chExt cx="8241792" cy="1155158"/>
+            <a:chExt cx="11569618" cy="1155158"/>
           </a:xfrm>
         </p:grpSpPr>
         <p:sp>
@@ -25500,7 +25472,7 @@
           <p:spPr>
             <a:xfrm>
               <a:off x="91440" y="970358"/>
-              <a:ext cx="7370064" cy="369332"/>
+              <a:ext cx="11569618" cy="369332"/>
             </a:xfrm>
             <a:prstGeom prst="rect">
               <a:avLst/>
@@ -25523,7 +25495,19 @@
               </a:r>
               <a:r>
                 <a:rPr lang="en-US" dirty="0" smtClean="0"/>
-                <a:t> file from the template</a:t>
+                <a:t> file from the </a:t>
+              </a:r>
+              <a:r>
+                <a:rPr lang="en-US" dirty="0" smtClean="0"/>
+                <a:t>template (must be renamed as ‘</a:t>
+              </a:r>
+              <a:r>
+                <a:rPr lang="en-US" b="1" dirty="0" err="1" smtClean="0"/>
+                <a:t>pollynet_processing_chain_config.json</a:t>
+              </a:r>
+              <a:r>
+                <a:rPr lang="en-US" dirty="0" smtClean="0"/>
+                <a:t>’) </a:t>
               </a:r>
               <a:endParaRPr lang="en-US" dirty="0"/>
             </a:p>
@@ -25588,33 +25572,17 @@
                   <a:srgbClr val="FF0000"/>
                 </a:solidFill>
               </a:rPr>
-              <a:t>Detailed information can be found </a:t>
-            </a:r>
+              <a:t>Detailed information can be found in</a:t>
+            </a:r>
+          </a:p>
+          <a:p>
             <a:r>
               <a:rPr lang="en-US" dirty="0" smtClean="0">
                 <a:solidFill>
                   <a:srgbClr val="FF0000"/>
                 </a:solidFill>
               </a:rPr>
-              <a:t>in</a:t>
-            </a:r>
-          </a:p>
-          <a:p>
-            <a:r>
-              <a:rPr lang="en-US" dirty="0" smtClean="0">
-                <a:solidFill>
-                  <a:srgbClr val="FF0000"/>
-                </a:solidFill>
-              </a:rPr>
-              <a:t>../doc/pollynet_processing_chain_config.pdf</a:t>
-            </a:r>
-            <a:r>
-              <a:rPr lang="en-US" dirty="0" smtClean="0">
-                <a:solidFill>
-                  <a:srgbClr val="FF0000"/>
-                </a:solidFill>
-              </a:rPr>
-              <a:t> </a:t>
+              <a:t>../doc/pollynet_processing_chain_config.pdf </a:t>
             </a:r>
             <a:endParaRPr lang="en-US" dirty="0">
               <a:solidFill>

</xml_diff>